<commit_message>
Restructing and Updating web tech examples, as well as adding SQL examples. Java Example updates to follow
</commit_message>
<xml_diff>
--- a/revised-ppts/Day 1 PPT .pptx
+++ b/revised-ppts/Day 1 PPT .pptx
@@ -2,40 +2,41 @@
 <file path=ppt/presentation.xml><?xml version="1.0" encoding="utf-8"?>
 <p:presentation xmlns:a="http://schemas.openxmlformats.org/drawingml/2006/main" xmlns:r="http://schemas.openxmlformats.org/officeDocument/2006/relationships" xmlns:p="http://schemas.openxmlformats.org/presentationml/2006/main" firstSlideNum="0" saveSubsetFonts="1">
   <p:sldMasterIdLst>
-    <p:sldMasterId id="2147483690" r:id="rId1"/>
+    <p:sldMasterId id="2147483690" r:id="rId4"/>
   </p:sldMasterIdLst>
   <p:notesMasterIdLst>
-    <p:notesMasterId r:id="rId27"/>
+    <p:notesMasterId r:id="rId31"/>
   </p:notesMasterIdLst>
   <p:handoutMasterIdLst>
-    <p:handoutMasterId r:id="rId28"/>
+    <p:handoutMasterId r:id="rId32"/>
   </p:handoutMasterIdLst>
   <p:sldIdLst>
-    <p:sldId id="256" r:id="rId2"/>
-    <p:sldId id="272" r:id="rId3"/>
-    <p:sldId id="275" r:id="rId4"/>
-    <p:sldId id="271" r:id="rId5"/>
-    <p:sldId id="285" r:id="rId6"/>
-    <p:sldId id="273" r:id="rId7"/>
-    <p:sldId id="276" r:id="rId8"/>
-    <p:sldId id="269" r:id="rId9"/>
-    <p:sldId id="270" r:id="rId10"/>
-    <p:sldId id="286" r:id="rId11"/>
-    <p:sldId id="278" r:id="rId12"/>
-    <p:sldId id="283" r:id="rId13"/>
-    <p:sldId id="282" r:id="rId14"/>
-    <p:sldId id="263" r:id="rId15"/>
-    <p:sldId id="280" r:id="rId16"/>
-    <p:sldId id="284" r:id="rId17"/>
-    <p:sldId id="281" r:id="rId18"/>
-    <p:sldId id="265" r:id="rId19"/>
-    <p:sldId id="268" r:id="rId20"/>
-    <p:sldId id="259" r:id="rId21"/>
-    <p:sldId id="266" r:id="rId22"/>
-    <p:sldId id="260" r:id="rId23"/>
-    <p:sldId id="257" r:id="rId24"/>
-    <p:sldId id="277" r:id="rId25"/>
-    <p:sldId id="258" r:id="rId26"/>
+    <p:sldId id="256" r:id="rId5"/>
+    <p:sldId id="272" r:id="rId6"/>
+    <p:sldId id="275" r:id="rId7"/>
+    <p:sldId id="271" r:id="rId8"/>
+    <p:sldId id="285" r:id="rId9"/>
+    <p:sldId id="273" r:id="rId10"/>
+    <p:sldId id="276" r:id="rId11"/>
+    <p:sldId id="269" r:id="rId12"/>
+    <p:sldId id="270" r:id="rId13"/>
+    <p:sldId id="286" r:id="rId14"/>
+    <p:sldId id="278" r:id="rId15"/>
+    <p:sldId id="283" r:id="rId16"/>
+    <p:sldId id="289" r:id="rId17"/>
+    <p:sldId id="282" r:id="rId18"/>
+    <p:sldId id="263" r:id="rId19"/>
+    <p:sldId id="280" r:id="rId20"/>
+    <p:sldId id="284" r:id="rId21"/>
+    <p:sldId id="281" r:id="rId22"/>
+    <p:sldId id="265" r:id="rId23"/>
+    <p:sldId id="268" r:id="rId24"/>
+    <p:sldId id="259" r:id="rId25"/>
+    <p:sldId id="266" r:id="rId26"/>
+    <p:sldId id="260" r:id="rId27"/>
+    <p:sldId id="257" r:id="rId28"/>
+    <p:sldId id="277" r:id="rId29"/>
+    <p:sldId id="258" r:id="rId30"/>
   </p:sldIdLst>
   <p:sldSz cx="9144000" cy="6858000" type="screen4x3"/>
   <p:notesSz cx="7010400" cy="9296400"/>
@@ -264,1094 +265,6 @@
 
 <file path=ppt/changesInfos/changesInfo1.xml><?xml version="1.0" encoding="utf-8"?>
 <pc:chgInfo xmlns:a="http://schemas.openxmlformats.org/drawingml/2006/main" xmlns:r="http://schemas.openxmlformats.org/officeDocument/2006/relationships" xmlns:ac="http://schemas.microsoft.com/office/drawing/2013/main/command" xmlns:pc="http://schemas.microsoft.com/office/powerpoint/2013/main/command">
-  <pc:docChgLst>
-    <pc:chgData name="Cynthia Enciso" userId="7915927f-c5cf-4e1f-876d-e79882ad52fa" providerId="ADAL" clId="{1F755F40-8384-4DF3-BC8E-81F4C89DB039}"/>
-    <pc:docChg chg="undo custSel addSld modSld sldOrd">
-      <pc:chgData name="Cynthia Enciso" userId="7915927f-c5cf-4e1f-876d-e79882ad52fa" providerId="ADAL" clId="{1F755F40-8384-4DF3-BC8E-81F4C89DB039}" dt="2021-04-30T19:58:27.377" v="295" actId="5793"/>
-      <pc:docMkLst>
-        <pc:docMk/>
-      </pc:docMkLst>
-      <pc:sldChg chg="ord">
-        <pc:chgData name="Cynthia Enciso" userId="7915927f-c5cf-4e1f-876d-e79882ad52fa" providerId="ADAL" clId="{1F755F40-8384-4DF3-BC8E-81F4C89DB039}" dt="2021-04-09T14:34:51.351" v="3"/>
-        <pc:sldMkLst>
-          <pc:docMk/>
-          <pc:sldMk cId="3975998382" sldId="257"/>
-        </pc:sldMkLst>
-      </pc:sldChg>
-      <pc:sldChg chg="modSp mod">
-        <pc:chgData name="Cynthia Enciso" userId="7915927f-c5cf-4e1f-876d-e79882ad52fa" providerId="ADAL" clId="{1F755F40-8384-4DF3-BC8E-81F4C89DB039}" dt="2021-04-09T15:51:49.433" v="4" actId="20577"/>
-        <pc:sldMkLst>
-          <pc:docMk/>
-          <pc:sldMk cId="2395134128" sldId="260"/>
-        </pc:sldMkLst>
-        <pc:spChg chg="mod">
-          <ac:chgData name="Cynthia Enciso" userId="7915927f-c5cf-4e1f-876d-e79882ad52fa" providerId="ADAL" clId="{1F755F40-8384-4DF3-BC8E-81F4C89DB039}" dt="2021-04-09T15:51:49.433" v="4" actId="20577"/>
-          <ac:spMkLst>
-            <pc:docMk/>
-            <pc:sldMk cId="2395134128" sldId="260"/>
-            <ac:spMk id="3" creationId="{B7E2A0A5-0527-402A-8E6E-B53D80D33ED9}"/>
-          </ac:spMkLst>
-        </pc:spChg>
-      </pc:sldChg>
-      <pc:sldChg chg="ord">
-        <pc:chgData name="Cynthia Enciso" userId="7915927f-c5cf-4e1f-876d-e79882ad52fa" providerId="ADAL" clId="{1F755F40-8384-4DF3-BC8E-81F4C89DB039}" dt="2021-04-09T14:06:51.498" v="1"/>
-        <pc:sldMkLst>
-          <pc:docMk/>
-          <pc:sldMk cId="2787524733" sldId="262"/>
-        </pc:sldMkLst>
-      </pc:sldChg>
-      <pc:sldChg chg="modSp mod">
-        <pc:chgData name="Cynthia Enciso" userId="7915927f-c5cf-4e1f-876d-e79882ad52fa" providerId="ADAL" clId="{1F755F40-8384-4DF3-BC8E-81F4C89DB039}" dt="2021-04-20T19:57:58.337" v="227" actId="27636"/>
-        <pc:sldMkLst>
-          <pc:docMk/>
-          <pc:sldMk cId="388207083" sldId="264"/>
-        </pc:sldMkLst>
-        <pc:spChg chg="mod">
-          <ac:chgData name="Cynthia Enciso" userId="7915927f-c5cf-4e1f-876d-e79882ad52fa" providerId="ADAL" clId="{1F755F40-8384-4DF3-BC8E-81F4C89DB039}" dt="2021-04-20T19:57:58.337" v="227" actId="27636"/>
-          <ac:spMkLst>
-            <pc:docMk/>
-            <pc:sldMk cId="388207083" sldId="264"/>
-            <ac:spMk id="3" creationId="{39248842-1B3D-406C-952C-0E1D3252B26A}"/>
-          </ac:spMkLst>
-        </pc:spChg>
-      </pc:sldChg>
-      <pc:sldChg chg="ord">
-        <pc:chgData name="Cynthia Enciso" userId="7915927f-c5cf-4e1f-876d-e79882ad52fa" providerId="ADAL" clId="{1F755F40-8384-4DF3-BC8E-81F4C89DB039}" dt="2021-04-30T18:56:11.011" v="292"/>
-        <pc:sldMkLst>
-          <pc:docMk/>
-          <pc:sldMk cId="2963993193" sldId="265"/>
-        </pc:sldMkLst>
-      </pc:sldChg>
-      <pc:sldChg chg="modSp mod">
-        <pc:chgData name="Cynthia Enciso" userId="7915927f-c5cf-4e1f-876d-e79882ad52fa" providerId="ADAL" clId="{1F755F40-8384-4DF3-BC8E-81F4C89DB039}" dt="2021-04-30T19:58:27.377" v="295" actId="5793"/>
-        <pc:sldMkLst>
-          <pc:docMk/>
-          <pc:sldMk cId="2947364483" sldId="266"/>
-        </pc:sldMkLst>
-        <pc:spChg chg="mod">
-          <ac:chgData name="Cynthia Enciso" userId="7915927f-c5cf-4e1f-876d-e79882ad52fa" providerId="ADAL" clId="{1F755F40-8384-4DF3-BC8E-81F4C89DB039}" dt="2021-04-30T19:58:27.377" v="295" actId="5793"/>
-          <ac:spMkLst>
-            <pc:docMk/>
-            <pc:sldMk cId="2947364483" sldId="266"/>
-            <ac:spMk id="3" creationId="{CB32FB06-A08B-4515-93A9-E52C46989F3E}"/>
-          </ac:spMkLst>
-        </pc:spChg>
-      </pc:sldChg>
-      <pc:sldChg chg="addSp delSp modSp new mod">
-        <pc:chgData name="Cynthia Enciso" userId="7915927f-c5cf-4e1f-876d-e79882ad52fa" providerId="ADAL" clId="{1F755F40-8384-4DF3-BC8E-81F4C89DB039}" dt="2021-04-20T21:13:18.028" v="290" actId="1076"/>
-        <pc:sldMkLst>
-          <pc:docMk/>
-          <pc:sldMk cId="2319034473" sldId="270"/>
-        </pc:sldMkLst>
-        <pc:spChg chg="mod">
-          <ac:chgData name="Cynthia Enciso" userId="7915927f-c5cf-4e1f-876d-e79882ad52fa" providerId="ADAL" clId="{1F755F40-8384-4DF3-BC8E-81F4C89DB039}" dt="2021-04-20T16:21:20.906" v="213" actId="20577"/>
-          <ac:spMkLst>
-            <pc:docMk/>
-            <pc:sldMk cId="2319034473" sldId="270"/>
-            <ac:spMk id="2" creationId="{7A6C02CB-99CF-48EE-8285-0E5A3B8E8977}"/>
-          </ac:spMkLst>
-        </pc:spChg>
-        <pc:spChg chg="del">
-          <ac:chgData name="Cynthia Enciso" userId="7915927f-c5cf-4e1f-876d-e79882ad52fa" providerId="ADAL" clId="{1F755F40-8384-4DF3-BC8E-81F4C89DB039}" dt="2021-04-20T16:09:47.506" v="6" actId="478"/>
-          <ac:spMkLst>
-            <pc:docMk/>
-            <pc:sldMk cId="2319034473" sldId="270"/>
-            <ac:spMk id="3" creationId="{AB4D0F29-14C9-4AC3-B89C-BC5BE5172E87}"/>
-          </ac:spMkLst>
-        </pc:spChg>
-        <pc:spChg chg="add mod">
-          <ac:chgData name="Cynthia Enciso" userId="7915927f-c5cf-4e1f-876d-e79882ad52fa" providerId="ADAL" clId="{1F755F40-8384-4DF3-BC8E-81F4C89DB039}" dt="2021-04-20T16:10:48.667" v="29" actId="164"/>
-          <ac:spMkLst>
-            <pc:docMk/>
-            <pc:sldMk cId="2319034473" sldId="270"/>
-            <ac:spMk id="5" creationId="{E7E7A6F9-54DD-4B2B-80A5-DC5C0CBAF327}"/>
-          </ac:spMkLst>
-        </pc:spChg>
-        <pc:spChg chg="add mod">
-          <ac:chgData name="Cynthia Enciso" userId="7915927f-c5cf-4e1f-876d-e79882ad52fa" providerId="ADAL" clId="{1F755F40-8384-4DF3-BC8E-81F4C89DB039}" dt="2021-04-20T16:10:48.667" v="29" actId="164"/>
-          <ac:spMkLst>
-            <pc:docMk/>
-            <pc:sldMk cId="2319034473" sldId="270"/>
-            <ac:spMk id="6" creationId="{FDA43BF2-A19F-4610-BFA7-07483FC470E9}"/>
-          </ac:spMkLst>
-        </pc:spChg>
-        <pc:spChg chg="add mod">
-          <ac:chgData name="Cynthia Enciso" userId="7915927f-c5cf-4e1f-876d-e79882ad52fa" providerId="ADAL" clId="{1F755F40-8384-4DF3-BC8E-81F4C89DB039}" dt="2021-04-20T16:10:48.667" v="29" actId="164"/>
-          <ac:spMkLst>
-            <pc:docMk/>
-            <pc:sldMk cId="2319034473" sldId="270"/>
-            <ac:spMk id="7" creationId="{B00DFD34-4858-4F6A-8CDF-EE852DDAC9EC}"/>
-          </ac:spMkLst>
-        </pc:spChg>
-        <pc:spChg chg="add mod">
-          <ac:chgData name="Cynthia Enciso" userId="7915927f-c5cf-4e1f-876d-e79882ad52fa" providerId="ADAL" clId="{1F755F40-8384-4DF3-BC8E-81F4C89DB039}" dt="2021-04-20T16:10:48.667" v="29" actId="164"/>
-          <ac:spMkLst>
-            <pc:docMk/>
-            <pc:sldMk cId="2319034473" sldId="270"/>
-            <ac:spMk id="8" creationId="{7BA2F08D-545B-48ED-BAFA-0ED5845959D8}"/>
-          </ac:spMkLst>
-        </pc:spChg>
-        <pc:spChg chg="add mod">
-          <ac:chgData name="Cynthia Enciso" userId="7915927f-c5cf-4e1f-876d-e79882ad52fa" providerId="ADAL" clId="{1F755F40-8384-4DF3-BC8E-81F4C89DB039}" dt="2021-04-20T16:10:48.667" v="29" actId="164"/>
-          <ac:spMkLst>
-            <pc:docMk/>
-            <pc:sldMk cId="2319034473" sldId="270"/>
-            <ac:spMk id="9" creationId="{248FF0C6-F6E1-4AC3-BA22-EEDD3000DD23}"/>
-          </ac:spMkLst>
-        </pc:spChg>
-        <pc:spChg chg="add mod">
-          <ac:chgData name="Cynthia Enciso" userId="7915927f-c5cf-4e1f-876d-e79882ad52fa" providerId="ADAL" clId="{1F755F40-8384-4DF3-BC8E-81F4C89DB039}" dt="2021-04-20T16:10:48.667" v="29" actId="164"/>
-          <ac:spMkLst>
-            <pc:docMk/>
-            <pc:sldMk cId="2319034473" sldId="270"/>
-            <ac:spMk id="10" creationId="{5616A998-6A45-4B04-A27B-7991F52B46EE}"/>
-          </ac:spMkLst>
-        </pc:spChg>
-        <pc:spChg chg="add mod">
-          <ac:chgData name="Cynthia Enciso" userId="7915927f-c5cf-4e1f-876d-e79882ad52fa" providerId="ADAL" clId="{1F755F40-8384-4DF3-BC8E-81F4C89DB039}" dt="2021-04-20T16:10:48.667" v="29" actId="164"/>
-          <ac:spMkLst>
-            <pc:docMk/>
-            <pc:sldMk cId="2319034473" sldId="270"/>
-            <ac:spMk id="11" creationId="{682CA5B0-4782-4A78-9F41-EACB8A9A98CC}"/>
-          </ac:spMkLst>
-        </pc:spChg>
-        <pc:spChg chg="add mod">
-          <ac:chgData name="Cynthia Enciso" userId="7915927f-c5cf-4e1f-876d-e79882ad52fa" providerId="ADAL" clId="{1F755F40-8384-4DF3-BC8E-81F4C89DB039}" dt="2021-04-20T16:10:48.667" v="29" actId="164"/>
-          <ac:spMkLst>
-            <pc:docMk/>
-            <pc:sldMk cId="2319034473" sldId="270"/>
-            <ac:spMk id="12" creationId="{2CE55E90-5B7A-4C50-8A96-1047A91BE38D}"/>
-          </ac:spMkLst>
-        </pc:spChg>
-        <pc:spChg chg="mod">
-          <ac:chgData name="Cynthia Enciso" userId="7915927f-c5cf-4e1f-876d-e79882ad52fa" providerId="ADAL" clId="{1F755F40-8384-4DF3-BC8E-81F4C89DB039}" dt="2021-04-20T16:10:50.548" v="30"/>
-          <ac:spMkLst>
-            <pc:docMk/>
-            <pc:sldMk cId="2319034473" sldId="270"/>
-            <ac:spMk id="15" creationId="{5C8DA70F-0E78-482C-A9C7-71555F470A19}"/>
-          </ac:spMkLst>
-        </pc:spChg>
-        <pc:spChg chg="mod">
-          <ac:chgData name="Cynthia Enciso" userId="7915927f-c5cf-4e1f-876d-e79882ad52fa" providerId="ADAL" clId="{1F755F40-8384-4DF3-BC8E-81F4C89DB039}" dt="2021-04-20T16:10:50.548" v="30"/>
-          <ac:spMkLst>
-            <pc:docMk/>
-            <pc:sldMk cId="2319034473" sldId="270"/>
-            <ac:spMk id="16" creationId="{23006936-14D3-496E-935F-18FBCE3116B3}"/>
-          </ac:spMkLst>
-        </pc:spChg>
-        <pc:spChg chg="mod">
-          <ac:chgData name="Cynthia Enciso" userId="7915927f-c5cf-4e1f-876d-e79882ad52fa" providerId="ADAL" clId="{1F755F40-8384-4DF3-BC8E-81F4C89DB039}" dt="2021-04-20T16:10:50.548" v="30"/>
-          <ac:spMkLst>
-            <pc:docMk/>
-            <pc:sldMk cId="2319034473" sldId="270"/>
-            <ac:spMk id="17" creationId="{CC1C5A42-B626-436B-8C3D-DAEB83F98352}"/>
-          </ac:spMkLst>
-        </pc:spChg>
-        <pc:spChg chg="mod">
-          <ac:chgData name="Cynthia Enciso" userId="7915927f-c5cf-4e1f-876d-e79882ad52fa" providerId="ADAL" clId="{1F755F40-8384-4DF3-BC8E-81F4C89DB039}" dt="2021-04-20T16:10:50.548" v="30"/>
-          <ac:spMkLst>
-            <pc:docMk/>
-            <pc:sldMk cId="2319034473" sldId="270"/>
-            <ac:spMk id="18" creationId="{832C1753-AB37-44F6-A1F0-C097DF3C00C4}"/>
-          </ac:spMkLst>
-        </pc:spChg>
-        <pc:spChg chg="mod">
-          <ac:chgData name="Cynthia Enciso" userId="7915927f-c5cf-4e1f-876d-e79882ad52fa" providerId="ADAL" clId="{1F755F40-8384-4DF3-BC8E-81F4C89DB039}" dt="2021-04-20T16:10:50.548" v="30"/>
-          <ac:spMkLst>
-            <pc:docMk/>
-            <pc:sldMk cId="2319034473" sldId="270"/>
-            <ac:spMk id="19" creationId="{F1435748-FD7A-4B5A-BC4A-B4364B6F31FC}"/>
-          </ac:spMkLst>
-        </pc:spChg>
-        <pc:spChg chg="mod">
-          <ac:chgData name="Cynthia Enciso" userId="7915927f-c5cf-4e1f-876d-e79882ad52fa" providerId="ADAL" clId="{1F755F40-8384-4DF3-BC8E-81F4C89DB039}" dt="2021-04-20T16:10:50.548" v="30"/>
-          <ac:spMkLst>
-            <pc:docMk/>
-            <pc:sldMk cId="2319034473" sldId="270"/>
-            <ac:spMk id="20" creationId="{695B521F-C80C-4437-91CA-747D320E4B99}"/>
-          </ac:spMkLst>
-        </pc:spChg>
-        <pc:spChg chg="mod">
-          <ac:chgData name="Cynthia Enciso" userId="7915927f-c5cf-4e1f-876d-e79882ad52fa" providerId="ADAL" clId="{1F755F40-8384-4DF3-BC8E-81F4C89DB039}" dt="2021-04-20T16:10:50.548" v="30"/>
-          <ac:spMkLst>
-            <pc:docMk/>
-            <pc:sldMk cId="2319034473" sldId="270"/>
-            <ac:spMk id="21" creationId="{86E3FDFA-8553-4761-ACB5-F43E78A88FFE}"/>
-          </ac:spMkLst>
-        </pc:spChg>
-        <pc:spChg chg="mod">
-          <ac:chgData name="Cynthia Enciso" userId="7915927f-c5cf-4e1f-876d-e79882ad52fa" providerId="ADAL" clId="{1F755F40-8384-4DF3-BC8E-81F4C89DB039}" dt="2021-04-20T16:10:50.548" v="30"/>
-          <ac:spMkLst>
-            <pc:docMk/>
-            <pc:sldMk cId="2319034473" sldId="270"/>
-            <ac:spMk id="22" creationId="{87BF851F-DDC2-4B1F-9D36-0A2F8D5E27B1}"/>
-          </ac:spMkLst>
-        </pc:spChg>
-        <pc:spChg chg="add mod">
-          <ac:chgData name="Cynthia Enciso" userId="7915927f-c5cf-4e1f-876d-e79882ad52fa" providerId="ADAL" clId="{1F755F40-8384-4DF3-BC8E-81F4C89DB039}" dt="2021-04-20T16:19:37.083" v="158" actId="1076"/>
-          <ac:spMkLst>
-            <pc:docMk/>
-            <pc:sldMk cId="2319034473" sldId="270"/>
-            <ac:spMk id="23" creationId="{50A8566E-464E-4175-929B-52776DC40130}"/>
-          </ac:spMkLst>
-        </pc:spChg>
-        <pc:spChg chg="add del mod">
-          <ac:chgData name="Cynthia Enciso" userId="7915927f-c5cf-4e1f-876d-e79882ad52fa" providerId="ADAL" clId="{1F755F40-8384-4DF3-BC8E-81F4C89DB039}" dt="2021-04-20T20:45:38.498" v="259" actId="1076"/>
-          <ac:spMkLst>
-            <pc:docMk/>
-            <pc:sldMk cId="2319034473" sldId="270"/>
-            <ac:spMk id="24" creationId="{CAE4C87F-26F4-42CB-A15A-EC1B0740F61B}"/>
-          </ac:spMkLst>
-        </pc:spChg>
-        <pc:spChg chg="add mod topLvl">
-          <ac:chgData name="Cynthia Enciso" userId="7915927f-c5cf-4e1f-876d-e79882ad52fa" providerId="ADAL" clId="{1F755F40-8384-4DF3-BC8E-81F4C89DB039}" dt="2021-04-20T21:12:29.353" v="282" actId="1076"/>
-          <ac:spMkLst>
-            <pc:docMk/>
-            <pc:sldMk cId="2319034473" sldId="270"/>
-            <ac:spMk id="25" creationId="{FA60DBC5-F9CE-4350-8164-A7C3651B806F}"/>
-          </ac:spMkLst>
-        </pc:spChg>
-        <pc:spChg chg="add mod topLvl">
-          <ac:chgData name="Cynthia Enciso" userId="7915927f-c5cf-4e1f-876d-e79882ad52fa" providerId="ADAL" clId="{1F755F40-8384-4DF3-BC8E-81F4C89DB039}" dt="2021-04-20T21:12:31.930" v="283" actId="1076"/>
-          <ac:spMkLst>
-            <pc:docMk/>
-            <pc:sldMk cId="2319034473" sldId="270"/>
-            <ac:spMk id="26" creationId="{4A391CBE-D186-4C85-ADC1-2531A4817AE2}"/>
-          </ac:spMkLst>
-        </pc:spChg>
-        <pc:spChg chg="add mod">
-          <ac:chgData name="Cynthia Enciso" userId="7915927f-c5cf-4e1f-876d-e79882ad52fa" providerId="ADAL" clId="{1F755F40-8384-4DF3-BC8E-81F4C89DB039}" dt="2021-04-20T21:13:08.947" v="288" actId="1076"/>
-          <ac:spMkLst>
-            <pc:docMk/>
-            <pc:sldMk cId="2319034473" sldId="270"/>
-            <ac:spMk id="27" creationId="{DCEF357D-D40C-4FC9-8906-A5F626378C4A}"/>
-          </ac:spMkLst>
-        </pc:spChg>
-        <pc:spChg chg="add mod">
-          <ac:chgData name="Cynthia Enciso" userId="7915927f-c5cf-4e1f-876d-e79882ad52fa" providerId="ADAL" clId="{1F755F40-8384-4DF3-BC8E-81F4C89DB039}" dt="2021-04-20T16:14:53.746" v="77" actId="20577"/>
-          <ac:spMkLst>
-            <pc:docMk/>
-            <pc:sldMk cId="2319034473" sldId="270"/>
-            <ac:spMk id="28" creationId="{04696874-734C-45A0-8B96-6178153D5421}"/>
-          </ac:spMkLst>
-        </pc:spChg>
-        <pc:spChg chg="add mod">
-          <ac:chgData name="Cynthia Enciso" userId="7915927f-c5cf-4e1f-876d-e79882ad52fa" providerId="ADAL" clId="{1F755F40-8384-4DF3-BC8E-81F4C89DB039}" dt="2021-04-20T16:13:45.936" v="68" actId="1076"/>
-          <ac:spMkLst>
-            <pc:docMk/>
-            <pc:sldMk cId="2319034473" sldId="270"/>
-            <ac:spMk id="29" creationId="{69B467FF-4AEA-4F8C-96DF-D80E013851FB}"/>
-          </ac:spMkLst>
-        </pc:spChg>
-        <pc:spChg chg="add mod">
-          <ac:chgData name="Cynthia Enciso" userId="7915927f-c5cf-4e1f-876d-e79882ad52fa" providerId="ADAL" clId="{1F755F40-8384-4DF3-BC8E-81F4C89DB039}" dt="2021-04-20T16:14:34.947" v="76" actId="20577"/>
-          <ac:spMkLst>
-            <pc:docMk/>
-            <pc:sldMk cId="2319034473" sldId="270"/>
-            <ac:spMk id="30" creationId="{9097D6B3-F940-416C-9CA9-BD5E07E98E0C}"/>
-          </ac:spMkLst>
-        </pc:spChg>
-        <pc:spChg chg="add mod">
-          <ac:chgData name="Cynthia Enciso" userId="7915927f-c5cf-4e1f-876d-e79882ad52fa" providerId="ADAL" clId="{1F755F40-8384-4DF3-BC8E-81F4C89DB039}" dt="2021-04-20T16:15:06.355" v="80" actId="20577"/>
-          <ac:spMkLst>
-            <pc:docMk/>
-            <pc:sldMk cId="2319034473" sldId="270"/>
-            <ac:spMk id="31" creationId="{8FCCA1C7-E13E-410B-8BC6-E6DCD0DBA58A}"/>
-          </ac:spMkLst>
-        </pc:spChg>
-        <pc:spChg chg="add mod">
-          <ac:chgData name="Cynthia Enciso" userId="7915927f-c5cf-4e1f-876d-e79882ad52fa" providerId="ADAL" clId="{1F755F40-8384-4DF3-BC8E-81F4C89DB039}" dt="2021-04-20T16:16:42.803" v="119" actId="1076"/>
-          <ac:spMkLst>
-            <pc:docMk/>
-            <pc:sldMk cId="2319034473" sldId="270"/>
-            <ac:spMk id="32" creationId="{D67BDD0B-3B9A-41D6-BC66-23E00667AE74}"/>
-          </ac:spMkLst>
-        </pc:spChg>
-        <pc:spChg chg="add mod">
-          <ac:chgData name="Cynthia Enciso" userId="7915927f-c5cf-4e1f-876d-e79882ad52fa" providerId="ADAL" clId="{1F755F40-8384-4DF3-BC8E-81F4C89DB039}" dt="2021-04-20T16:16:40.813" v="118" actId="1076"/>
-          <ac:spMkLst>
-            <pc:docMk/>
-            <pc:sldMk cId="2319034473" sldId="270"/>
-            <ac:spMk id="33" creationId="{010336E1-DD57-4EE8-92AC-EE5AC524A058}"/>
-          </ac:spMkLst>
-        </pc:spChg>
-        <pc:spChg chg="add mod">
-          <ac:chgData name="Cynthia Enciso" userId="7915927f-c5cf-4e1f-876d-e79882ad52fa" providerId="ADAL" clId="{1F755F40-8384-4DF3-BC8E-81F4C89DB039}" dt="2021-04-20T16:16:38.097" v="117" actId="1076"/>
-          <ac:spMkLst>
-            <pc:docMk/>
-            <pc:sldMk cId="2319034473" sldId="270"/>
-            <ac:spMk id="34" creationId="{AFDE4497-014D-4CE0-86CB-D2027D70186C}"/>
-          </ac:spMkLst>
-        </pc:spChg>
-        <pc:spChg chg="add mod">
-          <ac:chgData name="Cynthia Enciso" userId="7915927f-c5cf-4e1f-876d-e79882ad52fa" providerId="ADAL" clId="{1F755F40-8384-4DF3-BC8E-81F4C89DB039}" dt="2021-04-20T16:15:40.529" v="99" actId="14100"/>
-          <ac:spMkLst>
-            <pc:docMk/>
-            <pc:sldMk cId="2319034473" sldId="270"/>
-            <ac:spMk id="35" creationId="{0C66319D-E1BD-4078-9D7E-585F5431E9D3}"/>
-          </ac:spMkLst>
-        </pc:spChg>
-        <pc:spChg chg="add mod">
-          <ac:chgData name="Cynthia Enciso" userId="7915927f-c5cf-4e1f-876d-e79882ad52fa" providerId="ADAL" clId="{1F755F40-8384-4DF3-BC8E-81F4C89DB039}" dt="2021-04-20T16:16:06.076" v="103" actId="1076"/>
-          <ac:spMkLst>
-            <pc:docMk/>
-            <pc:sldMk cId="2319034473" sldId="270"/>
-            <ac:spMk id="36" creationId="{14ED6CB2-B815-405A-893F-2E09669F4ED1}"/>
-          </ac:spMkLst>
-        </pc:spChg>
-        <pc:spChg chg="add mod">
-          <ac:chgData name="Cynthia Enciso" userId="7915927f-c5cf-4e1f-876d-e79882ad52fa" providerId="ADAL" clId="{1F755F40-8384-4DF3-BC8E-81F4C89DB039}" dt="2021-04-20T16:16:12.221" v="106" actId="20577"/>
-          <ac:spMkLst>
-            <pc:docMk/>
-            <pc:sldMk cId="2319034473" sldId="270"/>
-            <ac:spMk id="37" creationId="{F11C3C7B-17FD-45B2-A5BE-84A4B0493943}"/>
-          </ac:spMkLst>
-        </pc:spChg>
-        <pc:spChg chg="add mod">
-          <ac:chgData name="Cynthia Enciso" userId="7915927f-c5cf-4e1f-876d-e79882ad52fa" providerId="ADAL" clId="{1F755F40-8384-4DF3-BC8E-81F4C89DB039}" dt="2021-04-20T16:16:19.715" v="110" actId="14100"/>
-          <ac:spMkLst>
-            <pc:docMk/>
-            <pc:sldMk cId="2319034473" sldId="270"/>
-            <ac:spMk id="38" creationId="{D8A391B7-0A4A-4159-AF25-65A3428AE353}"/>
-          </ac:spMkLst>
-        </pc:spChg>
-        <pc:spChg chg="add mod">
-          <ac:chgData name="Cynthia Enciso" userId="7915927f-c5cf-4e1f-876d-e79882ad52fa" providerId="ADAL" clId="{1F755F40-8384-4DF3-BC8E-81F4C89DB039}" dt="2021-04-20T16:16:32.275" v="116" actId="1076"/>
-          <ac:spMkLst>
-            <pc:docMk/>
-            <pc:sldMk cId="2319034473" sldId="270"/>
-            <ac:spMk id="39" creationId="{47BC0A6B-4127-4F75-AA01-6FC23BE5AC25}"/>
-          </ac:spMkLst>
-        </pc:spChg>
-        <pc:spChg chg="add mod">
-          <ac:chgData name="Cynthia Enciso" userId="7915927f-c5cf-4e1f-876d-e79882ad52fa" providerId="ADAL" clId="{1F755F40-8384-4DF3-BC8E-81F4C89DB039}" dt="2021-04-20T21:13:00.578" v="286" actId="1076"/>
-          <ac:spMkLst>
-            <pc:docMk/>
-            <pc:sldMk cId="2319034473" sldId="270"/>
-            <ac:spMk id="40" creationId="{00693D47-F81C-4B47-ACF2-E4A14E388C56}"/>
-          </ac:spMkLst>
-        </pc:spChg>
-        <pc:spChg chg="add mod">
-          <ac:chgData name="Cynthia Enciso" userId="7915927f-c5cf-4e1f-876d-e79882ad52fa" providerId="ADAL" clId="{1F755F40-8384-4DF3-BC8E-81F4C89DB039}" dt="2021-04-20T21:12:50.486" v="285" actId="1076"/>
-          <ac:spMkLst>
-            <pc:docMk/>
-            <pc:sldMk cId="2319034473" sldId="270"/>
-            <ac:spMk id="41" creationId="{D25A5204-58E0-4B55-B96D-4FD974BD472F}"/>
-          </ac:spMkLst>
-        </pc:spChg>
-        <pc:spChg chg="add mod">
-          <ac:chgData name="Cynthia Enciso" userId="7915927f-c5cf-4e1f-876d-e79882ad52fa" providerId="ADAL" clId="{1F755F40-8384-4DF3-BC8E-81F4C89DB039}" dt="2021-04-20T21:13:15.333" v="289" actId="1076"/>
-          <ac:spMkLst>
-            <pc:docMk/>
-            <pc:sldMk cId="2319034473" sldId="270"/>
-            <ac:spMk id="42" creationId="{EF4E2520-5747-436B-970D-758E4C9F6417}"/>
-          </ac:spMkLst>
-        </pc:spChg>
-        <pc:spChg chg="add mod">
-          <ac:chgData name="Cynthia Enciso" userId="7915927f-c5cf-4e1f-876d-e79882ad52fa" providerId="ADAL" clId="{1F755F40-8384-4DF3-BC8E-81F4C89DB039}" dt="2021-04-20T21:13:04.028" v="287" actId="1076"/>
-          <ac:spMkLst>
-            <pc:docMk/>
-            <pc:sldMk cId="2319034473" sldId="270"/>
-            <ac:spMk id="43" creationId="{EB67F3F7-0318-4D92-870C-0852261C6830}"/>
-          </ac:spMkLst>
-        </pc:spChg>
-        <pc:spChg chg="add mod">
-          <ac:chgData name="Cynthia Enciso" userId="7915927f-c5cf-4e1f-876d-e79882ad52fa" providerId="ADAL" clId="{1F755F40-8384-4DF3-BC8E-81F4C89DB039}" dt="2021-04-20T21:13:18.028" v="290" actId="1076"/>
-          <ac:spMkLst>
-            <pc:docMk/>
-            <pc:sldMk cId="2319034473" sldId="270"/>
-            <ac:spMk id="44" creationId="{23850915-FAEA-4BB4-92C3-6FF1A647B710}"/>
-          </ac:spMkLst>
-        </pc:spChg>
-        <pc:spChg chg="add mod">
-          <ac:chgData name="Cynthia Enciso" userId="7915927f-c5cf-4e1f-876d-e79882ad52fa" providerId="ADAL" clId="{1F755F40-8384-4DF3-BC8E-81F4C89DB039}" dt="2021-04-20T21:11:30.677" v="265" actId="1076"/>
-          <ac:spMkLst>
-            <pc:docMk/>
-            <pc:sldMk cId="2319034473" sldId="270"/>
-            <ac:spMk id="46" creationId="{78AC57DA-4564-477F-ABD5-9BBA5C7B447E}"/>
-          </ac:spMkLst>
-        </pc:spChg>
-        <pc:spChg chg="add mod">
-          <ac:chgData name="Cynthia Enciso" userId="7915927f-c5cf-4e1f-876d-e79882ad52fa" providerId="ADAL" clId="{1F755F40-8384-4DF3-BC8E-81F4C89DB039}" dt="2021-04-20T21:11:41.616" v="268" actId="1076"/>
-          <ac:spMkLst>
-            <pc:docMk/>
-            <pc:sldMk cId="2319034473" sldId="270"/>
-            <ac:spMk id="47" creationId="{22257AB6-4886-4A01-B622-52869DD54FBE}"/>
-          </ac:spMkLst>
-        </pc:spChg>
-        <pc:spChg chg="add mod">
-          <ac:chgData name="Cynthia Enciso" userId="7915927f-c5cf-4e1f-876d-e79882ad52fa" providerId="ADAL" clId="{1F755F40-8384-4DF3-BC8E-81F4C89DB039}" dt="2021-04-20T21:11:43.845" v="269" actId="1076"/>
-          <ac:spMkLst>
-            <pc:docMk/>
-            <pc:sldMk cId="2319034473" sldId="270"/>
-            <ac:spMk id="48" creationId="{422CDE78-6517-4B9C-A7C5-299176554493}"/>
-          </ac:spMkLst>
-        </pc:spChg>
-        <pc:spChg chg="add mod">
-          <ac:chgData name="Cynthia Enciso" userId="7915927f-c5cf-4e1f-876d-e79882ad52fa" providerId="ADAL" clId="{1F755F40-8384-4DF3-BC8E-81F4C89DB039}" dt="2021-04-20T16:19:45.210" v="162" actId="20577"/>
-          <ac:spMkLst>
-            <pc:docMk/>
-            <pc:sldMk cId="2319034473" sldId="270"/>
-            <ac:spMk id="49" creationId="{D02174F6-773C-4964-9C33-5A1786A2B287}"/>
-          </ac:spMkLst>
-        </pc:spChg>
-        <pc:spChg chg="add mod">
-          <ac:chgData name="Cynthia Enciso" userId="7915927f-c5cf-4e1f-876d-e79882ad52fa" providerId="ADAL" clId="{1F755F40-8384-4DF3-BC8E-81F4C89DB039}" dt="2021-04-20T16:19:52.394" v="166" actId="20577"/>
-          <ac:spMkLst>
-            <pc:docMk/>
-            <pc:sldMk cId="2319034473" sldId="270"/>
-            <ac:spMk id="50" creationId="{4CA4759D-2105-461A-AB29-40C29843E784}"/>
-          </ac:spMkLst>
-        </pc:spChg>
-        <pc:spChg chg="add mod">
-          <ac:chgData name="Cynthia Enciso" userId="7915927f-c5cf-4e1f-876d-e79882ad52fa" providerId="ADAL" clId="{1F755F40-8384-4DF3-BC8E-81F4C89DB039}" dt="2021-04-20T16:20:02.311" v="170" actId="20577"/>
-          <ac:spMkLst>
-            <pc:docMk/>
-            <pc:sldMk cId="2319034473" sldId="270"/>
-            <ac:spMk id="51" creationId="{D3EC7252-E05A-441E-B252-E7B89A1AB381}"/>
-          </ac:spMkLst>
-        </pc:spChg>
-        <pc:spChg chg="add mod">
-          <ac:chgData name="Cynthia Enciso" userId="7915927f-c5cf-4e1f-876d-e79882ad52fa" providerId="ADAL" clId="{1F755F40-8384-4DF3-BC8E-81F4C89DB039}" dt="2021-04-20T19:51:09.768" v="218"/>
-          <ac:spMkLst>
-            <pc:docMk/>
-            <pc:sldMk cId="2319034473" sldId="270"/>
-            <ac:spMk id="52" creationId="{C1C486CD-3F79-4FA0-83F1-8F058D27516A}"/>
-          </ac:spMkLst>
-        </pc:spChg>
-        <pc:spChg chg="add mod">
-          <ac:chgData name="Cynthia Enciso" userId="7915927f-c5cf-4e1f-876d-e79882ad52fa" providerId="ADAL" clId="{1F755F40-8384-4DF3-BC8E-81F4C89DB039}" dt="2021-04-20T19:50:47.875" v="216" actId="1076"/>
-          <ac:spMkLst>
-            <pc:docMk/>
-            <pc:sldMk cId="2319034473" sldId="270"/>
-            <ac:spMk id="53" creationId="{43664EC6-7187-4F77-B41B-2C1951896AD4}"/>
-          </ac:spMkLst>
-        </pc:spChg>
-        <pc:spChg chg="add mod">
-          <ac:chgData name="Cynthia Enciso" userId="7915927f-c5cf-4e1f-876d-e79882ad52fa" providerId="ADAL" clId="{1F755F40-8384-4DF3-BC8E-81F4C89DB039}" dt="2021-04-20T19:50:47.875" v="216" actId="1076"/>
-          <ac:spMkLst>
-            <pc:docMk/>
-            <pc:sldMk cId="2319034473" sldId="270"/>
-            <ac:spMk id="54" creationId="{24D0E5BA-F0D5-4134-9137-57ADE5DE85DE}"/>
-          </ac:spMkLst>
-        </pc:spChg>
-        <pc:spChg chg="add mod">
-          <ac:chgData name="Cynthia Enciso" userId="7915927f-c5cf-4e1f-876d-e79882ad52fa" providerId="ADAL" clId="{1F755F40-8384-4DF3-BC8E-81F4C89DB039}" dt="2021-04-20T19:50:47.875" v="216" actId="1076"/>
-          <ac:spMkLst>
-            <pc:docMk/>
-            <pc:sldMk cId="2319034473" sldId="270"/>
-            <ac:spMk id="55" creationId="{07A09844-5018-49A1-B85D-0C9FC8457B57}"/>
-          </ac:spMkLst>
-        </pc:spChg>
-        <pc:spChg chg="add mod">
-          <ac:chgData name="Cynthia Enciso" userId="7915927f-c5cf-4e1f-876d-e79882ad52fa" providerId="ADAL" clId="{1F755F40-8384-4DF3-BC8E-81F4C89DB039}" dt="2021-04-20T19:50:47.875" v="216" actId="1076"/>
-          <ac:spMkLst>
-            <pc:docMk/>
-            <pc:sldMk cId="2319034473" sldId="270"/>
-            <ac:spMk id="56" creationId="{40AFC470-C093-43E3-8E56-41B6D04E55AB}"/>
-          </ac:spMkLst>
-        </pc:spChg>
-        <pc:spChg chg="add mod">
-          <ac:chgData name="Cynthia Enciso" userId="7915927f-c5cf-4e1f-876d-e79882ad52fa" providerId="ADAL" clId="{1F755F40-8384-4DF3-BC8E-81F4C89DB039}" dt="2021-04-20T19:50:47.875" v="216" actId="1076"/>
-          <ac:spMkLst>
-            <pc:docMk/>
-            <pc:sldMk cId="2319034473" sldId="270"/>
-            <ac:spMk id="57" creationId="{49179903-6A7F-47A7-9C40-C2D4015BC4F9}"/>
-          </ac:spMkLst>
-        </pc:spChg>
-        <pc:spChg chg="add del mod">
-          <ac:chgData name="Cynthia Enciso" userId="7915927f-c5cf-4e1f-876d-e79882ad52fa" providerId="ADAL" clId="{1F755F40-8384-4DF3-BC8E-81F4C89DB039}" dt="2021-04-20T19:50:40.709" v="215" actId="478"/>
-          <ac:spMkLst>
-            <pc:docMk/>
-            <pc:sldMk cId="2319034473" sldId="270"/>
-            <ac:spMk id="58" creationId="{9B1BBCA9-69C6-4EF7-B6FD-675459F47751}"/>
-          </ac:spMkLst>
-        </pc:spChg>
-        <pc:spChg chg="add mod">
-          <ac:chgData name="Cynthia Enciso" userId="7915927f-c5cf-4e1f-876d-e79882ad52fa" providerId="ADAL" clId="{1F755F40-8384-4DF3-BC8E-81F4C89DB039}" dt="2021-04-20T19:51:21.745" v="222" actId="20577"/>
-          <ac:spMkLst>
-            <pc:docMk/>
-            <pc:sldMk cId="2319034473" sldId="270"/>
-            <ac:spMk id="59" creationId="{ED8C762C-D282-40B9-A6F7-0DF5DFBF8F6E}"/>
-          </ac:spMkLst>
-        </pc:spChg>
-        <pc:grpChg chg="add mod">
-          <ac:chgData name="Cynthia Enciso" userId="7915927f-c5cf-4e1f-876d-e79882ad52fa" providerId="ADAL" clId="{1F755F40-8384-4DF3-BC8E-81F4C89DB039}" dt="2021-04-20T21:12:22.600" v="279" actId="1076"/>
-          <ac:grpSpMkLst>
-            <pc:docMk/>
-            <pc:sldMk cId="2319034473" sldId="270"/>
-            <ac:grpSpMk id="13" creationId="{8EE14F81-156C-44EF-8168-0112FF2B2C6B}"/>
-          </ac:grpSpMkLst>
-        </pc:grpChg>
-        <pc:grpChg chg="add mod">
-          <ac:chgData name="Cynthia Enciso" userId="7915927f-c5cf-4e1f-876d-e79882ad52fa" providerId="ADAL" clId="{1F755F40-8384-4DF3-BC8E-81F4C89DB039}" dt="2021-04-20T16:12:59.597" v="54" actId="1076"/>
-          <ac:grpSpMkLst>
-            <pc:docMk/>
-            <pc:sldMk cId="2319034473" sldId="270"/>
-            <ac:grpSpMk id="14" creationId="{B7B68B83-B18F-401E-A039-90F649A73943}"/>
-          </ac:grpSpMkLst>
-        </pc:grpChg>
-        <pc:grpChg chg="add del mod">
-          <ac:chgData name="Cynthia Enciso" userId="7915927f-c5cf-4e1f-876d-e79882ad52fa" providerId="ADAL" clId="{1F755F40-8384-4DF3-BC8E-81F4C89DB039}" dt="2021-04-20T16:18:05.648" v="133" actId="165"/>
-          <ac:grpSpMkLst>
-            <pc:docMk/>
-            <pc:sldMk cId="2319034473" sldId="270"/>
-            <ac:grpSpMk id="45" creationId="{5CC3FE42-DD25-4E63-8CEA-D82E0337D7A7}"/>
-          </ac:grpSpMkLst>
-        </pc:grpChg>
-      </pc:sldChg>
-    </pc:docChg>
-  </pc:docChgLst>
-  <pc:docChgLst>
-    <pc:chgData name="Cynthia Enciso" userId="7915927f-c5cf-4e1f-876d-e79882ad52fa" providerId="ADAL" clId="{D0A459C5-3AF3-4AAE-B7B8-1A4B974075B5}"/>
-    <pc:docChg chg="undo custSel addSld delSld modSld sldOrd">
-      <pc:chgData name="Cynthia Enciso" userId="7915927f-c5cf-4e1f-876d-e79882ad52fa" providerId="ADAL" clId="{D0A459C5-3AF3-4AAE-B7B8-1A4B974075B5}" dt="2021-10-05T21:16:03.757" v="1748" actId="1076"/>
-      <pc:docMkLst>
-        <pc:docMk/>
-      </pc:docMkLst>
-      <pc:sldChg chg="delSp mod">
-        <pc:chgData name="Cynthia Enciso" userId="7915927f-c5cf-4e1f-876d-e79882ad52fa" providerId="ADAL" clId="{D0A459C5-3AF3-4AAE-B7B8-1A4B974075B5}" dt="2021-07-20T21:03:27.017" v="1053" actId="478"/>
-        <pc:sldMkLst>
-          <pc:docMk/>
-          <pc:sldMk cId="2393796262" sldId="256"/>
-        </pc:sldMkLst>
-        <pc:spChg chg="del">
-          <ac:chgData name="Cynthia Enciso" userId="7915927f-c5cf-4e1f-876d-e79882ad52fa" providerId="ADAL" clId="{D0A459C5-3AF3-4AAE-B7B8-1A4B974075B5}" dt="2021-07-20T21:03:27.017" v="1053" actId="478"/>
-          <ac:spMkLst>
-            <pc:docMk/>
-            <pc:sldMk cId="2393796262" sldId="256"/>
-            <ac:spMk id="4" creationId="{D38EA767-BEC9-4100-BBB7-6BD76E2A5BFB}"/>
-          </ac:spMkLst>
-        </pc:spChg>
-      </pc:sldChg>
-      <pc:sldChg chg="addSp modSp">
-        <pc:chgData name="Cynthia Enciso" userId="7915927f-c5cf-4e1f-876d-e79882ad52fa" providerId="ADAL" clId="{D0A459C5-3AF3-4AAE-B7B8-1A4B974075B5}" dt="2021-08-31T20:03:25.799" v="1320"/>
-        <pc:sldMkLst>
-          <pc:docMk/>
-          <pc:sldMk cId="3975998382" sldId="257"/>
-        </pc:sldMkLst>
-        <pc:spChg chg="add mod">
-          <ac:chgData name="Cynthia Enciso" userId="7915927f-c5cf-4e1f-876d-e79882ad52fa" providerId="ADAL" clId="{D0A459C5-3AF3-4AAE-B7B8-1A4B974075B5}" dt="2021-08-31T20:03:25.799" v="1320"/>
-          <ac:spMkLst>
-            <pc:docMk/>
-            <pc:sldMk cId="3975998382" sldId="257"/>
-            <ac:spMk id="5" creationId="{A2FBABFB-8DDD-46C3-A75C-DC6AA1C51E1E}"/>
-          </ac:spMkLst>
-        </pc:spChg>
-      </pc:sldChg>
-      <pc:sldChg chg="delSp mod">
-        <pc:chgData name="Cynthia Enciso" userId="7915927f-c5cf-4e1f-876d-e79882ad52fa" providerId="ADAL" clId="{D0A459C5-3AF3-4AAE-B7B8-1A4B974075B5}" dt="2021-08-31T20:00:28.945" v="1315" actId="478"/>
-        <pc:sldMkLst>
-          <pc:docMk/>
-          <pc:sldMk cId="2599203940" sldId="259"/>
-        </pc:sldMkLst>
-        <pc:spChg chg="del">
-          <ac:chgData name="Cynthia Enciso" userId="7915927f-c5cf-4e1f-876d-e79882ad52fa" providerId="ADAL" clId="{D0A459C5-3AF3-4AAE-B7B8-1A4B974075B5}" dt="2021-08-31T20:00:28.945" v="1315" actId="478"/>
-          <ac:spMkLst>
-            <pc:docMk/>
-            <pc:sldMk cId="2599203940" sldId="259"/>
-            <ac:spMk id="5" creationId="{A0DCDC54-A7E8-4831-8BCB-F850336ABA99}"/>
-          </ac:spMkLst>
-        </pc:spChg>
-      </pc:sldChg>
-      <pc:sldChg chg="addSp delSp modSp mod ord">
-        <pc:chgData name="Cynthia Enciso" userId="7915927f-c5cf-4e1f-876d-e79882ad52fa" providerId="ADAL" clId="{D0A459C5-3AF3-4AAE-B7B8-1A4B974075B5}" dt="2021-08-31T20:01:12.510" v="1318" actId="478"/>
-        <pc:sldMkLst>
-          <pc:docMk/>
-          <pc:sldMk cId="2395134128" sldId="260"/>
-        </pc:sldMkLst>
-        <pc:spChg chg="add del mod">
-          <ac:chgData name="Cynthia Enciso" userId="7915927f-c5cf-4e1f-876d-e79882ad52fa" providerId="ADAL" clId="{D0A459C5-3AF3-4AAE-B7B8-1A4B974075B5}" dt="2021-08-31T20:01:12.510" v="1318" actId="478"/>
-          <ac:spMkLst>
-            <pc:docMk/>
-            <pc:sldMk cId="2395134128" sldId="260"/>
-            <ac:spMk id="6" creationId="{77EEC28F-49DB-426B-A654-5DDA766159F2}"/>
-          </ac:spMkLst>
-        </pc:spChg>
-      </pc:sldChg>
-      <pc:sldChg chg="addSp delSp modSp mod">
-        <pc:chgData name="Cynthia Enciso" userId="7915927f-c5cf-4e1f-876d-e79882ad52fa" providerId="ADAL" clId="{D0A459C5-3AF3-4AAE-B7B8-1A4B974075B5}" dt="2021-08-31T21:11:29.385" v="1462" actId="20577"/>
-        <pc:sldMkLst>
-          <pc:docMk/>
-          <pc:sldMk cId="388207083" sldId="264"/>
-        </pc:sldMkLst>
-        <pc:spChg chg="mod">
-          <ac:chgData name="Cynthia Enciso" userId="7915927f-c5cf-4e1f-876d-e79882ad52fa" providerId="ADAL" clId="{D0A459C5-3AF3-4AAE-B7B8-1A4B974075B5}" dt="2021-08-31T21:11:29.385" v="1462" actId="20577"/>
-          <ac:spMkLst>
-            <pc:docMk/>
-            <pc:sldMk cId="388207083" sldId="264"/>
-            <ac:spMk id="2" creationId="{94841F7E-B9A5-4C74-922B-513C237CD0FC}"/>
-          </ac:spMkLst>
-        </pc:spChg>
-        <pc:spChg chg="mod">
-          <ac:chgData name="Cynthia Enciso" userId="7915927f-c5cf-4e1f-876d-e79882ad52fa" providerId="ADAL" clId="{D0A459C5-3AF3-4AAE-B7B8-1A4B974075B5}" dt="2021-07-20T21:16:52.616" v="1115" actId="20578"/>
-          <ac:spMkLst>
-            <pc:docMk/>
-            <pc:sldMk cId="388207083" sldId="264"/>
-            <ac:spMk id="3" creationId="{39248842-1B3D-406C-952C-0E1D3252B26A}"/>
-          </ac:spMkLst>
-        </pc:spChg>
-        <pc:spChg chg="add del mod">
-          <ac:chgData name="Cynthia Enciso" userId="7915927f-c5cf-4e1f-876d-e79882ad52fa" providerId="ADAL" clId="{D0A459C5-3AF3-4AAE-B7B8-1A4B974075B5}" dt="2021-08-31T20:03:22.758" v="1319" actId="21"/>
-          <ac:spMkLst>
-            <pc:docMk/>
-            <pc:sldMk cId="388207083" sldId="264"/>
-            <ac:spMk id="5" creationId="{C20DA1CF-1D12-4D14-8D59-08D5D711C9DC}"/>
-          </ac:spMkLst>
-        </pc:spChg>
-      </pc:sldChg>
-      <pc:sldChg chg="modSp mod">
-        <pc:chgData name="Cynthia Enciso" userId="7915927f-c5cf-4e1f-876d-e79882ad52fa" providerId="ADAL" clId="{D0A459C5-3AF3-4AAE-B7B8-1A4B974075B5}" dt="2021-07-20T18:33:21.251" v="177" actId="20577"/>
-        <pc:sldMkLst>
-          <pc:docMk/>
-          <pc:sldMk cId="2963993193" sldId="265"/>
-        </pc:sldMkLst>
-        <pc:spChg chg="mod">
-          <ac:chgData name="Cynthia Enciso" userId="7915927f-c5cf-4e1f-876d-e79882ad52fa" providerId="ADAL" clId="{D0A459C5-3AF3-4AAE-B7B8-1A4B974075B5}" dt="2021-07-20T18:33:21.251" v="177" actId="20577"/>
-          <ac:spMkLst>
-            <pc:docMk/>
-            <pc:sldMk cId="2963993193" sldId="265"/>
-            <ac:spMk id="3" creationId="{3300291E-1C76-4B31-9D46-C2DBBFC7A069}"/>
-          </ac:spMkLst>
-        </pc:spChg>
-      </pc:sldChg>
-      <pc:sldChg chg="modSp mod">
-        <pc:chgData name="Cynthia Enciso" userId="7915927f-c5cf-4e1f-876d-e79882ad52fa" providerId="ADAL" clId="{D0A459C5-3AF3-4AAE-B7B8-1A4B974075B5}" dt="2021-08-31T20:00:53.344" v="1317" actId="1076"/>
-        <pc:sldMkLst>
-          <pc:docMk/>
-          <pc:sldMk cId="2947364483" sldId="266"/>
-        </pc:sldMkLst>
-        <pc:spChg chg="mod">
-          <ac:chgData name="Cynthia Enciso" userId="7915927f-c5cf-4e1f-876d-e79882ad52fa" providerId="ADAL" clId="{D0A459C5-3AF3-4AAE-B7B8-1A4B974075B5}" dt="2021-08-31T20:00:53.344" v="1317" actId="1076"/>
-          <ac:spMkLst>
-            <pc:docMk/>
-            <pc:sldMk cId="2947364483" sldId="266"/>
-            <ac:spMk id="5" creationId="{B3383E44-B4EB-4240-9765-2004E100CFEC}"/>
-          </ac:spMkLst>
-        </pc:spChg>
-        <pc:spChg chg="mod">
-          <ac:chgData name="Cynthia Enciso" userId="7915927f-c5cf-4e1f-876d-e79882ad52fa" providerId="ADAL" clId="{D0A459C5-3AF3-4AAE-B7B8-1A4B974075B5}" dt="2021-08-31T20:00:51.904" v="1316" actId="1076"/>
-          <ac:spMkLst>
-            <pc:docMk/>
-            <pc:sldMk cId="2947364483" sldId="266"/>
-            <ac:spMk id="6" creationId="{A54A671A-45AB-498D-B38B-4CC4FF07139A}"/>
-          </ac:spMkLst>
-        </pc:spChg>
-      </pc:sldChg>
-      <pc:sldChg chg="addSp modSp mod">
-        <pc:chgData name="Cynthia Enciso" userId="7915927f-c5cf-4e1f-876d-e79882ad52fa" providerId="ADAL" clId="{D0A459C5-3AF3-4AAE-B7B8-1A4B974075B5}" dt="2021-10-05T21:16:03.757" v="1748" actId="1076"/>
-        <pc:sldMkLst>
-          <pc:docMk/>
-          <pc:sldMk cId="2319034473" sldId="270"/>
-        </pc:sldMkLst>
-        <pc:spChg chg="mod">
-          <ac:chgData name="Cynthia Enciso" userId="7915927f-c5cf-4e1f-876d-e79882ad52fa" providerId="ADAL" clId="{D0A459C5-3AF3-4AAE-B7B8-1A4B974075B5}" dt="2021-07-20T20:08:47.553" v="1052" actId="20577"/>
-          <ac:spMkLst>
-            <pc:docMk/>
-            <pc:sldMk cId="2319034473" sldId="270"/>
-            <ac:spMk id="2" creationId="{7A6C02CB-99CF-48EE-8285-0E5A3B8E8977}"/>
-          </ac:spMkLst>
-        </pc:spChg>
-        <pc:spChg chg="mod">
-          <ac:chgData name="Cynthia Enciso" userId="7915927f-c5cf-4e1f-876d-e79882ad52fa" providerId="ADAL" clId="{D0A459C5-3AF3-4AAE-B7B8-1A4B974075B5}" dt="2021-10-05T21:14:45.966" v="1739" actId="1076"/>
-          <ac:spMkLst>
-            <pc:docMk/>
-            <pc:sldMk cId="2319034473" sldId="270"/>
-            <ac:spMk id="25" creationId="{FA60DBC5-F9CE-4350-8164-A7C3651B806F}"/>
-          </ac:spMkLst>
-        </pc:spChg>
-        <pc:spChg chg="mod">
-          <ac:chgData name="Cynthia Enciso" userId="7915927f-c5cf-4e1f-876d-e79882ad52fa" providerId="ADAL" clId="{D0A459C5-3AF3-4AAE-B7B8-1A4B974075B5}" dt="2021-10-05T19:54:30.854" v="1521" actId="1076"/>
-          <ac:spMkLst>
-            <pc:docMk/>
-            <pc:sldMk cId="2319034473" sldId="270"/>
-            <ac:spMk id="26" creationId="{4A391CBE-D186-4C85-ADC1-2531A4817AE2}"/>
-          </ac:spMkLst>
-        </pc:spChg>
-        <pc:spChg chg="mod">
-          <ac:chgData name="Cynthia Enciso" userId="7915927f-c5cf-4e1f-876d-e79882ad52fa" providerId="ADAL" clId="{D0A459C5-3AF3-4AAE-B7B8-1A4B974075B5}" dt="2021-07-20T22:10:56.182" v="1133" actId="1076"/>
-          <ac:spMkLst>
-            <pc:docMk/>
-            <pc:sldMk cId="2319034473" sldId="270"/>
-            <ac:spMk id="28" creationId="{04696874-734C-45A0-8B96-6178153D5421}"/>
-          </ac:spMkLst>
-        </pc:spChg>
-        <pc:spChg chg="add mod">
-          <ac:chgData name="Cynthia Enciso" userId="7915927f-c5cf-4e1f-876d-e79882ad52fa" providerId="ADAL" clId="{D0A459C5-3AF3-4AAE-B7B8-1A4B974075B5}" dt="2021-08-19T23:51:44.314" v="1277" actId="1076"/>
-          <ac:spMkLst>
-            <pc:docMk/>
-            <pc:sldMk cId="2319034473" sldId="270"/>
-            <ac:spMk id="40" creationId="{E0240F70-73C1-4DDF-BA10-11091D4DD6CD}"/>
-          </ac:spMkLst>
-        </pc:spChg>
-        <pc:spChg chg="add mod">
-          <ac:chgData name="Cynthia Enciso" userId="7915927f-c5cf-4e1f-876d-e79882ad52fa" providerId="ADAL" clId="{D0A459C5-3AF3-4AAE-B7B8-1A4B974075B5}" dt="2021-08-31T19:55:13.466" v="1304" actId="20577"/>
-          <ac:spMkLst>
-            <pc:docMk/>
-            <pc:sldMk cId="2319034473" sldId="270"/>
-            <ac:spMk id="41" creationId="{323DCC40-57EF-429F-9C86-B7BBC6D5A63C}"/>
-          </ac:spMkLst>
-        </pc:spChg>
-        <pc:spChg chg="mod">
-          <ac:chgData name="Cynthia Enciso" userId="7915927f-c5cf-4e1f-876d-e79882ad52fa" providerId="ADAL" clId="{D0A459C5-3AF3-4AAE-B7B8-1A4B974075B5}" dt="2021-10-05T19:58:02.526" v="1560" actId="1076"/>
-          <ac:spMkLst>
-            <pc:docMk/>
-            <pc:sldMk cId="2319034473" sldId="270"/>
-            <ac:spMk id="46" creationId="{78AC57DA-4564-477F-ABD5-9BBA5C7B447E}"/>
-          </ac:spMkLst>
-        </pc:spChg>
-        <pc:spChg chg="mod">
-          <ac:chgData name="Cynthia Enciso" userId="7915927f-c5cf-4e1f-876d-e79882ad52fa" providerId="ADAL" clId="{D0A459C5-3AF3-4AAE-B7B8-1A4B974075B5}" dt="2021-10-05T19:55:12.921" v="1533" actId="1076"/>
-          <ac:spMkLst>
-            <pc:docMk/>
-            <pc:sldMk cId="2319034473" sldId="270"/>
-            <ac:spMk id="47" creationId="{22257AB6-4886-4A01-B622-52869DD54FBE}"/>
-          </ac:spMkLst>
-        </pc:spChg>
-        <pc:spChg chg="mod">
-          <ac:chgData name="Cynthia Enciso" userId="7915927f-c5cf-4e1f-876d-e79882ad52fa" providerId="ADAL" clId="{D0A459C5-3AF3-4AAE-B7B8-1A4B974075B5}" dt="2021-10-05T19:56:43.049" v="1540" actId="1076"/>
-          <ac:spMkLst>
-            <pc:docMk/>
-            <pc:sldMk cId="2319034473" sldId="270"/>
-            <ac:spMk id="48" creationId="{422CDE78-6517-4B9C-A7C5-299176554493}"/>
-          </ac:spMkLst>
-        </pc:spChg>
-        <pc:spChg chg="mod">
-          <ac:chgData name="Cynthia Enciso" userId="7915927f-c5cf-4e1f-876d-e79882ad52fa" providerId="ADAL" clId="{D0A459C5-3AF3-4AAE-B7B8-1A4B974075B5}" dt="2021-10-05T19:54:48.781" v="1525" actId="1076"/>
-          <ac:spMkLst>
-            <pc:docMk/>
-            <pc:sldMk cId="2319034473" sldId="270"/>
-            <ac:spMk id="58" creationId="{2DD44E1C-429E-4847-B9CE-AAEE455A7517}"/>
-          </ac:spMkLst>
-        </pc:spChg>
-        <pc:spChg chg="mod">
-          <ac:chgData name="Cynthia Enciso" userId="7915927f-c5cf-4e1f-876d-e79882ad52fa" providerId="ADAL" clId="{D0A459C5-3AF3-4AAE-B7B8-1A4B974075B5}" dt="2021-10-05T19:54:29.232" v="1520" actId="1076"/>
-          <ac:spMkLst>
-            <pc:docMk/>
-            <pc:sldMk cId="2319034473" sldId="270"/>
-            <ac:spMk id="61" creationId="{6FDCC27E-2658-4A0E-A540-F5B179763DD1}"/>
-          </ac:spMkLst>
-        </pc:spChg>
-        <pc:spChg chg="mod">
-          <ac:chgData name="Cynthia Enciso" userId="7915927f-c5cf-4e1f-876d-e79882ad52fa" providerId="ADAL" clId="{D0A459C5-3AF3-4AAE-B7B8-1A4B974075B5}" dt="2021-10-05T19:54:25.116" v="1518" actId="1076"/>
-          <ac:spMkLst>
-            <pc:docMk/>
-            <pc:sldMk cId="2319034473" sldId="270"/>
-            <ac:spMk id="62" creationId="{5B6DE506-0651-4968-A934-6268655A2FE5}"/>
-          </ac:spMkLst>
-        </pc:spChg>
-        <pc:spChg chg="mod">
-          <ac:chgData name="Cynthia Enciso" userId="7915927f-c5cf-4e1f-876d-e79882ad52fa" providerId="ADAL" clId="{D0A459C5-3AF3-4AAE-B7B8-1A4B974075B5}" dt="2021-10-05T19:54:21.641" v="1516" actId="1076"/>
-          <ac:spMkLst>
-            <pc:docMk/>
-            <pc:sldMk cId="2319034473" sldId="270"/>
-            <ac:spMk id="63" creationId="{23296F60-1876-4084-86AD-2B97DA8E4862}"/>
-          </ac:spMkLst>
-        </pc:spChg>
-        <pc:spChg chg="mod">
-          <ac:chgData name="Cynthia Enciso" userId="7915927f-c5cf-4e1f-876d-e79882ad52fa" providerId="ADAL" clId="{D0A459C5-3AF3-4AAE-B7B8-1A4B974075B5}" dt="2021-10-05T19:54:16.703" v="1513" actId="1076"/>
-          <ac:spMkLst>
-            <pc:docMk/>
-            <pc:sldMk cId="2319034473" sldId="270"/>
-            <ac:spMk id="64" creationId="{C93FF507-BE40-4CB4-98E8-9FE9BFEA565A}"/>
-          </ac:spMkLst>
-        </pc:spChg>
-        <pc:spChg chg="mod">
-          <ac:chgData name="Cynthia Enciso" userId="7915927f-c5cf-4e1f-876d-e79882ad52fa" providerId="ADAL" clId="{D0A459C5-3AF3-4AAE-B7B8-1A4B974075B5}" dt="2021-10-05T19:54:14.705" v="1512" actId="1076"/>
-          <ac:spMkLst>
-            <pc:docMk/>
-            <pc:sldMk cId="2319034473" sldId="270"/>
-            <ac:spMk id="65" creationId="{710CA644-BC30-44EC-A0F5-C005FB78D407}"/>
-          </ac:spMkLst>
-        </pc:spChg>
-        <pc:spChg chg="mod">
-          <ac:chgData name="Cynthia Enciso" userId="7915927f-c5cf-4e1f-876d-e79882ad52fa" providerId="ADAL" clId="{D0A459C5-3AF3-4AAE-B7B8-1A4B974075B5}" dt="2021-10-05T21:15:37.132" v="1744" actId="1076"/>
-          <ac:spMkLst>
-            <pc:docMk/>
-            <pc:sldMk cId="2319034473" sldId="270"/>
-            <ac:spMk id="66" creationId="{F9FA4145-0C58-4D64-94BF-29E8BFC4294A}"/>
-          </ac:spMkLst>
-        </pc:spChg>
-        <pc:spChg chg="add mod">
-          <ac:chgData name="Cynthia Enciso" userId="7915927f-c5cf-4e1f-876d-e79882ad52fa" providerId="ADAL" clId="{D0A459C5-3AF3-4AAE-B7B8-1A4B974075B5}" dt="2021-10-05T21:14:52.977" v="1740" actId="1076"/>
-          <ac:spMkLst>
-            <pc:docMk/>
-            <pc:sldMk cId="2319034473" sldId="270"/>
-            <ac:spMk id="70" creationId="{288F54D5-2E2D-404A-96A8-5D75D6A4A706}"/>
-          </ac:spMkLst>
-        </pc:spChg>
-        <pc:spChg chg="add mod">
-          <ac:chgData name="Cynthia Enciso" userId="7915927f-c5cf-4e1f-876d-e79882ad52fa" providerId="ADAL" clId="{D0A459C5-3AF3-4AAE-B7B8-1A4B974075B5}" dt="2021-10-05T21:14:55.063" v="1741" actId="1076"/>
-          <ac:spMkLst>
-            <pc:docMk/>
-            <pc:sldMk cId="2319034473" sldId="270"/>
-            <ac:spMk id="71" creationId="{9088B752-1ADD-4D92-B947-3C2AD72B0D8A}"/>
-          </ac:spMkLst>
-        </pc:spChg>
-        <pc:spChg chg="add mod">
-          <ac:chgData name="Cynthia Enciso" userId="7915927f-c5cf-4e1f-876d-e79882ad52fa" providerId="ADAL" clId="{D0A459C5-3AF3-4AAE-B7B8-1A4B974075B5}" dt="2021-10-05T21:11:10.570" v="1711" actId="1076"/>
-          <ac:spMkLst>
-            <pc:docMk/>
-            <pc:sldMk cId="2319034473" sldId="270"/>
-            <ac:spMk id="72" creationId="{A362B9BE-2C72-47F7-AAA2-9D2C5EDFC945}"/>
-          </ac:spMkLst>
-        </pc:spChg>
-        <pc:spChg chg="add mod">
-          <ac:chgData name="Cynthia Enciso" userId="7915927f-c5cf-4e1f-876d-e79882ad52fa" providerId="ADAL" clId="{D0A459C5-3AF3-4AAE-B7B8-1A4B974075B5}" dt="2021-10-05T19:56:58.149" v="1546" actId="571"/>
-          <ac:spMkLst>
-            <pc:docMk/>
-            <pc:sldMk cId="2319034473" sldId="270"/>
-            <ac:spMk id="73" creationId="{45299BA5-46A1-4376-9546-82BD03784506}"/>
-          </ac:spMkLst>
-        </pc:spChg>
-        <pc:spChg chg="mod">
-          <ac:chgData name="Cynthia Enciso" userId="7915927f-c5cf-4e1f-876d-e79882ad52fa" providerId="ADAL" clId="{D0A459C5-3AF3-4AAE-B7B8-1A4B974075B5}" dt="2021-10-05T21:13:13.635" v="1723" actId="1076"/>
-          <ac:spMkLst>
-            <pc:docMk/>
-            <pc:sldMk cId="2319034473" sldId="270"/>
-            <ac:spMk id="74" creationId="{214FE5F0-9A8D-48CD-AC53-D057EBEA33B1}"/>
-          </ac:spMkLst>
-        </pc:spChg>
-        <pc:spChg chg="mod">
-          <ac:chgData name="Cynthia Enciso" userId="7915927f-c5cf-4e1f-876d-e79882ad52fa" providerId="ADAL" clId="{D0A459C5-3AF3-4AAE-B7B8-1A4B974075B5}" dt="2021-10-05T21:15:53.711" v="1746" actId="1076"/>
-          <ac:spMkLst>
-            <pc:docMk/>
-            <pc:sldMk cId="2319034473" sldId="270"/>
-            <ac:spMk id="75" creationId="{A04E6601-5C06-4F98-8094-DE356B3A56C4}"/>
-          </ac:spMkLst>
-        </pc:spChg>
-        <pc:spChg chg="mod">
-          <ac:chgData name="Cynthia Enciso" userId="7915927f-c5cf-4e1f-876d-e79882ad52fa" providerId="ADAL" clId="{D0A459C5-3AF3-4AAE-B7B8-1A4B974075B5}" dt="2021-10-05T21:16:03.757" v="1748" actId="1076"/>
-          <ac:spMkLst>
-            <pc:docMk/>
-            <pc:sldMk cId="2319034473" sldId="270"/>
-            <ac:spMk id="76" creationId="{7CACBBEE-2E27-4492-93AA-9A520D16824C}"/>
-          </ac:spMkLst>
-        </pc:spChg>
-        <pc:spChg chg="mod">
-          <ac:chgData name="Cynthia Enciso" userId="7915927f-c5cf-4e1f-876d-e79882ad52fa" providerId="ADAL" clId="{D0A459C5-3AF3-4AAE-B7B8-1A4B974075B5}" dt="2021-10-05T19:56:17.808" v="1537" actId="1076"/>
-          <ac:spMkLst>
-            <pc:docMk/>
-            <pc:sldMk cId="2319034473" sldId="270"/>
-            <ac:spMk id="77" creationId="{8B367CAE-89F6-43C4-9CD9-2A60B983B03A}"/>
-          </ac:spMkLst>
-        </pc:spChg>
-        <pc:spChg chg="mod">
-          <ac:chgData name="Cynthia Enciso" userId="7915927f-c5cf-4e1f-876d-e79882ad52fa" providerId="ADAL" clId="{D0A459C5-3AF3-4AAE-B7B8-1A4B974075B5}" dt="2021-10-05T19:54:36.288" v="1523" actId="1076"/>
-          <ac:spMkLst>
-            <pc:docMk/>
-            <pc:sldMk cId="2319034473" sldId="270"/>
-            <ac:spMk id="78" creationId="{DA0A20DC-8FFE-4E79-BBC7-3F3F027D8C6A}"/>
-          </ac:spMkLst>
-        </pc:spChg>
-        <pc:spChg chg="mod">
-          <ac:chgData name="Cynthia Enciso" userId="7915927f-c5cf-4e1f-876d-e79882ad52fa" providerId="ADAL" clId="{D0A459C5-3AF3-4AAE-B7B8-1A4B974075B5}" dt="2021-10-05T19:54:58.964" v="1528" actId="1076"/>
-          <ac:spMkLst>
-            <pc:docMk/>
-            <pc:sldMk cId="2319034473" sldId="270"/>
-            <ac:spMk id="79" creationId="{B8DC9761-F5DD-437B-9CDC-B68E9C8050D6}"/>
-          </ac:spMkLst>
-        </pc:spChg>
-        <pc:spChg chg="mod">
-          <ac:chgData name="Cynthia Enciso" userId="7915927f-c5cf-4e1f-876d-e79882ad52fa" providerId="ADAL" clId="{D0A459C5-3AF3-4AAE-B7B8-1A4B974075B5}" dt="2021-10-05T19:54:56.465" v="1527" actId="1076"/>
-          <ac:spMkLst>
-            <pc:docMk/>
-            <pc:sldMk cId="2319034473" sldId="270"/>
-            <ac:spMk id="80" creationId="{18EEEC5C-540B-4290-8D78-C577A18F6AB9}"/>
-          </ac:spMkLst>
-        </pc:spChg>
-        <pc:spChg chg="mod">
-          <ac:chgData name="Cynthia Enciso" userId="7915927f-c5cf-4e1f-876d-e79882ad52fa" providerId="ADAL" clId="{D0A459C5-3AF3-4AAE-B7B8-1A4B974075B5}" dt="2021-10-05T19:54:54.163" v="1526" actId="1076"/>
-          <ac:spMkLst>
-            <pc:docMk/>
-            <pc:sldMk cId="2319034473" sldId="270"/>
-            <ac:spMk id="81" creationId="{CB09B3CA-F3C9-4A19-94D8-53EC575C82D2}"/>
-          </ac:spMkLst>
-        </pc:spChg>
-        <pc:spChg chg="add mod">
-          <ac:chgData name="Cynthia Enciso" userId="7915927f-c5cf-4e1f-876d-e79882ad52fa" providerId="ADAL" clId="{D0A459C5-3AF3-4AAE-B7B8-1A4B974075B5}" dt="2021-10-05T19:57:00.884" v="1547" actId="571"/>
-          <ac:spMkLst>
-            <pc:docMk/>
-            <pc:sldMk cId="2319034473" sldId="270"/>
-            <ac:spMk id="82" creationId="{1ECA0DEE-FDE3-4159-A7C5-E484A91680D5}"/>
-          </ac:spMkLst>
-        </pc:spChg>
-        <pc:spChg chg="add mod">
-          <ac:chgData name="Cynthia Enciso" userId="7915927f-c5cf-4e1f-876d-e79882ad52fa" providerId="ADAL" clId="{D0A459C5-3AF3-4AAE-B7B8-1A4B974075B5}" dt="2021-10-05T19:57:03.631" v="1548" actId="571"/>
-          <ac:spMkLst>
-            <pc:docMk/>
-            <pc:sldMk cId="2319034473" sldId="270"/>
-            <ac:spMk id="83" creationId="{C0465FAD-B196-404F-B48D-FA470AB85A04}"/>
-          </ac:spMkLst>
-        </pc:spChg>
-        <pc:spChg chg="add mod">
-          <ac:chgData name="Cynthia Enciso" userId="7915927f-c5cf-4e1f-876d-e79882ad52fa" providerId="ADAL" clId="{D0A459C5-3AF3-4AAE-B7B8-1A4B974075B5}" dt="2021-10-05T19:57:06.127" v="1549" actId="571"/>
-          <ac:spMkLst>
-            <pc:docMk/>
-            <pc:sldMk cId="2319034473" sldId="270"/>
-            <ac:spMk id="84" creationId="{F3FEA792-1F64-4D1D-AA17-4EC94E24D396}"/>
-          </ac:spMkLst>
-        </pc:spChg>
-        <pc:spChg chg="add mod">
-          <ac:chgData name="Cynthia Enciso" userId="7915927f-c5cf-4e1f-876d-e79882ad52fa" providerId="ADAL" clId="{D0A459C5-3AF3-4AAE-B7B8-1A4B974075B5}" dt="2021-10-05T19:57:08.722" v="1550" actId="571"/>
-          <ac:spMkLst>
-            <pc:docMk/>
-            <pc:sldMk cId="2319034473" sldId="270"/>
-            <ac:spMk id="85" creationId="{B1A25B08-C3E6-4044-8913-6FDA3E09EC44}"/>
-          </ac:spMkLst>
-        </pc:spChg>
-        <pc:spChg chg="add mod">
-          <ac:chgData name="Cynthia Enciso" userId="7915927f-c5cf-4e1f-876d-e79882ad52fa" providerId="ADAL" clId="{D0A459C5-3AF3-4AAE-B7B8-1A4B974075B5}" dt="2021-10-05T21:16:01.413" v="1747" actId="1076"/>
-          <ac:spMkLst>
-            <pc:docMk/>
-            <pc:sldMk cId="2319034473" sldId="270"/>
-            <ac:spMk id="86" creationId="{739312CE-7600-496B-8DE7-774BD7FA1D9C}"/>
-          </ac:spMkLst>
-        </pc:spChg>
-        <pc:spChg chg="add mod">
-          <ac:chgData name="Cynthia Enciso" userId="7915927f-c5cf-4e1f-876d-e79882ad52fa" providerId="ADAL" clId="{D0A459C5-3AF3-4AAE-B7B8-1A4B974075B5}" dt="2021-10-05T21:14:36.590" v="1737" actId="1076"/>
-          <ac:spMkLst>
-            <pc:docMk/>
-            <pc:sldMk cId="2319034473" sldId="270"/>
-            <ac:spMk id="87" creationId="{B50954FF-A115-4CE4-A919-8059471AA12C}"/>
-          </ac:spMkLst>
-        </pc:spChg>
-        <pc:spChg chg="add mod">
-          <ac:chgData name="Cynthia Enciso" userId="7915927f-c5cf-4e1f-876d-e79882ad52fa" providerId="ADAL" clId="{D0A459C5-3AF3-4AAE-B7B8-1A4B974075B5}" dt="2021-10-05T19:57:16.801" v="1553" actId="571"/>
-          <ac:spMkLst>
-            <pc:docMk/>
-            <pc:sldMk cId="2319034473" sldId="270"/>
-            <ac:spMk id="88" creationId="{175076FC-73FC-4293-9929-C45667456207}"/>
-          </ac:spMkLst>
-        </pc:spChg>
-        <pc:spChg chg="add mod">
-          <ac:chgData name="Cynthia Enciso" userId="7915927f-c5cf-4e1f-876d-e79882ad52fa" providerId="ADAL" clId="{D0A459C5-3AF3-4AAE-B7B8-1A4B974075B5}" dt="2021-10-05T21:15:50.435" v="1745" actId="1076"/>
-          <ac:spMkLst>
-            <pc:docMk/>
-            <pc:sldMk cId="2319034473" sldId="270"/>
-            <ac:spMk id="89" creationId="{F8E5DDA1-3963-42AD-A499-7B130C0293B9}"/>
-          </ac:spMkLst>
-        </pc:spChg>
-        <pc:spChg chg="add mod">
-          <ac:chgData name="Cynthia Enciso" userId="7915927f-c5cf-4e1f-876d-e79882ad52fa" providerId="ADAL" clId="{D0A459C5-3AF3-4AAE-B7B8-1A4B974075B5}" dt="2021-10-05T19:57:21.812" v="1555" actId="571"/>
-          <ac:spMkLst>
-            <pc:docMk/>
-            <pc:sldMk cId="2319034473" sldId="270"/>
-            <ac:spMk id="90" creationId="{F57717E7-6C12-4A4A-850D-F153CE527EA8}"/>
-          </ac:spMkLst>
-        </pc:spChg>
-        <pc:spChg chg="add mod">
-          <ac:chgData name="Cynthia Enciso" userId="7915927f-c5cf-4e1f-876d-e79882ad52fa" providerId="ADAL" clId="{D0A459C5-3AF3-4AAE-B7B8-1A4B974075B5}" dt="2021-10-05T21:15:34.458" v="1743" actId="1076"/>
-          <ac:spMkLst>
-            <pc:docMk/>
-            <pc:sldMk cId="2319034473" sldId="270"/>
-            <ac:spMk id="91" creationId="{F5EED823-465C-4D16-B7AA-FCF53CE2ADBD}"/>
-          </ac:spMkLst>
-        </pc:spChg>
-        <pc:spChg chg="add mod">
-          <ac:chgData name="Cynthia Enciso" userId="7915927f-c5cf-4e1f-876d-e79882ad52fa" providerId="ADAL" clId="{D0A459C5-3AF3-4AAE-B7B8-1A4B974075B5}" dt="2021-10-05T19:57:26.718" v="1557" actId="571"/>
-          <ac:spMkLst>
-            <pc:docMk/>
-            <pc:sldMk cId="2319034473" sldId="270"/>
-            <ac:spMk id="92" creationId="{937AB026-57B8-432C-BC08-4D1211321063}"/>
-          </ac:spMkLst>
-        </pc:spChg>
-        <pc:spChg chg="add mod">
-          <ac:chgData name="Cynthia Enciso" userId="7915927f-c5cf-4e1f-876d-e79882ad52fa" providerId="ADAL" clId="{D0A459C5-3AF3-4AAE-B7B8-1A4B974075B5}" dt="2021-10-05T19:57:30.841" v="1558" actId="571"/>
-          <ac:spMkLst>
-            <pc:docMk/>
-            <pc:sldMk cId="2319034473" sldId="270"/>
-            <ac:spMk id="93" creationId="{F9C8978D-5981-4092-BC21-3609282E27BA}"/>
-          </ac:spMkLst>
-        </pc:spChg>
-        <pc:spChg chg="add mod">
-          <ac:chgData name="Cynthia Enciso" userId="7915927f-c5cf-4e1f-876d-e79882ad52fa" providerId="ADAL" clId="{D0A459C5-3AF3-4AAE-B7B8-1A4B974075B5}" dt="2021-10-05T21:12:17.965" v="1714" actId="1076"/>
-          <ac:spMkLst>
-            <pc:docMk/>
-            <pc:sldMk cId="2319034473" sldId="270"/>
-            <ac:spMk id="94" creationId="{188A1EFA-CA60-4921-8A6E-B24DEF0D3B33}"/>
-          </ac:spMkLst>
-        </pc:spChg>
-        <pc:spChg chg="add mod">
-          <ac:chgData name="Cynthia Enciso" userId="7915927f-c5cf-4e1f-876d-e79882ad52fa" providerId="ADAL" clId="{D0A459C5-3AF3-4AAE-B7B8-1A4B974075B5}" dt="2021-10-05T21:14:59.095" v="1742" actId="1076"/>
-          <ac:spMkLst>
-            <pc:docMk/>
-            <pc:sldMk cId="2319034473" sldId="270"/>
-            <ac:spMk id="95" creationId="{0586583A-48F3-49F1-A1B5-50CE5A703463}"/>
-          </ac:spMkLst>
-        </pc:spChg>
-        <pc:spChg chg="add mod">
-          <ac:chgData name="Cynthia Enciso" userId="7915927f-c5cf-4e1f-876d-e79882ad52fa" providerId="ADAL" clId="{D0A459C5-3AF3-4AAE-B7B8-1A4B974075B5}" dt="2021-10-05T21:12:45.859" v="1720" actId="571"/>
-          <ac:spMkLst>
-            <pc:docMk/>
-            <pc:sldMk cId="2319034473" sldId="270"/>
-            <ac:spMk id="96" creationId="{3B35119C-2AEC-4F61-B95D-B1617DEE5ECB}"/>
-          </ac:spMkLst>
-        </pc:spChg>
-        <pc:grpChg chg="mod">
-          <ac:chgData name="Cynthia Enciso" userId="7915927f-c5cf-4e1f-876d-e79882ad52fa" providerId="ADAL" clId="{D0A459C5-3AF3-4AAE-B7B8-1A4B974075B5}" dt="2021-10-05T21:14:18.947" v="1734" actId="1076"/>
-          <ac:grpSpMkLst>
-            <pc:docMk/>
-            <pc:sldMk cId="2319034473" sldId="270"/>
-            <ac:grpSpMk id="13" creationId="{8EE14F81-156C-44EF-8168-0112FF2B2C6B}"/>
-          </ac:grpSpMkLst>
-        </pc:grpChg>
-        <pc:grpChg chg="mod">
-          <ac:chgData name="Cynthia Enciso" userId="7915927f-c5cf-4e1f-876d-e79882ad52fa" providerId="ADAL" clId="{D0A459C5-3AF3-4AAE-B7B8-1A4B974075B5}" dt="2021-08-31T21:21:49.045" v="1470" actId="1076"/>
-          <ac:grpSpMkLst>
-            <pc:docMk/>
-            <pc:sldMk cId="2319034473" sldId="270"/>
-            <ac:grpSpMk id="14" creationId="{B7B68B83-B18F-401E-A039-90F649A73943}"/>
-          </ac:grpSpMkLst>
-        </pc:grpChg>
-      </pc:sldChg>
-      <pc:sldChg chg="modSp new del mod ord">
-        <pc:chgData name="Cynthia Enciso" userId="7915927f-c5cf-4e1f-876d-e79882ad52fa" providerId="ADAL" clId="{D0A459C5-3AF3-4AAE-B7B8-1A4B974075B5}" dt="2021-08-31T21:09:52.685" v="1419" actId="47"/>
-        <pc:sldMkLst>
-          <pc:docMk/>
-          <pc:sldMk cId="2044680221" sldId="271"/>
-        </pc:sldMkLst>
-        <pc:spChg chg="mod">
-          <ac:chgData name="Cynthia Enciso" userId="7915927f-c5cf-4e1f-876d-e79882ad52fa" providerId="ADAL" clId="{D0A459C5-3AF3-4AAE-B7B8-1A4B974075B5}" dt="2021-08-31T20:18:47.953" v="1389" actId="20577"/>
-          <ac:spMkLst>
-            <pc:docMk/>
-            <pc:sldMk cId="2044680221" sldId="271"/>
-            <ac:spMk id="2" creationId="{D0ECBF07-878B-443C-89C7-213C9BD2488E}"/>
-          </ac:spMkLst>
-        </pc:spChg>
-        <pc:spChg chg="mod">
-          <ac:chgData name="Cynthia Enciso" userId="7915927f-c5cf-4e1f-876d-e79882ad52fa" providerId="ADAL" clId="{D0A459C5-3AF3-4AAE-B7B8-1A4B974075B5}" dt="2021-08-31T21:05:16.209" v="1418" actId="20577"/>
-          <ac:spMkLst>
-            <pc:docMk/>
-            <pc:sldMk cId="2044680221" sldId="271"/>
-            <ac:spMk id="3" creationId="{368AC1CE-262E-49A4-B3B7-2E59B55C0B60}"/>
-          </ac:spMkLst>
-        </pc:spChg>
-      </pc:sldChg>
-      <pc:sldChg chg="new del">
-        <pc:chgData name="Cynthia Enciso" userId="7915927f-c5cf-4e1f-876d-e79882ad52fa" providerId="ADAL" clId="{D0A459C5-3AF3-4AAE-B7B8-1A4B974075B5}" dt="2021-08-31T20:03:38.297" v="1322" actId="47"/>
-        <pc:sldMkLst>
-          <pc:docMk/>
-          <pc:sldMk cId="2927855542" sldId="271"/>
-        </pc:sldMkLst>
-      </pc:sldChg>
-      <pc:sldChg chg="modSp new del mod ord">
-        <pc:chgData name="Cynthia Enciso" userId="7915927f-c5cf-4e1f-876d-e79882ad52fa" providerId="ADAL" clId="{D0A459C5-3AF3-4AAE-B7B8-1A4B974075B5}" dt="2021-10-05T21:03:44.390" v="1710" actId="47"/>
-        <pc:sldMkLst>
-          <pc:docMk/>
-          <pc:sldMk cId="4243886059" sldId="271"/>
-        </pc:sldMkLst>
-        <pc:spChg chg="mod">
-          <ac:chgData name="Cynthia Enciso" userId="7915927f-c5cf-4e1f-876d-e79882ad52fa" providerId="ADAL" clId="{D0A459C5-3AF3-4AAE-B7B8-1A4B974075B5}" dt="2021-10-05T20:04:31.175" v="1709" actId="20577"/>
-          <ac:spMkLst>
-            <pc:docMk/>
-            <pc:sldMk cId="4243886059" sldId="271"/>
-            <ac:spMk id="3" creationId="{DE2EA8C4-4B62-468C-89F2-79370F22BE29}"/>
-          </ac:spMkLst>
-        </pc:spChg>
-      </pc:sldChg>
-    </pc:docChg>
-  </pc:docChgLst>
   <pc:docChgLst>
     <pc:chgData name="Cynthia Enciso" userId="7915927f-c5cf-4e1f-876d-e79882ad52fa" providerId="ADAL" clId="{9A78363A-0468-45D8-964C-F0884215088C}"/>
     <pc:docChg chg="undo custSel addSld delSld modSld sldOrd">
@@ -3531,6 +2444,556 @@
     </pc:docChg>
   </pc:docChgLst>
   <pc:docChgLst>
+    <pc:chgData name="Cynthia Enciso" userId="7915927f-c5cf-4e1f-876d-e79882ad52fa" providerId="ADAL" clId="{D0A459C5-3AF3-4AAE-B7B8-1A4B974075B5}"/>
+    <pc:docChg chg="undo custSel addSld delSld modSld sldOrd">
+      <pc:chgData name="Cynthia Enciso" userId="7915927f-c5cf-4e1f-876d-e79882ad52fa" providerId="ADAL" clId="{D0A459C5-3AF3-4AAE-B7B8-1A4B974075B5}" dt="2021-10-05T21:16:03.757" v="1748" actId="1076"/>
+      <pc:docMkLst>
+        <pc:docMk/>
+      </pc:docMkLst>
+      <pc:sldChg chg="delSp mod">
+        <pc:chgData name="Cynthia Enciso" userId="7915927f-c5cf-4e1f-876d-e79882ad52fa" providerId="ADAL" clId="{D0A459C5-3AF3-4AAE-B7B8-1A4B974075B5}" dt="2021-07-20T21:03:27.017" v="1053" actId="478"/>
+        <pc:sldMkLst>
+          <pc:docMk/>
+          <pc:sldMk cId="2393796262" sldId="256"/>
+        </pc:sldMkLst>
+        <pc:spChg chg="del">
+          <ac:chgData name="Cynthia Enciso" userId="7915927f-c5cf-4e1f-876d-e79882ad52fa" providerId="ADAL" clId="{D0A459C5-3AF3-4AAE-B7B8-1A4B974075B5}" dt="2021-07-20T21:03:27.017" v="1053" actId="478"/>
+          <ac:spMkLst>
+            <pc:docMk/>
+            <pc:sldMk cId="2393796262" sldId="256"/>
+            <ac:spMk id="4" creationId="{D38EA767-BEC9-4100-BBB7-6BD76E2A5BFB}"/>
+          </ac:spMkLst>
+        </pc:spChg>
+      </pc:sldChg>
+      <pc:sldChg chg="addSp modSp">
+        <pc:chgData name="Cynthia Enciso" userId="7915927f-c5cf-4e1f-876d-e79882ad52fa" providerId="ADAL" clId="{D0A459C5-3AF3-4AAE-B7B8-1A4B974075B5}" dt="2021-08-31T20:03:25.799" v="1320"/>
+        <pc:sldMkLst>
+          <pc:docMk/>
+          <pc:sldMk cId="3975998382" sldId="257"/>
+        </pc:sldMkLst>
+        <pc:spChg chg="add mod">
+          <ac:chgData name="Cynthia Enciso" userId="7915927f-c5cf-4e1f-876d-e79882ad52fa" providerId="ADAL" clId="{D0A459C5-3AF3-4AAE-B7B8-1A4B974075B5}" dt="2021-08-31T20:03:25.799" v="1320"/>
+          <ac:spMkLst>
+            <pc:docMk/>
+            <pc:sldMk cId="3975998382" sldId="257"/>
+            <ac:spMk id="5" creationId="{A2FBABFB-8DDD-46C3-A75C-DC6AA1C51E1E}"/>
+          </ac:spMkLst>
+        </pc:spChg>
+      </pc:sldChg>
+      <pc:sldChg chg="delSp mod">
+        <pc:chgData name="Cynthia Enciso" userId="7915927f-c5cf-4e1f-876d-e79882ad52fa" providerId="ADAL" clId="{D0A459C5-3AF3-4AAE-B7B8-1A4B974075B5}" dt="2021-08-31T20:00:28.945" v="1315" actId="478"/>
+        <pc:sldMkLst>
+          <pc:docMk/>
+          <pc:sldMk cId="2599203940" sldId="259"/>
+        </pc:sldMkLst>
+        <pc:spChg chg="del">
+          <ac:chgData name="Cynthia Enciso" userId="7915927f-c5cf-4e1f-876d-e79882ad52fa" providerId="ADAL" clId="{D0A459C5-3AF3-4AAE-B7B8-1A4B974075B5}" dt="2021-08-31T20:00:28.945" v="1315" actId="478"/>
+          <ac:spMkLst>
+            <pc:docMk/>
+            <pc:sldMk cId="2599203940" sldId="259"/>
+            <ac:spMk id="5" creationId="{A0DCDC54-A7E8-4831-8BCB-F850336ABA99}"/>
+          </ac:spMkLst>
+        </pc:spChg>
+      </pc:sldChg>
+      <pc:sldChg chg="addSp delSp modSp mod ord">
+        <pc:chgData name="Cynthia Enciso" userId="7915927f-c5cf-4e1f-876d-e79882ad52fa" providerId="ADAL" clId="{D0A459C5-3AF3-4AAE-B7B8-1A4B974075B5}" dt="2021-08-31T20:01:12.510" v="1318" actId="478"/>
+        <pc:sldMkLst>
+          <pc:docMk/>
+          <pc:sldMk cId="2395134128" sldId="260"/>
+        </pc:sldMkLst>
+        <pc:spChg chg="add del mod">
+          <ac:chgData name="Cynthia Enciso" userId="7915927f-c5cf-4e1f-876d-e79882ad52fa" providerId="ADAL" clId="{D0A459C5-3AF3-4AAE-B7B8-1A4B974075B5}" dt="2021-08-31T20:01:12.510" v="1318" actId="478"/>
+          <ac:spMkLst>
+            <pc:docMk/>
+            <pc:sldMk cId="2395134128" sldId="260"/>
+            <ac:spMk id="6" creationId="{77EEC28F-49DB-426B-A654-5DDA766159F2}"/>
+          </ac:spMkLst>
+        </pc:spChg>
+      </pc:sldChg>
+      <pc:sldChg chg="addSp delSp modSp mod">
+        <pc:chgData name="Cynthia Enciso" userId="7915927f-c5cf-4e1f-876d-e79882ad52fa" providerId="ADAL" clId="{D0A459C5-3AF3-4AAE-B7B8-1A4B974075B5}" dt="2021-08-31T21:11:29.385" v="1462" actId="20577"/>
+        <pc:sldMkLst>
+          <pc:docMk/>
+          <pc:sldMk cId="388207083" sldId="264"/>
+        </pc:sldMkLst>
+        <pc:spChg chg="mod">
+          <ac:chgData name="Cynthia Enciso" userId="7915927f-c5cf-4e1f-876d-e79882ad52fa" providerId="ADAL" clId="{D0A459C5-3AF3-4AAE-B7B8-1A4B974075B5}" dt="2021-08-31T21:11:29.385" v="1462" actId="20577"/>
+          <ac:spMkLst>
+            <pc:docMk/>
+            <pc:sldMk cId="388207083" sldId="264"/>
+            <ac:spMk id="2" creationId="{94841F7E-B9A5-4C74-922B-513C237CD0FC}"/>
+          </ac:spMkLst>
+        </pc:spChg>
+        <pc:spChg chg="mod">
+          <ac:chgData name="Cynthia Enciso" userId="7915927f-c5cf-4e1f-876d-e79882ad52fa" providerId="ADAL" clId="{D0A459C5-3AF3-4AAE-B7B8-1A4B974075B5}" dt="2021-07-20T21:16:52.616" v="1115" actId="20578"/>
+          <ac:spMkLst>
+            <pc:docMk/>
+            <pc:sldMk cId="388207083" sldId="264"/>
+            <ac:spMk id="3" creationId="{39248842-1B3D-406C-952C-0E1D3252B26A}"/>
+          </ac:spMkLst>
+        </pc:spChg>
+        <pc:spChg chg="add del mod">
+          <ac:chgData name="Cynthia Enciso" userId="7915927f-c5cf-4e1f-876d-e79882ad52fa" providerId="ADAL" clId="{D0A459C5-3AF3-4AAE-B7B8-1A4B974075B5}" dt="2021-08-31T20:03:22.758" v="1319" actId="21"/>
+          <ac:spMkLst>
+            <pc:docMk/>
+            <pc:sldMk cId="388207083" sldId="264"/>
+            <ac:spMk id="5" creationId="{C20DA1CF-1D12-4D14-8D59-08D5D711C9DC}"/>
+          </ac:spMkLst>
+        </pc:spChg>
+      </pc:sldChg>
+      <pc:sldChg chg="modSp mod">
+        <pc:chgData name="Cynthia Enciso" userId="7915927f-c5cf-4e1f-876d-e79882ad52fa" providerId="ADAL" clId="{D0A459C5-3AF3-4AAE-B7B8-1A4B974075B5}" dt="2021-07-20T18:33:21.251" v="177" actId="20577"/>
+        <pc:sldMkLst>
+          <pc:docMk/>
+          <pc:sldMk cId="2963993193" sldId="265"/>
+        </pc:sldMkLst>
+        <pc:spChg chg="mod">
+          <ac:chgData name="Cynthia Enciso" userId="7915927f-c5cf-4e1f-876d-e79882ad52fa" providerId="ADAL" clId="{D0A459C5-3AF3-4AAE-B7B8-1A4B974075B5}" dt="2021-07-20T18:33:21.251" v="177" actId="20577"/>
+          <ac:spMkLst>
+            <pc:docMk/>
+            <pc:sldMk cId="2963993193" sldId="265"/>
+            <ac:spMk id="3" creationId="{3300291E-1C76-4B31-9D46-C2DBBFC7A069}"/>
+          </ac:spMkLst>
+        </pc:spChg>
+      </pc:sldChg>
+      <pc:sldChg chg="modSp mod">
+        <pc:chgData name="Cynthia Enciso" userId="7915927f-c5cf-4e1f-876d-e79882ad52fa" providerId="ADAL" clId="{D0A459C5-3AF3-4AAE-B7B8-1A4B974075B5}" dt="2021-08-31T20:00:53.344" v="1317" actId="1076"/>
+        <pc:sldMkLst>
+          <pc:docMk/>
+          <pc:sldMk cId="2947364483" sldId="266"/>
+        </pc:sldMkLst>
+        <pc:spChg chg="mod">
+          <ac:chgData name="Cynthia Enciso" userId="7915927f-c5cf-4e1f-876d-e79882ad52fa" providerId="ADAL" clId="{D0A459C5-3AF3-4AAE-B7B8-1A4B974075B5}" dt="2021-08-31T20:00:53.344" v="1317" actId="1076"/>
+          <ac:spMkLst>
+            <pc:docMk/>
+            <pc:sldMk cId="2947364483" sldId="266"/>
+            <ac:spMk id="5" creationId="{B3383E44-B4EB-4240-9765-2004E100CFEC}"/>
+          </ac:spMkLst>
+        </pc:spChg>
+        <pc:spChg chg="mod">
+          <ac:chgData name="Cynthia Enciso" userId="7915927f-c5cf-4e1f-876d-e79882ad52fa" providerId="ADAL" clId="{D0A459C5-3AF3-4AAE-B7B8-1A4B974075B5}" dt="2021-08-31T20:00:51.904" v="1316" actId="1076"/>
+          <ac:spMkLst>
+            <pc:docMk/>
+            <pc:sldMk cId="2947364483" sldId="266"/>
+            <ac:spMk id="6" creationId="{A54A671A-45AB-498D-B38B-4CC4FF07139A}"/>
+          </ac:spMkLst>
+        </pc:spChg>
+      </pc:sldChg>
+      <pc:sldChg chg="addSp modSp mod">
+        <pc:chgData name="Cynthia Enciso" userId="7915927f-c5cf-4e1f-876d-e79882ad52fa" providerId="ADAL" clId="{D0A459C5-3AF3-4AAE-B7B8-1A4B974075B5}" dt="2021-10-05T21:16:03.757" v="1748" actId="1076"/>
+        <pc:sldMkLst>
+          <pc:docMk/>
+          <pc:sldMk cId="2319034473" sldId="270"/>
+        </pc:sldMkLst>
+        <pc:spChg chg="mod">
+          <ac:chgData name="Cynthia Enciso" userId="7915927f-c5cf-4e1f-876d-e79882ad52fa" providerId="ADAL" clId="{D0A459C5-3AF3-4AAE-B7B8-1A4B974075B5}" dt="2021-07-20T20:08:47.553" v="1052" actId="20577"/>
+          <ac:spMkLst>
+            <pc:docMk/>
+            <pc:sldMk cId="2319034473" sldId="270"/>
+            <ac:spMk id="2" creationId="{7A6C02CB-99CF-48EE-8285-0E5A3B8E8977}"/>
+          </ac:spMkLst>
+        </pc:spChg>
+        <pc:spChg chg="mod">
+          <ac:chgData name="Cynthia Enciso" userId="7915927f-c5cf-4e1f-876d-e79882ad52fa" providerId="ADAL" clId="{D0A459C5-3AF3-4AAE-B7B8-1A4B974075B5}" dt="2021-10-05T21:14:45.966" v="1739" actId="1076"/>
+          <ac:spMkLst>
+            <pc:docMk/>
+            <pc:sldMk cId="2319034473" sldId="270"/>
+            <ac:spMk id="25" creationId="{FA60DBC5-F9CE-4350-8164-A7C3651B806F}"/>
+          </ac:spMkLst>
+        </pc:spChg>
+        <pc:spChg chg="mod">
+          <ac:chgData name="Cynthia Enciso" userId="7915927f-c5cf-4e1f-876d-e79882ad52fa" providerId="ADAL" clId="{D0A459C5-3AF3-4AAE-B7B8-1A4B974075B5}" dt="2021-10-05T19:54:30.854" v="1521" actId="1076"/>
+          <ac:spMkLst>
+            <pc:docMk/>
+            <pc:sldMk cId="2319034473" sldId="270"/>
+            <ac:spMk id="26" creationId="{4A391CBE-D186-4C85-ADC1-2531A4817AE2}"/>
+          </ac:spMkLst>
+        </pc:spChg>
+        <pc:spChg chg="mod">
+          <ac:chgData name="Cynthia Enciso" userId="7915927f-c5cf-4e1f-876d-e79882ad52fa" providerId="ADAL" clId="{D0A459C5-3AF3-4AAE-B7B8-1A4B974075B5}" dt="2021-07-20T22:10:56.182" v="1133" actId="1076"/>
+          <ac:spMkLst>
+            <pc:docMk/>
+            <pc:sldMk cId="2319034473" sldId="270"/>
+            <ac:spMk id="28" creationId="{04696874-734C-45A0-8B96-6178153D5421}"/>
+          </ac:spMkLst>
+        </pc:spChg>
+        <pc:spChg chg="add mod">
+          <ac:chgData name="Cynthia Enciso" userId="7915927f-c5cf-4e1f-876d-e79882ad52fa" providerId="ADAL" clId="{D0A459C5-3AF3-4AAE-B7B8-1A4B974075B5}" dt="2021-08-19T23:51:44.314" v="1277" actId="1076"/>
+          <ac:spMkLst>
+            <pc:docMk/>
+            <pc:sldMk cId="2319034473" sldId="270"/>
+            <ac:spMk id="40" creationId="{E0240F70-73C1-4DDF-BA10-11091D4DD6CD}"/>
+          </ac:spMkLst>
+        </pc:spChg>
+        <pc:spChg chg="add mod">
+          <ac:chgData name="Cynthia Enciso" userId="7915927f-c5cf-4e1f-876d-e79882ad52fa" providerId="ADAL" clId="{D0A459C5-3AF3-4AAE-B7B8-1A4B974075B5}" dt="2021-08-31T19:55:13.466" v="1304" actId="20577"/>
+          <ac:spMkLst>
+            <pc:docMk/>
+            <pc:sldMk cId="2319034473" sldId="270"/>
+            <ac:spMk id="41" creationId="{323DCC40-57EF-429F-9C86-B7BBC6D5A63C}"/>
+          </ac:spMkLst>
+        </pc:spChg>
+        <pc:spChg chg="mod">
+          <ac:chgData name="Cynthia Enciso" userId="7915927f-c5cf-4e1f-876d-e79882ad52fa" providerId="ADAL" clId="{D0A459C5-3AF3-4AAE-B7B8-1A4B974075B5}" dt="2021-10-05T19:58:02.526" v="1560" actId="1076"/>
+          <ac:spMkLst>
+            <pc:docMk/>
+            <pc:sldMk cId="2319034473" sldId="270"/>
+            <ac:spMk id="46" creationId="{78AC57DA-4564-477F-ABD5-9BBA5C7B447E}"/>
+          </ac:spMkLst>
+        </pc:spChg>
+        <pc:spChg chg="mod">
+          <ac:chgData name="Cynthia Enciso" userId="7915927f-c5cf-4e1f-876d-e79882ad52fa" providerId="ADAL" clId="{D0A459C5-3AF3-4AAE-B7B8-1A4B974075B5}" dt="2021-10-05T19:55:12.921" v="1533" actId="1076"/>
+          <ac:spMkLst>
+            <pc:docMk/>
+            <pc:sldMk cId="2319034473" sldId="270"/>
+            <ac:spMk id="47" creationId="{22257AB6-4886-4A01-B622-52869DD54FBE}"/>
+          </ac:spMkLst>
+        </pc:spChg>
+        <pc:spChg chg="mod">
+          <ac:chgData name="Cynthia Enciso" userId="7915927f-c5cf-4e1f-876d-e79882ad52fa" providerId="ADAL" clId="{D0A459C5-3AF3-4AAE-B7B8-1A4B974075B5}" dt="2021-10-05T19:56:43.049" v="1540" actId="1076"/>
+          <ac:spMkLst>
+            <pc:docMk/>
+            <pc:sldMk cId="2319034473" sldId="270"/>
+            <ac:spMk id="48" creationId="{422CDE78-6517-4B9C-A7C5-299176554493}"/>
+          </ac:spMkLst>
+        </pc:spChg>
+        <pc:spChg chg="mod">
+          <ac:chgData name="Cynthia Enciso" userId="7915927f-c5cf-4e1f-876d-e79882ad52fa" providerId="ADAL" clId="{D0A459C5-3AF3-4AAE-B7B8-1A4B974075B5}" dt="2021-10-05T19:54:48.781" v="1525" actId="1076"/>
+          <ac:spMkLst>
+            <pc:docMk/>
+            <pc:sldMk cId="2319034473" sldId="270"/>
+            <ac:spMk id="58" creationId="{2DD44E1C-429E-4847-B9CE-AAEE455A7517}"/>
+          </ac:spMkLst>
+        </pc:spChg>
+        <pc:spChg chg="mod">
+          <ac:chgData name="Cynthia Enciso" userId="7915927f-c5cf-4e1f-876d-e79882ad52fa" providerId="ADAL" clId="{D0A459C5-3AF3-4AAE-B7B8-1A4B974075B5}" dt="2021-10-05T19:54:29.232" v="1520" actId="1076"/>
+          <ac:spMkLst>
+            <pc:docMk/>
+            <pc:sldMk cId="2319034473" sldId="270"/>
+            <ac:spMk id="61" creationId="{6FDCC27E-2658-4A0E-A540-F5B179763DD1}"/>
+          </ac:spMkLst>
+        </pc:spChg>
+        <pc:spChg chg="mod">
+          <ac:chgData name="Cynthia Enciso" userId="7915927f-c5cf-4e1f-876d-e79882ad52fa" providerId="ADAL" clId="{D0A459C5-3AF3-4AAE-B7B8-1A4B974075B5}" dt="2021-10-05T19:54:25.116" v="1518" actId="1076"/>
+          <ac:spMkLst>
+            <pc:docMk/>
+            <pc:sldMk cId="2319034473" sldId="270"/>
+            <ac:spMk id="62" creationId="{5B6DE506-0651-4968-A934-6268655A2FE5}"/>
+          </ac:spMkLst>
+        </pc:spChg>
+        <pc:spChg chg="mod">
+          <ac:chgData name="Cynthia Enciso" userId="7915927f-c5cf-4e1f-876d-e79882ad52fa" providerId="ADAL" clId="{D0A459C5-3AF3-4AAE-B7B8-1A4B974075B5}" dt="2021-10-05T19:54:21.641" v="1516" actId="1076"/>
+          <ac:spMkLst>
+            <pc:docMk/>
+            <pc:sldMk cId="2319034473" sldId="270"/>
+            <ac:spMk id="63" creationId="{23296F60-1876-4084-86AD-2B97DA8E4862}"/>
+          </ac:spMkLst>
+        </pc:spChg>
+        <pc:spChg chg="mod">
+          <ac:chgData name="Cynthia Enciso" userId="7915927f-c5cf-4e1f-876d-e79882ad52fa" providerId="ADAL" clId="{D0A459C5-3AF3-4AAE-B7B8-1A4B974075B5}" dt="2021-10-05T19:54:16.703" v="1513" actId="1076"/>
+          <ac:spMkLst>
+            <pc:docMk/>
+            <pc:sldMk cId="2319034473" sldId="270"/>
+            <ac:spMk id="64" creationId="{C93FF507-BE40-4CB4-98E8-9FE9BFEA565A}"/>
+          </ac:spMkLst>
+        </pc:spChg>
+        <pc:spChg chg="mod">
+          <ac:chgData name="Cynthia Enciso" userId="7915927f-c5cf-4e1f-876d-e79882ad52fa" providerId="ADAL" clId="{D0A459C5-3AF3-4AAE-B7B8-1A4B974075B5}" dt="2021-10-05T19:54:14.705" v="1512" actId="1076"/>
+          <ac:spMkLst>
+            <pc:docMk/>
+            <pc:sldMk cId="2319034473" sldId="270"/>
+            <ac:spMk id="65" creationId="{710CA644-BC30-44EC-A0F5-C005FB78D407}"/>
+          </ac:spMkLst>
+        </pc:spChg>
+        <pc:spChg chg="mod">
+          <ac:chgData name="Cynthia Enciso" userId="7915927f-c5cf-4e1f-876d-e79882ad52fa" providerId="ADAL" clId="{D0A459C5-3AF3-4AAE-B7B8-1A4B974075B5}" dt="2021-10-05T21:15:37.132" v="1744" actId="1076"/>
+          <ac:spMkLst>
+            <pc:docMk/>
+            <pc:sldMk cId="2319034473" sldId="270"/>
+            <ac:spMk id="66" creationId="{F9FA4145-0C58-4D64-94BF-29E8BFC4294A}"/>
+          </ac:spMkLst>
+        </pc:spChg>
+        <pc:spChg chg="add mod">
+          <ac:chgData name="Cynthia Enciso" userId="7915927f-c5cf-4e1f-876d-e79882ad52fa" providerId="ADAL" clId="{D0A459C5-3AF3-4AAE-B7B8-1A4B974075B5}" dt="2021-10-05T21:14:52.977" v="1740" actId="1076"/>
+          <ac:spMkLst>
+            <pc:docMk/>
+            <pc:sldMk cId="2319034473" sldId="270"/>
+            <ac:spMk id="70" creationId="{288F54D5-2E2D-404A-96A8-5D75D6A4A706}"/>
+          </ac:spMkLst>
+        </pc:spChg>
+        <pc:spChg chg="add mod">
+          <ac:chgData name="Cynthia Enciso" userId="7915927f-c5cf-4e1f-876d-e79882ad52fa" providerId="ADAL" clId="{D0A459C5-3AF3-4AAE-B7B8-1A4B974075B5}" dt="2021-10-05T21:14:55.063" v="1741" actId="1076"/>
+          <ac:spMkLst>
+            <pc:docMk/>
+            <pc:sldMk cId="2319034473" sldId="270"/>
+            <ac:spMk id="71" creationId="{9088B752-1ADD-4D92-B947-3C2AD72B0D8A}"/>
+          </ac:spMkLst>
+        </pc:spChg>
+        <pc:spChg chg="add mod">
+          <ac:chgData name="Cynthia Enciso" userId="7915927f-c5cf-4e1f-876d-e79882ad52fa" providerId="ADAL" clId="{D0A459C5-3AF3-4AAE-B7B8-1A4B974075B5}" dt="2021-10-05T21:11:10.570" v="1711" actId="1076"/>
+          <ac:spMkLst>
+            <pc:docMk/>
+            <pc:sldMk cId="2319034473" sldId="270"/>
+            <ac:spMk id="72" creationId="{A362B9BE-2C72-47F7-AAA2-9D2C5EDFC945}"/>
+          </ac:spMkLst>
+        </pc:spChg>
+        <pc:spChg chg="add mod">
+          <ac:chgData name="Cynthia Enciso" userId="7915927f-c5cf-4e1f-876d-e79882ad52fa" providerId="ADAL" clId="{D0A459C5-3AF3-4AAE-B7B8-1A4B974075B5}" dt="2021-10-05T19:56:58.149" v="1546" actId="571"/>
+          <ac:spMkLst>
+            <pc:docMk/>
+            <pc:sldMk cId="2319034473" sldId="270"/>
+            <ac:spMk id="73" creationId="{45299BA5-46A1-4376-9546-82BD03784506}"/>
+          </ac:spMkLst>
+        </pc:spChg>
+        <pc:spChg chg="mod">
+          <ac:chgData name="Cynthia Enciso" userId="7915927f-c5cf-4e1f-876d-e79882ad52fa" providerId="ADAL" clId="{D0A459C5-3AF3-4AAE-B7B8-1A4B974075B5}" dt="2021-10-05T21:13:13.635" v="1723" actId="1076"/>
+          <ac:spMkLst>
+            <pc:docMk/>
+            <pc:sldMk cId="2319034473" sldId="270"/>
+            <ac:spMk id="74" creationId="{214FE5F0-9A8D-48CD-AC53-D057EBEA33B1}"/>
+          </ac:spMkLst>
+        </pc:spChg>
+        <pc:spChg chg="mod">
+          <ac:chgData name="Cynthia Enciso" userId="7915927f-c5cf-4e1f-876d-e79882ad52fa" providerId="ADAL" clId="{D0A459C5-3AF3-4AAE-B7B8-1A4B974075B5}" dt="2021-10-05T21:15:53.711" v="1746" actId="1076"/>
+          <ac:spMkLst>
+            <pc:docMk/>
+            <pc:sldMk cId="2319034473" sldId="270"/>
+            <ac:spMk id="75" creationId="{A04E6601-5C06-4F98-8094-DE356B3A56C4}"/>
+          </ac:spMkLst>
+        </pc:spChg>
+        <pc:spChg chg="mod">
+          <ac:chgData name="Cynthia Enciso" userId="7915927f-c5cf-4e1f-876d-e79882ad52fa" providerId="ADAL" clId="{D0A459C5-3AF3-4AAE-B7B8-1A4B974075B5}" dt="2021-10-05T21:16:03.757" v="1748" actId="1076"/>
+          <ac:spMkLst>
+            <pc:docMk/>
+            <pc:sldMk cId="2319034473" sldId="270"/>
+            <ac:spMk id="76" creationId="{7CACBBEE-2E27-4492-93AA-9A520D16824C}"/>
+          </ac:spMkLst>
+        </pc:spChg>
+        <pc:spChg chg="mod">
+          <ac:chgData name="Cynthia Enciso" userId="7915927f-c5cf-4e1f-876d-e79882ad52fa" providerId="ADAL" clId="{D0A459C5-3AF3-4AAE-B7B8-1A4B974075B5}" dt="2021-10-05T19:56:17.808" v="1537" actId="1076"/>
+          <ac:spMkLst>
+            <pc:docMk/>
+            <pc:sldMk cId="2319034473" sldId="270"/>
+            <ac:spMk id="77" creationId="{8B367CAE-89F6-43C4-9CD9-2A60B983B03A}"/>
+          </ac:spMkLst>
+        </pc:spChg>
+        <pc:spChg chg="mod">
+          <ac:chgData name="Cynthia Enciso" userId="7915927f-c5cf-4e1f-876d-e79882ad52fa" providerId="ADAL" clId="{D0A459C5-3AF3-4AAE-B7B8-1A4B974075B5}" dt="2021-10-05T19:54:36.288" v="1523" actId="1076"/>
+          <ac:spMkLst>
+            <pc:docMk/>
+            <pc:sldMk cId="2319034473" sldId="270"/>
+            <ac:spMk id="78" creationId="{DA0A20DC-8FFE-4E79-BBC7-3F3F027D8C6A}"/>
+          </ac:spMkLst>
+        </pc:spChg>
+        <pc:spChg chg="mod">
+          <ac:chgData name="Cynthia Enciso" userId="7915927f-c5cf-4e1f-876d-e79882ad52fa" providerId="ADAL" clId="{D0A459C5-3AF3-4AAE-B7B8-1A4B974075B5}" dt="2021-10-05T19:54:58.964" v="1528" actId="1076"/>
+          <ac:spMkLst>
+            <pc:docMk/>
+            <pc:sldMk cId="2319034473" sldId="270"/>
+            <ac:spMk id="79" creationId="{B8DC9761-F5DD-437B-9CDC-B68E9C8050D6}"/>
+          </ac:spMkLst>
+        </pc:spChg>
+        <pc:spChg chg="mod">
+          <ac:chgData name="Cynthia Enciso" userId="7915927f-c5cf-4e1f-876d-e79882ad52fa" providerId="ADAL" clId="{D0A459C5-3AF3-4AAE-B7B8-1A4B974075B5}" dt="2021-10-05T19:54:56.465" v="1527" actId="1076"/>
+          <ac:spMkLst>
+            <pc:docMk/>
+            <pc:sldMk cId="2319034473" sldId="270"/>
+            <ac:spMk id="80" creationId="{18EEEC5C-540B-4290-8D78-C577A18F6AB9}"/>
+          </ac:spMkLst>
+        </pc:spChg>
+        <pc:spChg chg="mod">
+          <ac:chgData name="Cynthia Enciso" userId="7915927f-c5cf-4e1f-876d-e79882ad52fa" providerId="ADAL" clId="{D0A459C5-3AF3-4AAE-B7B8-1A4B974075B5}" dt="2021-10-05T19:54:54.163" v="1526" actId="1076"/>
+          <ac:spMkLst>
+            <pc:docMk/>
+            <pc:sldMk cId="2319034473" sldId="270"/>
+            <ac:spMk id="81" creationId="{CB09B3CA-F3C9-4A19-94D8-53EC575C82D2}"/>
+          </ac:spMkLst>
+        </pc:spChg>
+        <pc:spChg chg="add mod">
+          <ac:chgData name="Cynthia Enciso" userId="7915927f-c5cf-4e1f-876d-e79882ad52fa" providerId="ADAL" clId="{D0A459C5-3AF3-4AAE-B7B8-1A4B974075B5}" dt="2021-10-05T19:57:00.884" v="1547" actId="571"/>
+          <ac:spMkLst>
+            <pc:docMk/>
+            <pc:sldMk cId="2319034473" sldId="270"/>
+            <ac:spMk id="82" creationId="{1ECA0DEE-FDE3-4159-A7C5-E484A91680D5}"/>
+          </ac:spMkLst>
+        </pc:spChg>
+        <pc:spChg chg="add mod">
+          <ac:chgData name="Cynthia Enciso" userId="7915927f-c5cf-4e1f-876d-e79882ad52fa" providerId="ADAL" clId="{D0A459C5-3AF3-4AAE-B7B8-1A4B974075B5}" dt="2021-10-05T19:57:03.631" v="1548" actId="571"/>
+          <ac:spMkLst>
+            <pc:docMk/>
+            <pc:sldMk cId="2319034473" sldId="270"/>
+            <ac:spMk id="83" creationId="{C0465FAD-B196-404F-B48D-FA470AB85A04}"/>
+          </ac:spMkLst>
+        </pc:spChg>
+        <pc:spChg chg="add mod">
+          <ac:chgData name="Cynthia Enciso" userId="7915927f-c5cf-4e1f-876d-e79882ad52fa" providerId="ADAL" clId="{D0A459C5-3AF3-4AAE-B7B8-1A4B974075B5}" dt="2021-10-05T19:57:06.127" v="1549" actId="571"/>
+          <ac:spMkLst>
+            <pc:docMk/>
+            <pc:sldMk cId="2319034473" sldId="270"/>
+            <ac:spMk id="84" creationId="{F3FEA792-1F64-4D1D-AA17-4EC94E24D396}"/>
+          </ac:spMkLst>
+        </pc:spChg>
+        <pc:spChg chg="add mod">
+          <ac:chgData name="Cynthia Enciso" userId="7915927f-c5cf-4e1f-876d-e79882ad52fa" providerId="ADAL" clId="{D0A459C5-3AF3-4AAE-B7B8-1A4B974075B5}" dt="2021-10-05T19:57:08.722" v="1550" actId="571"/>
+          <ac:spMkLst>
+            <pc:docMk/>
+            <pc:sldMk cId="2319034473" sldId="270"/>
+            <ac:spMk id="85" creationId="{B1A25B08-C3E6-4044-8913-6FDA3E09EC44}"/>
+          </ac:spMkLst>
+        </pc:spChg>
+        <pc:spChg chg="add mod">
+          <ac:chgData name="Cynthia Enciso" userId="7915927f-c5cf-4e1f-876d-e79882ad52fa" providerId="ADAL" clId="{D0A459C5-3AF3-4AAE-B7B8-1A4B974075B5}" dt="2021-10-05T21:16:01.413" v="1747" actId="1076"/>
+          <ac:spMkLst>
+            <pc:docMk/>
+            <pc:sldMk cId="2319034473" sldId="270"/>
+            <ac:spMk id="86" creationId="{739312CE-7600-496B-8DE7-774BD7FA1D9C}"/>
+          </ac:spMkLst>
+        </pc:spChg>
+        <pc:spChg chg="add mod">
+          <ac:chgData name="Cynthia Enciso" userId="7915927f-c5cf-4e1f-876d-e79882ad52fa" providerId="ADAL" clId="{D0A459C5-3AF3-4AAE-B7B8-1A4B974075B5}" dt="2021-10-05T21:14:36.590" v="1737" actId="1076"/>
+          <ac:spMkLst>
+            <pc:docMk/>
+            <pc:sldMk cId="2319034473" sldId="270"/>
+            <ac:spMk id="87" creationId="{B50954FF-A115-4CE4-A919-8059471AA12C}"/>
+          </ac:spMkLst>
+        </pc:spChg>
+        <pc:spChg chg="add mod">
+          <ac:chgData name="Cynthia Enciso" userId="7915927f-c5cf-4e1f-876d-e79882ad52fa" providerId="ADAL" clId="{D0A459C5-3AF3-4AAE-B7B8-1A4B974075B5}" dt="2021-10-05T19:57:16.801" v="1553" actId="571"/>
+          <ac:spMkLst>
+            <pc:docMk/>
+            <pc:sldMk cId="2319034473" sldId="270"/>
+            <ac:spMk id="88" creationId="{175076FC-73FC-4293-9929-C45667456207}"/>
+          </ac:spMkLst>
+        </pc:spChg>
+        <pc:spChg chg="add mod">
+          <ac:chgData name="Cynthia Enciso" userId="7915927f-c5cf-4e1f-876d-e79882ad52fa" providerId="ADAL" clId="{D0A459C5-3AF3-4AAE-B7B8-1A4B974075B5}" dt="2021-10-05T21:15:50.435" v="1745" actId="1076"/>
+          <ac:spMkLst>
+            <pc:docMk/>
+            <pc:sldMk cId="2319034473" sldId="270"/>
+            <ac:spMk id="89" creationId="{F8E5DDA1-3963-42AD-A499-7B130C0293B9}"/>
+          </ac:spMkLst>
+        </pc:spChg>
+        <pc:spChg chg="add mod">
+          <ac:chgData name="Cynthia Enciso" userId="7915927f-c5cf-4e1f-876d-e79882ad52fa" providerId="ADAL" clId="{D0A459C5-3AF3-4AAE-B7B8-1A4B974075B5}" dt="2021-10-05T19:57:21.812" v="1555" actId="571"/>
+          <ac:spMkLst>
+            <pc:docMk/>
+            <pc:sldMk cId="2319034473" sldId="270"/>
+            <ac:spMk id="90" creationId="{F57717E7-6C12-4A4A-850D-F153CE527EA8}"/>
+          </ac:spMkLst>
+        </pc:spChg>
+        <pc:spChg chg="add mod">
+          <ac:chgData name="Cynthia Enciso" userId="7915927f-c5cf-4e1f-876d-e79882ad52fa" providerId="ADAL" clId="{D0A459C5-3AF3-4AAE-B7B8-1A4B974075B5}" dt="2021-10-05T21:15:34.458" v="1743" actId="1076"/>
+          <ac:spMkLst>
+            <pc:docMk/>
+            <pc:sldMk cId="2319034473" sldId="270"/>
+            <ac:spMk id="91" creationId="{F5EED823-465C-4D16-B7AA-FCF53CE2ADBD}"/>
+          </ac:spMkLst>
+        </pc:spChg>
+        <pc:spChg chg="add mod">
+          <ac:chgData name="Cynthia Enciso" userId="7915927f-c5cf-4e1f-876d-e79882ad52fa" providerId="ADAL" clId="{D0A459C5-3AF3-4AAE-B7B8-1A4B974075B5}" dt="2021-10-05T19:57:26.718" v="1557" actId="571"/>
+          <ac:spMkLst>
+            <pc:docMk/>
+            <pc:sldMk cId="2319034473" sldId="270"/>
+            <ac:spMk id="92" creationId="{937AB026-57B8-432C-BC08-4D1211321063}"/>
+          </ac:spMkLst>
+        </pc:spChg>
+        <pc:spChg chg="add mod">
+          <ac:chgData name="Cynthia Enciso" userId="7915927f-c5cf-4e1f-876d-e79882ad52fa" providerId="ADAL" clId="{D0A459C5-3AF3-4AAE-B7B8-1A4B974075B5}" dt="2021-10-05T19:57:30.841" v="1558" actId="571"/>
+          <ac:spMkLst>
+            <pc:docMk/>
+            <pc:sldMk cId="2319034473" sldId="270"/>
+            <ac:spMk id="93" creationId="{F9C8978D-5981-4092-BC21-3609282E27BA}"/>
+          </ac:spMkLst>
+        </pc:spChg>
+        <pc:spChg chg="add mod">
+          <ac:chgData name="Cynthia Enciso" userId="7915927f-c5cf-4e1f-876d-e79882ad52fa" providerId="ADAL" clId="{D0A459C5-3AF3-4AAE-B7B8-1A4B974075B5}" dt="2021-10-05T21:12:17.965" v="1714" actId="1076"/>
+          <ac:spMkLst>
+            <pc:docMk/>
+            <pc:sldMk cId="2319034473" sldId="270"/>
+            <ac:spMk id="94" creationId="{188A1EFA-CA60-4921-8A6E-B24DEF0D3B33}"/>
+          </ac:spMkLst>
+        </pc:spChg>
+        <pc:spChg chg="add mod">
+          <ac:chgData name="Cynthia Enciso" userId="7915927f-c5cf-4e1f-876d-e79882ad52fa" providerId="ADAL" clId="{D0A459C5-3AF3-4AAE-B7B8-1A4B974075B5}" dt="2021-10-05T21:14:59.095" v="1742" actId="1076"/>
+          <ac:spMkLst>
+            <pc:docMk/>
+            <pc:sldMk cId="2319034473" sldId="270"/>
+            <ac:spMk id="95" creationId="{0586583A-48F3-49F1-A1B5-50CE5A703463}"/>
+          </ac:spMkLst>
+        </pc:spChg>
+        <pc:spChg chg="add mod">
+          <ac:chgData name="Cynthia Enciso" userId="7915927f-c5cf-4e1f-876d-e79882ad52fa" providerId="ADAL" clId="{D0A459C5-3AF3-4AAE-B7B8-1A4B974075B5}" dt="2021-10-05T21:12:45.859" v="1720" actId="571"/>
+          <ac:spMkLst>
+            <pc:docMk/>
+            <pc:sldMk cId="2319034473" sldId="270"/>
+            <ac:spMk id="96" creationId="{3B35119C-2AEC-4F61-B95D-B1617DEE5ECB}"/>
+          </ac:spMkLst>
+        </pc:spChg>
+        <pc:grpChg chg="mod">
+          <ac:chgData name="Cynthia Enciso" userId="7915927f-c5cf-4e1f-876d-e79882ad52fa" providerId="ADAL" clId="{D0A459C5-3AF3-4AAE-B7B8-1A4B974075B5}" dt="2021-10-05T21:14:18.947" v="1734" actId="1076"/>
+          <ac:grpSpMkLst>
+            <pc:docMk/>
+            <pc:sldMk cId="2319034473" sldId="270"/>
+            <ac:grpSpMk id="13" creationId="{8EE14F81-156C-44EF-8168-0112FF2B2C6B}"/>
+          </ac:grpSpMkLst>
+        </pc:grpChg>
+        <pc:grpChg chg="mod">
+          <ac:chgData name="Cynthia Enciso" userId="7915927f-c5cf-4e1f-876d-e79882ad52fa" providerId="ADAL" clId="{D0A459C5-3AF3-4AAE-B7B8-1A4B974075B5}" dt="2021-08-31T21:21:49.045" v="1470" actId="1076"/>
+          <ac:grpSpMkLst>
+            <pc:docMk/>
+            <pc:sldMk cId="2319034473" sldId="270"/>
+            <ac:grpSpMk id="14" creationId="{B7B68B83-B18F-401E-A039-90F649A73943}"/>
+          </ac:grpSpMkLst>
+        </pc:grpChg>
+      </pc:sldChg>
+      <pc:sldChg chg="modSp new del mod ord">
+        <pc:chgData name="Cynthia Enciso" userId="7915927f-c5cf-4e1f-876d-e79882ad52fa" providerId="ADAL" clId="{D0A459C5-3AF3-4AAE-B7B8-1A4B974075B5}" dt="2021-08-31T21:09:52.685" v="1419" actId="47"/>
+        <pc:sldMkLst>
+          <pc:docMk/>
+          <pc:sldMk cId="2044680221" sldId="271"/>
+        </pc:sldMkLst>
+        <pc:spChg chg="mod">
+          <ac:chgData name="Cynthia Enciso" userId="7915927f-c5cf-4e1f-876d-e79882ad52fa" providerId="ADAL" clId="{D0A459C5-3AF3-4AAE-B7B8-1A4B974075B5}" dt="2021-08-31T20:18:47.953" v="1389" actId="20577"/>
+          <ac:spMkLst>
+            <pc:docMk/>
+            <pc:sldMk cId="2044680221" sldId="271"/>
+            <ac:spMk id="2" creationId="{D0ECBF07-878B-443C-89C7-213C9BD2488E}"/>
+          </ac:spMkLst>
+        </pc:spChg>
+        <pc:spChg chg="mod">
+          <ac:chgData name="Cynthia Enciso" userId="7915927f-c5cf-4e1f-876d-e79882ad52fa" providerId="ADAL" clId="{D0A459C5-3AF3-4AAE-B7B8-1A4B974075B5}" dt="2021-08-31T21:05:16.209" v="1418" actId="20577"/>
+          <ac:spMkLst>
+            <pc:docMk/>
+            <pc:sldMk cId="2044680221" sldId="271"/>
+            <ac:spMk id="3" creationId="{368AC1CE-262E-49A4-B3B7-2E59B55C0B60}"/>
+          </ac:spMkLst>
+        </pc:spChg>
+      </pc:sldChg>
+      <pc:sldChg chg="new del">
+        <pc:chgData name="Cynthia Enciso" userId="7915927f-c5cf-4e1f-876d-e79882ad52fa" providerId="ADAL" clId="{D0A459C5-3AF3-4AAE-B7B8-1A4B974075B5}" dt="2021-08-31T20:03:38.297" v="1322" actId="47"/>
+        <pc:sldMkLst>
+          <pc:docMk/>
+          <pc:sldMk cId="2927855542" sldId="271"/>
+        </pc:sldMkLst>
+      </pc:sldChg>
+      <pc:sldChg chg="modSp new del mod ord">
+        <pc:chgData name="Cynthia Enciso" userId="7915927f-c5cf-4e1f-876d-e79882ad52fa" providerId="ADAL" clId="{D0A459C5-3AF3-4AAE-B7B8-1A4B974075B5}" dt="2021-10-05T21:03:44.390" v="1710" actId="47"/>
+        <pc:sldMkLst>
+          <pc:docMk/>
+          <pc:sldMk cId="4243886059" sldId="271"/>
+        </pc:sldMkLst>
+        <pc:spChg chg="mod">
+          <ac:chgData name="Cynthia Enciso" userId="7915927f-c5cf-4e1f-876d-e79882ad52fa" providerId="ADAL" clId="{D0A459C5-3AF3-4AAE-B7B8-1A4B974075B5}" dt="2021-10-05T20:04:31.175" v="1709" actId="20577"/>
+          <ac:spMkLst>
+            <pc:docMk/>
+            <pc:sldMk cId="4243886059" sldId="271"/>
+            <ac:spMk id="3" creationId="{DE2EA8C4-4B62-468C-89F2-79370F22BE29}"/>
+          </ac:spMkLst>
+        </pc:spChg>
+      </pc:sldChg>
+    </pc:docChg>
+  </pc:docChgLst>
+  <pc:docChgLst>
     <pc:chgData name="Cynthia Enciso" userId="7915927f-c5cf-4e1f-876d-e79882ad52fa" providerId="ADAL" clId="{2C75013B-A543-4A75-B33C-C294FBB7600D}"/>
     <pc:docChg chg="custSel addSld delSld modSld sldOrd">
       <pc:chgData name="Cynthia Enciso" userId="7915927f-c5cf-4e1f-876d-e79882ad52fa" providerId="ADAL" clId="{2C75013B-A543-4A75-B33C-C294FBB7600D}" dt="2022-03-09T18:33:46.294" v="701" actId="47"/>
@@ -3711,6 +3174,544 @@
           </pc:sldLayoutMkLst>
         </pc:sldLayoutChg>
       </pc:sldMasterChg>
+    </pc:docChg>
+  </pc:docChgLst>
+  <pc:docChgLst>
+    <pc:chgData name="Cynthia Enciso" userId="7915927f-c5cf-4e1f-876d-e79882ad52fa" providerId="ADAL" clId="{1F755F40-8384-4DF3-BC8E-81F4C89DB039}"/>
+    <pc:docChg chg="undo custSel addSld modSld sldOrd">
+      <pc:chgData name="Cynthia Enciso" userId="7915927f-c5cf-4e1f-876d-e79882ad52fa" providerId="ADAL" clId="{1F755F40-8384-4DF3-BC8E-81F4C89DB039}" dt="2021-04-30T19:58:27.377" v="295" actId="5793"/>
+      <pc:docMkLst>
+        <pc:docMk/>
+      </pc:docMkLst>
+      <pc:sldChg chg="ord">
+        <pc:chgData name="Cynthia Enciso" userId="7915927f-c5cf-4e1f-876d-e79882ad52fa" providerId="ADAL" clId="{1F755F40-8384-4DF3-BC8E-81F4C89DB039}" dt="2021-04-09T14:34:51.351" v="3"/>
+        <pc:sldMkLst>
+          <pc:docMk/>
+          <pc:sldMk cId="3975998382" sldId="257"/>
+        </pc:sldMkLst>
+      </pc:sldChg>
+      <pc:sldChg chg="modSp mod">
+        <pc:chgData name="Cynthia Enciso" userId="7915927f-c5cf-4e1f-876d-e79882ad52fa" providerId="ADAL" clId="{1F755F40-8384-4DF3-BC8E-81F4C89DB039}" dt="2021-04-09T15:51:49.433" v="4" actId="20577"/>
+        <pc:sldMkLst>
+          <pc:docMk/>
+          <pc:sldMk cId="2395134128" sldId="260"/>
+        </pc:sldMkLst>
+        <pc:spChg chg="mod">
+          <ac:chgData name="Cynthia Enciso" userId="7915927f-c5cf-4e1f-876d-e79882ad52fa" providerId="ADAL" clId="{1F755F40-8384-4DF3-BC8E-81F4C89DB039}" dt="2021-04-09T15:51:49.433" v="4" actId="20577"/>
+          <ac:spMkLst>
+            <pc:docMk/>
+            <pc:sldMk cId="2395134128" sldId="260"/>
+            <ac:spMk id="3" creationId="{B7E2A0A5-0527-402A-8E6E-B53D80D33ED9}"/>
+          </ac:spMkLst>
+        </pc:spChg>
+      </pc:sldChg>
+      <pc:sldChg chg="ord">
+        <pc:chgData name="Cynthia Enciso" userId="7915927f-c5cf-4e1f-876d-e79882ad52fa" providerId="ADAL" clId="{1F755F40-8384-4DF3-BC8E-81F4C89DB039}" dt="2021-04-09T14:06:51.498" v="1"/>
+        <pc:sldMkLst>
+          <pc:docMk/>
+          <pc:sldMk cId="2787524733" sldId="262"/>
+        </pc:sldMkLst>
+      </pc:sldChg>
+      <pc:sldChg chg="modSp mod">
+        <pc:chgData name="Cynthia Enciso" userId="7915927f-c5cf-4e1f-876d-e79882ad52fa" providerId="ADAL" clId="{1F755F40-8384-4DF3-BC8E-81F4C89DB039}" dt="2021-04-20T19:57:58.337" v="227" actId="27636"/>
+        <pc:sldMkLst>
+          <pc:docMk/>
+          <pc:sldMk cId="388207083" sldId="264"/>
+        </pc:sldMkLst>
+        <pc:spChg chg="mod">
+          <ac:chgData name="Cynthia Enciso" userId="7915927f-c5cf-4e1f-876d-e79882ad52fa" providerId="ADAL" clId="{1F755F40-8384-4DF3-BC8E-81F4C89DB039}" dt="2021-04-20T19:57:58.337" v="227" actId="27636"/>
+          <ac:spMkLst>
+            <pc:docMk/>
+            <pc:sldMk cId="388207083" sldId="264"/>
+            <ac:spMk id="3" creationId="{39248842-1B3D-406C-952C-0E1D3252B26A}"/>
+          </ac:spMkLst>
+        </pc:spChg>
+      </pc:sldChg>
+      <pc:sldChg chg="ord">
+        <pc:chgData name="Cynthia Enciso" userId="7915927f-c5cf-4e1f-876d-e79882ad52fa" providerId="ADAL" clId="{1F755F40-8384-4DF3-BC8E-81F4C89DB039}" dt="2021-04-30T18:56:11.011" v="292"/>
+        <pc:sldMkLst>
+          <pc:docMk/>
+          <pc:sldMk cId="2963993193" sldId="265"/>
+        </pc:sldMkLst>
+      </pc:sldChg>
+      <pc:sldChg chg="modSp mod">
+        <pc:chgData name="Cynthia Enciso" userId="7915927f-c5cf-4e1f-876d-e79882ad52fa" providerId="ADAL" clId="{1F755F40-8384-4DF3-BC8E-81F4C89DB039}" dt="2021-04-30T19:58:27.377" v="295" actId="5793"/>
+        <pc:sldMkLst>
+          <pc:docMk/>
+          <pc:sldMk cId="2947364483" sldId="266"/>
+        </pc:sldMkLst>
+        <pc:spChg chg="mod">
+          <ac:chgData name="Cynthia Enciso" userId="7915927f-c5cf-4e1f-876d-e79882ad52fa" providerId="ADAL" clId="{1F755F40-8384-4DF3-BC8E-81F4C89DB039}" dt="2021-04-30T19:58:27.377" v="295" actId="5793"/>
+          <ac:spMkLst>
+            <pc:docMk/>
+            <pc:sldMk cId="2947364483" sldId="266"/>
+            <ac:spMk id="3" creationId="{CB32FB06-A08B-4515-93A9-E52C46989F3E}"/>
+          </ac:spMkLst>
+        </pc:spChg>
+      </pc:sldChg>
+      <pc:sldChg chg="addSp delSp modSp new mod">
+        <pc:chgData name="Cynthia Enciso" userId="7915927f-c5cf-4e1f-876d-e79882ad52fa" providerId="ADAL" clId="{1F755F40-8384-4DF3-BC8E-81F4C89DB039}" dt="2021-04-20T21:13:18.028" v="290" actId="1076"/>
+        <pc:sldMkLst>
+          <pc:docMk/>
+          <pc:sldMk cId="2319034473" sldId="270"/>
+        </pc:sldMkLst>
+        <pc:spChg chg="mod">
+          <ac:chgData name="Cynthia Enciso" userId="7915927f-c5cf-4e1f-876d-e79882ad52fa" providerId="ADAL" clId="{1F755F40-8384-4DF3-BC8E-81F4C89DB039}" dt="2021-04-20T16:21:20.906" v="213" actId="20577"/>
+          <ac:spMkLst>
+            <pc:docMk/>
+            <pc:sldMk cId="2319034473" sldId="270"/>
+            <ac:spMk id="2" creationId="{7A6C02CB-99CF-48EE-8285-0E5A3B8E8977}"/>
+          </ac:spMkLst>
+        </pc:spChg>
+        <pc:spChg chg="del">
+          <ac:chgData name="Cynthia Enciso" userId="7915927f-c5cf-4e1f-876d-e79882ad52fa" providerId="ADAL" clId="{1F755F40-8384-4DF3-BC8E-81F4C89DB039}" dt="2021-04-20T16:09:47.506" v="6" actId="478"/>
+          <ac:spMkLst>
+            <pc:docMk/>
+            <pc:sldMk cId="2319034473" sldId="270"/>
+            <ac:spMk id="3" creationId="{AB4D0F29-14C9-4AC3-B89C-BC5BE5172E87}"/>
+          </ac:spMkLst>
+        </pc:spChg>
+        <pc:spChg chg="add mod">
+          <ac:chgData name="Cynthia Enciso" userId="7915927f-c5cf-4e1f-876d-e79882ad52fa" providerId="ADAL" clId="{1F755F40-8384-4DF3-BC8E-81F4C89DB039}" dt="2021-04-20T16:10:48.667" v="29" actId="164"/>
+          <ac:spMkLst>
+            <pc:docMk/>
+            <pc:sldMk cId="2319034473" sldId="270"/>
+            <ac:spMk id="5" creationId="{E7E7A6F9-54DD-4B2B-80A5-DC5C0CBAF327}"/>
+          </ac:spMkLst>
+        </pc:spChg>
+        <pc:spChg chg="add mod">
+          <ac:chgData name="Cynthia Enciso" userId="7915927f-c5cf-4e1f-876d-e79882ad52fa" providerId="ADAL" clId="{1F755F40-8384-4DF3-BC8E-81F4C89DB039}" dt="2021-04-20T16:10:48.667" v="29" actId="164"/>
+          <ac:spMkLst>
+            <pc:docMk/>
+            <pc:sldMk cId="2319034473" sldId="270"/>
+            <ac:spMk id="6" creationId="{FDA43BF2-A19F-4610-BFA7-07483FC470E9}"/>
+          </ac:spMkLst>
+        </pc:spChg>
+        <pc:spChg chg="add mod">
+          <ac:chgData name="Cynthia Enciso" userId="7915927f-c5cf-4e1f-876d-e79882ad52fa" providerId="ADAL" clId="{1F755F40-8384-4DF3-BC8E-81F4C89DB039}" dt="2021-04-20T16:10:48.667" v="29" actId="164"/>
+          <ac:spMkLst>
+            <pc:docMk/>
+            <pc:sldMk cId="2319034473" sldId="270"/>
+            <ac:spMk id="7" creationId="{B00DFD34-4858-4F6A-8CDF-EE852DDAC9EC}"/>
+          </ac:spMkLst>
+        </pc:spChg>
+        <pc:spChg chg="add mod">
+          <ac:chgData name="Cynthia Enciso" userId="7915927f-c5cf-4e1f-876d-e79882ad52fa" providerId="ADAL" clId="{1F755F40-8384-4DF3-BC8E-81F4C89DB039}" dt="2021-04-20T16:10:48.667" v="29" actId="164"/>
+          <ac:spMkLst>
+            <pc:docMk/>
+            <pc:sldMk cId="2319034473" sldId="270"/>
+            <ac:spMk id="8" creationId="{7BA2F08D-545B-48ED-BAFA-0ED5845959D8}"/>
+          </ac:spMkLst>
+        </pc:spChg>
+        <pc:spChg chg="add mod">
+          <ac:chgData name="Cynthia Enciso" userId="7915927f-c5cf-4e1f-876d-e79882ad52fa" providerId="ADAL" clId="{1F755F40-8384-4DF3-BC8E-81F4C89DB039}" dt="2021-04-20T16:10:48.667" v="29" actId="164"/>
+          <ac:spMkLst>
+            <pc:docMk/>
+            <pc:sldMk cId="2319034473" sldId="270"/>
+            <ac:spMk id="9" creationId="{248FF0C6-F6E1-4AC3-BA22-EEDD3000DD23}"/>
+          </ac:spMkLst>
+        </pc:spChg>
+        <pc:spChg chg="add mod">
+          <ac:chgData name="Cynthia Enciso" userId="7915927f-c5cf-4e1f-876d-e79882ad52fa" providerId="ADAL" clId="{1F755F40-8384-4DF3-BC8E-81F4C89DB039}" dt="2021-04-20T16:10:48.667" v="29" actId="164"/>
+          <ac:spMkLst>
+            <pc:docMk/>
+            <pc:sldMk cId="2319034473" sldId="270"/>
+            <ac:spMk id="10" creationId="{5616A998-6A45-4B04-A27B-7991F52B46EE}"/>
+          </ac:spMkLst>
+        </pc:spChg>
+        <pc:spChg chg="add mod">
+          <ac:chgData name="Cynthia Enciso" userId="7915927f-c5cf-4e1f-876d-e79882ad52fa" providerId="ADAL" clId="{1F755F40-8384-4DF3-BC8E-81F4C89DB039}" dt="2021-04-20T16:10:48.667" v="29" actId="164"/>
+          <ac:spMkLst>
+            <pc:docMk/>
+            <pc:sldMk cId="2319034473" sldId="270"/>
+            <ac:spMk id="11" creationId="{682CA5B0-4782-4A78-9F41-EACB8A9A98CC}"/>
+          </ac:spMkLst>
+        </pc:spChg>
+        <pc:spChg chg="add mod">
+          <ac:chgData name="Cynthia Enciso" userId="7915927f-c5cf-4e1f-876d-e79882ad52fa" providerId="ADAL" clId="{1F755F40-8384-4DF3-BC8E-81F4C89DB039}" dt="2021-04-20T16:10:48.667" v="29" actId="164"/>
+          <ac:spMkLst>
+            <pc:docMk/>
+            <pc:sldMk cId="2319034473" sldId="270"/>
+            <ac:spMk id="12" creationId="{2CE55E90-5B7A-4C50-8A96-1047A91BE38D}"/>
+          </ac:spMkLst>
+        </pc:spChg>
+        <pc:spChg chg="mod">
+          <ac:chgData name="Cynthia Enciso" userId="7915927f-c5cf-4e1f-876d-e79882ad52fa" providerId="ADAL" clId="{1F755F40-8384-4DF3-BC8E-81F4C89DB039}" dt="2021-04-20T16:10:50.548" v="30"/>
+          <ac:spMkLst>
+            <pc:docMk/>
+            <pc:sldMk cId="2319034473" sldId="270"/>
+            <ac:spMk id="15" creationId="{5C8DA70F-0E78-482C-A9C7-71555F470A19}"/>
+          </ac:spMkLst>
+        </pc:spChg>
+        <pc:spChg chg="mod">
+          <ac:chgData name="Cynthia Enciso" userId="7915927f-c5cf-4e1f-876d-e79882ad52fa" providerId="ADAL" clId="{1F755F40-8384-4DF3-BC8E-81F4C89DB039}" dt="2021-04-20T16:10:50.548" v="30"/>
+          <ac:spMkLst>
+            <pc:docMk/>
+            <pc:sldMk cId="2319034473" sldId="270"/>
+            <ac:spMk id="16" creationId="{23006936-14D3-496E-935F-18FBCE3116B3}"/>
+          </ac:spMkLst>
+        </pc:spChg>
+        <pc:spChg chg="mod">
+          <ac:chgData name="Cynthia Enciso" userId="7915927f-c5cf-4e1f-876d-e79882ad52fa" providerId="ADAL" clId="{1F755F40-8384-4DF3-BC8E-81F4C89DB039}" dt="2021-04-20T16:10:50.548" v="30"/>
+          <ac:spMkLst>
+            <pc:docMk/>
+            <pc:sldMk cId="2319034473" sldId="270"/>
+            <ac:spMk id="17" creationId="{CC1C5A42-B626-436B-8C3D-DAEB83F98352}"/>
+          </ac:spMkLst>
+        </pc:spChg>
+        <pc:spChg chg="mod">
+          <ac:chgData name="Cynthia Enciso" userId="7915927f-c5cf-4e1f-876d-e79882ad52fa" providerId="ADAL" clId="{1F755F40-8384-4DF3-BC8E-81F4C89DB039}" dt="2021-04-20T16:10:50.548" v="30"/>
+          <ac:spMkLst>
+            <pc:docMk/>
+            <pc:sldMk cId="2319034473" sldId="270"/>
+            <ac:spMk id="18" creationId="{832C1753-AB37-44F6-A1F0-C097DF3C00C4}"/>
+          </ac:spMkLst>
+        </pc:spChg>
+        <pc:spChg chg="mod">
+          <ac:chgData name="Cynthia Enciso" userId="7915927f-c5cf-4e1f-876d-e79882ad52fa" providerId="ADAL" clId="{1F755F40-8384-4DF3-BC8E-81F4C89DB039}" dt="2021-04-20T16:10:50.548" v="30"/>
+          <ac:spMkLst>
+            <pc:docMk/>
+            <pc:sldMk cId="2319034473" sldId="270"/>
+            <ac:spMk id="19" creationId="{F1435748-FD7A-4B5A-BC4A-B4364B6F31FC}"/>
+          </ac:spMkLst>
+        </pc:spChg>
+        <pc:spChg chg="mod">
+          <ac:chgData name="Cynthia Enciso" userId="7915927f-c5cf-4e1f-876d-e79882ad52fa" providerId="ADAL" clId="{1F755F40-8384-4DF3-BC8E-81F4C89DB039}" dt="2021-04-20T16:10:50.548" v="30"/>
+          <ac:spMkLst>
+            <pc:docMk/>
+            <pc:sldMk cId="2319034473" sldId="270"/>
+            <ac:spMk id="20" creationId="{695B521F-C80C-4437-91CA-747D320E4B99}"/>
+          </ac:spMkLst>
+        </pc:spChg>
+        <pc:spChg chg="mod">
+          <ac:chgData name="Cynthia Enciso" userId="7915927f-c5cf-4e1f-876d-e79882ad52fa" providerId="ADAL" clId="{1F755F40-8384-4DF3-BC8E-81F4C89DB039}" dt="2021-04-20T16:10:50.548" v="30"/>
+          <ac:spMkLst>
+            <pc:docMk/>
+            <pc:sldMk cId="2319034473" sldId="270"/>
+            <ac:spMk id="21" creationId="{86E3FDFA-8553-4761-ACB5-F43E78A88FFE}"/>
+          </ac:spMkLst>
+        </pc:spChg>
+        <pc:spChg chg="mod">
+          <ac:chgData name="Cynthia Enciso" userId="7915927f-c5cf-4e1f-876d-e79882ad52fa" providerId="ADAL" clId="{1F755F40-8384-4DF3-BC8E-81F4C89DB039}" dt="2021-04-20T16:10:50.548" v="30"/>
+          <ac:spMkLst>
+            <pc:docMk/>
+            <pc:sldMk cId="2319034473" sldId="270"/>
+            <ac:spMk id="22" creationId="{87BF851F-DDC2-4B1F-9D36-0A2F8D5E27B1}"/>
+          </ac:spMkLst>
+        </pc:spChg>
+        <pc:spChg chg="add mod">
+          <ac:chgData name="Cynthia Enciso" userId="7915927f-c5cf-4e1f-876d-e79882ad52fa" providerId="ADAL" clId="{1F755F40-8384-4DF3-BC8E-81F4C89DB039}" dt="2021-04-20T16:19:37.083" v="158" actId="1076"/>
+          <ac:spMkLst>
+            <pc:docMk/>
+            <pc:sldMk cId="2319034473" sldId="270"/>
+            <ac:spMk id="23" creationId="{50A8566E-464E-4175-929B-52776DC40130}"/>
+          </ac:spMkLst>
+        </pc:spChg>
+        <pc:spChg chg="add del mod">
+          <ac:chgData name="Cynthia Enciso" userId="7915927f-c5cf-4e1f-876d-e79882ad52fa" providerId="ADAL" clId="{1F755F40-8384-4DF3-BC8E-81F4C89DB039}" dt="2021-04-20T20:45:38.498" v="259" actId="1076"/>
+          <ac:spMkLst>
+            <pc:docMk/>
+            <pc:sldMk cId="2319034473" sldId="270"/>
+            <ac:spMk id="24" creationId="{CAE4C87F-26F4-42CB-A15A-EC1B0740F61B}"/>
+          </ac:spMkLst>
+        </pc:spChg>
+        <pc:spChg chg="add mod topLvl">
+          <ac:chgData name="Cynthia Enciso" userId="7915927f-c5cf-4e1f-876d-e79882ad52fa" providerId="ADAL" clId="{1F755F40-8384-4DF3-BC8E-81F4C89DB039}" dt="2021-04-20T21:12:29.353" v="282" actId="1076"/>
+          <ac:spMkLst>
+            <pc:docMk/>
+            <pc:sldMk cId="2319034473" sldId="270"/>
+            <ac:spMk id="25" creationId="{FA60DBC5-F9CE-4350-8164-A7C3651B806F}"/>
+          </ac:spMkLst>
+        </pc:spChg>
+        <pc:spChg chg="add mod topLvl">
+          <ac:chgData name="Cynthia Enciso" userId="7915927f-c5cf-4e1f-876d-e79882ad52fa" providerId="ADAL" clId="{1F755F40-8384-4DF3-BC8E-81F4C89DB039}" dt="2021-04-20T21:12:31.930" v="283" actId="1076"/>
+          <ac:spMkLst>
+            <pc:docMk/>
+            <pc:sldMk cId="2319034473" sldId="270"/>
+            <ac:spMk id="26" creationId="{4A391CBE-D186-4C85-ADC1-2531A4817AE2}"/>
+          </ac:spMkLst>
+        </pc:spChg>
+        <pc:spChg chg="add mod">
+          <ac:chgData name="Cynthia Enciso" userId="7915927f-c5cf-4e1f-876d-e79882ad52fa" providerId="ADAL" clId="{1F755F40-8384-4DF3-BC8E-81F4C89DB039}" dt="2021-04-20T21:13:08.947" v="288" actId="1076"/>
+          <ac:spMkLst>
+            <pc:docMk/>
+            <pc:sldMk cId="2319034473" sldId="270"/>
+            <ac:spMk id="27" creationId="{DCEF357D-D40C-4FC9-8906-A5F626378C4A}"/>
+          </ac:spMkLst>
+        </pc:spChg>
+        <pc:spChg chg="add mod">
+          <ac:chgData name="Cynthia Enciso" userId="7915927f-c5cf-4e1f-876d-e79882ad52fa" providerId="ADAL" clId="{1F755F40-8384-4DF3-BC8E-81F4C89DB039}" dt="2021-04-20T16:14:53.746" v="77" actId="20577"/>
+          <ac:spMkLst>
+            <pc:docMk/>
+            <pc:sldMk cId="2319034473" sldId="270"/>
+            <ac:spMk id="28" creationId="{04696874-734C-45A0-8B96-6178153D5421}"/>
+          </ac:spMkLst>
+        </pc:spChg>
+        <pc:spChg chg="add mod">
+          <ac:chgData name="Cynthia Enciso" userId="7915927f-c5cf-4e1f-876d-e79882ad52fa" providerId="ADAL" clId="{1F755F40-8384-4DF3-BC8E-81F4C89DB039}" dt="2021-04-20T16:13:45.936" v="68" actId="1076"/>
+          <ac:spMkLst>
+            <pc:docMk/>
+            <pc:sldMk cId="2319034473" sldId="270"/>
+            <ac:spMk id="29" creationId="{69B467FF-4AEA-4F8C-96DF-D80E013851FB}"/>
+          </ac:spMkLst>
+        </pc:spChg>
+        <pc:spChg chg="add mod">
+          <ac:chgData name="Cynthia Enciso" userId="7915927f-c5cf-4e1f-876d-e79882ad52fa" providerId="ADAL" clId="{1F755F40-8384-4DF3-BC8E-81F4C89DB039}" dt="2021-04-20T16:14:34.947" v="76" actId="20577"/>
+          <ac:spMkLst>
+            <pc:docMk/>
+            <pc:sldMk cId="2319034473" sldId="270"/>
+            <ac:spMk id="30" creationId="{9097D6B3-F940-416C-9CA9-BD5E07E98E0C}"/>
+          </ac:spMkLst>
+        </pc:spChg>
+        <pc:spChg chg="add mod">
+          <ac:chgData name="Cynthia Enciso" userId="7915927f-c5cf-4e1f-876d-e79882ad52fa" providerId="ADAL" clId="{1F755F40-8384-4DF3-BC8E-81F4C89DB039}" dt="2021-04-20T16:15:06.355" v="80" actId="20577"/>
+          <ac:spMkLst>
+            <pc:docMk/>
+            <pc:sldMk cId="2319034473" sldId="270"/>
+            <ac:spMk id="31" creationId="{8FCCA1C7-E13E-410B-8BC6-E6DCD0DBA58A}"/>
+          </ac:spMkLst>
+        </pc:spChg>
+        <pc:spChg chg="add mod">
+          <ac:chgData name="Cynthia Enciso" userId="7915927f-c5cf-4e1f-876d-e79882ad52fa" providerId="ADAL" clId="{1F755F40-8384-4DF3-BC8E-81F4C89DB039}" dt="2021-04-20T16:16:42.803" v="119" actId="1076"/>
+          <ac:spMkLst>
+            <pc:docMk/>
+            <pc:sldMk cId="2319034473" sldId="270"/>
+            <ac:spMk id="32" creationId="{D67BDD0B-3B9A-41D6-BC66-23E00667AE74}"/>
+          </ac:spMkLst>
+        </pc:spChg>
+        <pc:spChg chg="add mod">
+          <ac:chgData name="Cynthia Enciso" userId="7915927f-c5cf-4e1f-876d-e79882ad52fa" providerId="ADAL" clId="{1F755F40-8384-4DF3-BC8E-81F4C89DB039}" dt="2021-04-20T16:16:40.813" v="118" actId="1076"/>
+          <ac:spMkLst>
+            <pc:docMk/>
+            <pc:sldMk cId="2319034473" sldId="270"/>
+            <ac:spMk id="33" creationId="{010336E1-DD57-4EE8-92AC-EE5AC524A058}"/>
+          </ac:spMkLst>
+        </pc:spChg>
+        <pc:spChg chg="add mod">
+          <ac:chgData name="Cynthia Enciso" userId="7915927f-c5cf-4e1f-876d-e79882ad52fa" providerId="ADAL" clId="{1F755F40-8384-4DF3-BC8E-81F4C89DB039}" dt="2021-04-20T16:16:38.097" v="117" actId="1076"/>
+          <ac:spMkLst>
+            <pc:docMk/>
+            <pc:sldMk cId="2319034473" sldId="270"/>
+            <ac:spMk id="34" creationId="{AFDE4497-014D-4CE0-86CB-D2027D70186C}"/>
+          </ac:spMkLst>
+        </pc:spChg>
+        <pc:spChg chg="add mod">
+          <ac:chgData name="Cynthia Enciso" userId="7915927f-c5cf-4e1f-876d-e79882ad52fa" providerId="ADAL" clId="{1F755F40-8384-4DF3-BC8E-81F4C89DB039}" dt="2021-04-20T16:15:40.529" v="99" actId="14100"/>
+          <ac:spMkLst>
+            <pc:docMk/>
+            <pc:sldMk cId="2319034473" sldId="270"/>
+            <ac:spMk id="35" creationId="{0C66319D-E1BD-4078-9D7E-585F5431E9D3}"/>
+          </ac:spMkLst>
+        </pc:spChg>
+        <pc:spChg chg="add mod">
+          <ac:chgData name="Cynthia Enciso" userId="7915927f-c5cf-4e1f-876d-e79882ad52fa" providerId="ADAL" clId="{1F755F40-8384-4DF3-BC8E-81F4C89DB039}" dt="2021-04-20T16:16:06.076" v="103" actId="1076"/>
+          <ac:spMkLst>
+            <pc:docMk/>
+            <pc:sldMk cId="2319034473" sldId="270"/>
+            <ac:spMk id="36" creationId="{14ED6CB2-B815-405A-893F-2E09669F4ED1}"/>
+          </ac:spMkLst>
+        </pc:spChg>
+        <pc:spChg chg="add mod">
+          <ac:chgData name="Cynthia Enciso" userId="7915927f-c5cf-4e1f-876d-e79882ad52fa" providerId="ADAL" clId="{1F755F40-8384-4DF3-BC8E-81F4C89DB039}" dt="2021-04-20T16:16:12.221" v="106" actId="20577"/>
+          <ac:spMkLst>
+            <pc:docMk/>
+            <pc:sldMk cId="2319034473" sldId="270"/>
+            <ac:spMk id="37" creationId="{F11C3C7B-17FD-45B2-A5BE-84A4B0493943}"/>
+          </ac:spMkLst>
+        </pc:spChg>
+        <pc:spChg chg="add mod">
+          <ac:chgData name="Cynthia Enciso" userId="7915927f-c5cf-4e1f-876d-e79882ad52fa" providerId="ADAL" clId="{1F755F40-8384-4DF3-BC8E-81F4C89DB039}" dt="2021-04-20T16:16:19.715" v="110" actId="14100"/>
+          <ac:spMkLst>
+            <pc:docMk/>
+            <pc:sldMk cId="2319034473" sldId="270"/>
+            <ac:spMk id="38" creationId="{D8A391B7-0A4A-4159-AF25-65A3428AE353}"/>
+          </ac:spMkLst>
+        </pc:spChg>
+        <pc:spChg chg="add mod">
+          <ac:chgData name="Cynthia Enciso" userId="7915927f-c5cf-4e1f-876d-e79882ad52fa" providerId="ADAL" clId="{1F755F40-8384-4DF3-BC8E-81F4C89DB039}" dt="2021-04-20T16:16:32.275" v="116" actId="1076"/>
+          <ac:spMkLst>
+            <pc:docMk/>
+            <pc:sldMk cId="2319034473" sldId="270"/>
+            <ac:spMk id="39" creationId="{47BC0A6B-4127-4F75-AA01-6FC23BE5AC25}"/>
+          </ac:spMkLst>
+        </pc:spChg>
+        <pc:spChg chg="add mod">
+          <ac:chgData name="Cynthia Enciso" userId="7915927f-c5cf-4e1f-876d-e79882ad52fa" providerId="ADAL" clId="{1F755F40-8384-4DF3-BC8E-81F4C89DB039}" dt="2021-04-20T21:13:00.578" v="286" actId="1076"/>
+          <ac:spMkLst>
+            <pc:docMk/>
+            <pc:sldMk cId="2319034473" sldId="270"/>
+            <ac:spMk id="40" creationId="{00693D47-F81C-4B47-ACF2-E4A14E388C56}"/>
+          </ac:spMkLst>
+        </pc:spChg>
+        <pc:spChg chg="add mod">
+          <ac:chgData name="Cynthia Enciso" userId="7915927f-c5cf-4e1f-876d-e79882ad52fa" providerId="ADAL" clId="{1F755F40-8384-4DF3-BC8E-81F4C89DB039}" dt="2021-04-20T21:12:50.486" v="285" actId="1076"/>
+          <ac:spMkLst>
+            <pc:docMk/>
+            <pc:sldMk cId="2319034473" sldId="270"/>
+            <ac:spMk id="41" creationId="{D25A5204-58E0-4B55-B96D-4FD974BD472F}"/>
+          </ac:spMkLst>
+        </pc:spChg>
+        <pc:spChg chg="add mod">
+          <ac:chgData name="Cynthia Enciso" userId="7915927f-c5cf-4e1f-876d-e79882ad52fa" providerId="ADAL" clId="{1F755F40-8384-4DF3-BC8E-81F4C89DB039}" dt="2021-04-20T21:13:15.333" v="289" actId="1076"/>
+          <ac:spMkLst>
+            <pc:docMk/>
+            <pc:sldMk cId="2319034473" sldId="270"/>
+            <ac:spMk id="42" creationId="{EF4E2520-5747-436B-970D-758E4C9F6417}"/>
+          </ac:spMkLst>
+        </pc:spChg>
+        <pc:spChg chg="add mod">
+          <ac:chgData name="Cynthia Enciso" userId="7915927f-c5cf-4e1f-876d-e79882ad52fa" providerId="ADAL" clId="{1F755F40-8384-4DF3-BC8E-81F4C89DB039}" dt="2021-04-20T21:13:04.028" v="287" actId="1076"/>
+          <ac:spMkLst>
+            <pc:docMk/>
+            <pc:sldMk cId="2319034473" sldId="270"/>
+            <ac:spMk id="43" creationId="{EB67F3F7-0318-4D92-870C-0852261C6830}"/>
+          </ac:spMkLst>
+        </pc:spChg>
+        <pc:spChg chg="add mod">
+          <ac:chgData name="Cynthia Enciso" userId="7915927f-c5cf-4e1f-876d-e79882ad52fa" providerId="ADAL" clId="{1F755F40-8384-4DF3-BC8E-81F4C89DB039}" dt="2021-04-20T21:13:18.028" v="290" actId="1076"/>
+          <ac:spMkLst>
+            <pc:docMk/>
+            <pc:sldMk cId="2319034473" sldId="270"/>
+            <ac:spMk id="44" creationId="{23850915-FAEA-4BB4-92C3-6FF1A647B710}"/>
+          </ac:spMkLst>
+        </pc:spChg>
+        <pc:spChg chg="add mod">
+          <ac:chgData name="Cynthia Enciso" userId="7915927f-c5cf-4e1f-876d-e79882ad52fa" providerId="ADAL" clId="{1F755F40-8384-4DF3-BC8E-81F4C89DB039}" dt="2021-04-20T21:11:30.677" v="265" actId="1076"/>
+          <ac:spMkLst>
+            <pc:docMk/>
+            <pc:sldMk cId="2319034473" sldId="270"/>
+            <ac:spMk id="46" creationId="{78AC57DA-4564-477F-ABD5-9BBA5C7B447E}"/>
+          </ac:spMkLst>
+        </pc:spChg>
+        <pc:spChg chg="add mod">
+          <ac:chgData name="Cynthia Enciso" userId="7915927f-c5cf-4e1f-876d-e79882ad52fa" providerId="ADAL" clId="{1F755F40-8384-4DF3-BC8E-81F4C89DB039}" dt="2021-04-20T21:11:41.616" v="268" actId="1076"/>
+          <ac:spMkLst>
+            <pc:docMk/>
+            <pc:sldMk cId="2319034473" sldId="270"/>
+            <ac:spMk id="47" creationId="{22257AB6-4886-4A01-B622-52869DD54FBE}"/>
+          </ac:spMkLst>
+        </pc:spChg>
+        <pc:spChg chg="add mod">
+          <ac:chgData name="Cynthia Enciso" userId="7915927f-c5cf-4e1f-876d-e79882ad52fa" providerId="ADAL" clId="{1F755F40-8384-4DF3-BC8E-81F4C89DB039}" dt="2021-04-20T21:11:43.845" v="269" actId="1076"/>
+          <ac:spMkLst>
+            <pc:docMk/>
+            <pc:sldMk cId="2319034473" sldId="270"/>
+            <ac:spMk id="48" creationId="{422CDE78-6517-4B9C-A7C5-299176554493}"/>
+          </ac:spMkLst>
+        </pc:spChg>
+        <pc:spChg chg="add mod">
+          <ac:chgData name="Cynthia Enciso" userId="7915927f-c5cf-4e1f-876d-e79882ad52fa" providerId="ADAL" clId="{1F755F40-8384-4DF3-BC8E-81F4C89DB039}" dt="2021-04-20T16:19:45.210" v="162" actId="20577"/>
+          <ac:spMkLst>
+            <pc:docMk/>
+            <pc:sldMk cId="2319034473" sldId="270"/>
+            <ac:spMk id="49" creationId="{D02174F6-773C-4964-9C33-5A1786A2B287}"/>
+          </ac:spMkLst>
+        </pc:spChg>
+        <pc:spChg chg="add mod">
+          <ac:chgData name="Cynthia Enciso" userId="7915927f-c5cf-4e1f-876d-e79882ad52fa" providerId="ADAL" clId="{1F755F40-8384-4DF3-BC8E-81F4C89DB039}" dt="2021-04-20T16:19:52.394" v="166" actId="20577"/>
+          <ac:spMkLst>
+            <pc:docMk/>
+            <pc:sldMk cId="2319034473" sldId="270"/>
+            <ac:spMk id="50" creationId="{4CA4759D-2105-461A-AB29-40C29843E784}"/>
+          </ac:spMkLst>
+        </pc:spChg>
+        <pc:spChg chg="add mod">
+          <ac:chgData name="Cynthia Enciso" userId="7915927f-c5cf-4e1f-876d-e79882ad52fa" providerId="ADAL" clId="{1F755F40-8384-4DF3-BC8E-81F4C89DB039}" dt="2021-04-20T16:20:02.311" v="170" actId="20577"/>
+          <ac:spMkLst>
+            <pc:docMk/>
+            <pc:sldMk cId="2319034473" sldId="270"/>
+            <ac:spMk id="51" creationId="{D3EC7252-E05A-441E-B252-E7B89A1AB381}"/>
+          </ac:spMkLst>
+        </pc:spChg>
+        <pc:spChg chg="add mod">
+          <ac:chgData name="Cynthia Enciso" userId="7915927f-c5cf-4e1f-876d-e79882ad52fa" providerId="ADAL" clId="{1F755F40-8384-4DF3-BC8E-81F4C89DB039}" dt="2021-04-20T19:51:09.768" v="218"/>
+          <ac:spMkLst>
+            <pc:docMk/>
+            <pc:sldMk cId="2319034473" sldId="270"/>
+            <ac:spMk id="52" creationId="{C1C486CD-3F79-4FA0-83F1-8F058D27516A}"/>
+          </ac:spMkLst>
+        </pc:spChg>
+        <pc:spChg chg="add mod">
+          <ac:chgData name="Cynthia Enciso" userId="7915927f-c5cf-4e1f-876d-e79882ad52fa" providerId="ADAL" clId="{1F755F40-8384-4DF3-BC8E-81F4C89DB039}" dt="2021-04-20T19:50:47.875" v="216" actId="1076"/>
+          <ac:spMkLst>
+            <pc:docMk/>
+            <pc:sldMk cId="2319034473" sldId="270"/>
+            <ac:spMk id="53" creationId="{43664EC6-7187-4F77-B41B-2C1951896AD4}"/>
+          </ac:spMkLst>
+        </pc:spChg>
+        <pc:spChg chg="add mod">
+          <ac:chgData name="Cynthia Enciso" userId="7915927f-c5cf-4e1f-876d-e79882ad52fa" providerId="ADAL" clId="{1F755F40-8384-4DF3-BC8E-81F4C89DB039}" dt="2021-04-20T19:50:47.875" v="216" actId="1076"/>
+          <ac:spMkLst>
+            <pc:docMk/>
+            <pc:sldMk cId="2319034473" sldId="270"/>
+            <ac:spMk id="54" creationId="{24D0E5BA-F0D5-4134-9137-57ADE5DE85DE}"/>
+          </ac:spMkLst>
+        </pc:spChg>
+        <pc:spChg chg="add mod">
+          <ac:chgData name="Cynthia Enciso" userId="7915927f-c5cf-4e1f-876d-e79882ad52fa" providerId="ADAL" clId="{1F755F40-8384-4DF3-BC8E-81F4C89DB039}" dt="2021-04-20T19:50:47.875" v="216" actId="1076"/>
+          <ac:spMkLst>
+            <pc:docMk/>
+            <pc:sldMk cId="2319034473" sldId="270"/>
+            <ac:spMk id="55" creationId="{07A09844-5018-49A1-B85D-0C9FC8457B57}"/>
+          </ac:spMkLst>
+        </pc:spChg>
+        <pc:spChg chg="add mod">
+          <ac:chgData name="Cynthia Enciso" userId="7915927f-c5cf-4e1f-876d-e79882ad52fa" providerId="ADAL" clId="{1F755F40-8384-4DF3-BC8E-81F4C89DB039}" dt="2021-04-20T19:50:47.875" v="216" actId="1076"/>
+          <ac:spMkLst>
+            <pc:docMk/>
+            <pc:sldMk cId="2319034473" sldId="270"/>
+            <ac:spMk id="56" creationId="{40AFC470-C093-43E3-8E56-41B6D04E55AB}"/>
+          </ac:spMkLst>
+        </pc:spChg>
+        <pc:spChg chg="add mod">
+          <ac:chgData name="Cynthia Enciso" userId="7915927f-c5cf-4e1f-876d-e79882ad52fa" providerId="ADAL" clId="{1F755F40-8384-4DF3-BC8E-81F4C89DB039}" dt="2021-04-20T19:50:47.875" v="216" actId="1076"/>
+          <ac:spMkLst>
+            <pc:docMk/>
+            <pc:sldMk cId="2319034473" sldId="270"/>
+            <ac:spMk id="57" creationId="{49179903-6A7F-47A7-9C40-C2D4015BC4F9}"/>
+          </ac:spMkLst>
+        </pc:spChg>
+        <pc:spChg chg="add del mod">
+          <ac:chgData name="Cynthia Enciso" userId="7915927f-c5cf-4e1f-876d-e79882ad52fa" providerId="ADAL" clId="{1F755F40-8384-4DF3-BC8E-81F4C89DB039}" dt="2021-04-20T19:50:40.709" v="215" actId="478"/>
+          <ac:spMkLst>
+            <pc:docMk/>
+            <pc:sldMk cId="2319034473" sldId="270"/>
+            <ac:spMk id="58" creationId="{9B1BBCA9-69C6-4EF7-B6FD-675459F47751}"/>
+          </ac:spMkLst>
+        </pc:spChg>
+        <pc:spChg chg="add mod">
+          <ac:chgData name="Cynthia Enciso" userId="7915927f-c5cf-4e1f-876d-e79882ad52fa" providerId="ADAL" clId="{1F755F40-8384-4DF3-BC8E-81F4C89DB039}" dt="2021-04-20T19:51:21.745" v="222" actId="20577"/>
+          <ac:spMkLst>
+            <pc:docMk/>
+            <pc:sldMk cId="2319034473" sldId="270"/>
+            <ac:spMk id="59" creationId="{ED8C762C-D282-40B9-A6F7-0DF5DFBF8F6E}"/>
+          </ac:spMkLst>
+        </pc:spChg>
+        <pc:grpChg chg="add mod">
+          <ac:chgData name="Cynthia Enciso" userId="7915927f-c5cf-4e1f-876d-e79882ad52fa" providerId="ADAL" clId="{1F755F40-8384-4DF3-BC8E-81F4C89DB039}" dt="2021-04-20T21:12:22.600" v="279" actId="1076"/>
+          <ac:grpSpMkLst>
+            <pc:docMk/>
+            <pc:sldMk cId="2319034473" sldId="270"/>
+            <ac:grpSpMk id="13" creationId="{8EE14F81-156C-44EF-8168-0112FF2B2C6B}"/>
+          </ac:grpSpMkLst>
+        </pc:grpChg>
+        <pc:grpChg chg="add mod">
+          <ac:chgData name="Cynthia Enciso" userId="7915927f-c5cf-4e1f-876d-e79882ad52fa" providerId="ADAL" clId="{1F755F40-8384-4DF3-BC8E-81F4C89DB039}" dt="2021-04-20T16:12:59.597" v="54" actId="1076"/>
+          <ac:grpSpMkLst>
+            <pc:docMk/>
+            <pc:sldMk cId="2319034473" sldId="270"/>
+            <ac:grpSpMk id="14" creationId="{B7B68B83-B18F-401E-A039-90F649A73943}"/>
+          </ac:grpSpMkLst>
+        </pc:grpChg>
+        <pc:grpChg chg="add del mod">
+          <ac:chgData name="Cynthia Enciso" userId="7915927f-c5cf-4e1f-876d-e79882ad52fa" providerId="ADAL" clId="{1F755F40-8384-4DF3-BC8E-81F4C89DB039}" dt="2021-04-20T16:18:05.648" v="133" actId="165"/>
+          <ac:grpSpMkLst>
+            <pc:docMk/>
+            <pc:sldMk cId="2319034473" sldId="270"/>
+            <ac:grpSpMk id="45" creationId="{5CC3FE42-DD25-4E63-8CEA-D82E0337D7A7}"/>
+          </ac:grpSpMkLst>
+        </pc:grpChg>
+      </pc:sldChg>
     </pc:docChg>
   </pc:docChgLst>
   <pc:docChgLst>
@@ -4318,7 +4319,7 @@
           </a:lstStyle>
           <a:p>
             <a:fld id="{CA869C63-99CE-7C40-A7E9-3930C61B23AB}" type="datetimeFigureOut">
-              <a:t>3/9/2022</a:t>
+              <a:t>4/5/2022</a:t>
             </a:fld>
             <a:endParaRPr lang="en-US" dirty="0"/>
           </a:p>
@@ -4483,7 +4484,7 @@
           <a:p>
             <a:fld id="{E3E59D94-626A-4CE8-9932-5221A04BF234}" type="datetimeFigureOut">
               <a:rPr lang="en-US" smtClean="0"/>
-              <a:t>3/9/2022</a:t>
+              <a:t>4/5/2022</a:t>
             </a:fld>
             <a:endParaRPr lang="en-US" dirty="0"/>
           </a:p>
@@ -5016,7 +5017,7 @@
           <a:p>
             <a:fld id="{043CB7BC-4AFB-4847-AC93-5F4E37C870A2}" type="slidenum">
               <a:rPr lang="en-US" smtClean="0"/>
-              <a:t>12</a:t>
+              <a:t>13</a:t>
             </a:fld>
             <a:endParaRPr lang="en-US" dirty="0"/>
           </a:p>
@@ -5120,7 +5121,7 @@
           <a:p>
             <a:fld id="{043CB7BC-4AFB-4847-AC93-5F4E37C870A2}" type="slidenum">
               <a:rPr lang="en-US" smtClean="0"/>
-              <a:t>19</a:t>
+              <a:t>20</a:t>
             </a:fld>
             <a:endParaRPr lang="en-US" dirty="0"/>
           </a:p>
@@ -5207,7 +5208,7 @@
           <a:p>
             <a:fld id="{043CB7BC-4AFB-4847-AC93-5F4E37C870A2}" type="slidenum">
               <a:rPr lang="en-US" smtClean="0"/>
-              <a:t>20</a:t>
+              <a:t>21</a:t>
             </a:fld>
             <a:endParaRPr lang="en-US" dirty="0"/>
           </a:p>
@@ -5294,7 +5295,7 @@
           <a:p>
             <a:fld id="{043CB7BC-4AFB-4847-AC93-5F4E37C870A2}" type="slidenum">
               <a:rPr lang="en-US" smtClean="0"/>
-              <a:t>21</a:t>
+              <a:t>22</a:t>
             </a:fld>
             <a:endParaRPr lang="en-US" dirty="0"/>
           </a:p>
@@ -44261,6 +44262,167 @@
       </p:grpSpPr>
       <p:sp>
         <p:nvSpPr>
+          <p:cNvPr id="2" name="Title 1">
+            <a:extLst>
+              <a:ext uri="{FF2B5EF4-FFF2-40B4-BE49-F238E27FC236}">
+                <a16:creationId xmlns:a16="http://schemas.microsoft.com/office/drawing/2014/main" id="{F972FA2D-FD86-49DD-9861-D9F0BCA0718E}"/>
+              </a:ext>
+            </a:extLst>
+          </p:cNvPr>
+          <p:cNvSpPr>
+            <a:spLocks noGrp="1"/>
+          </p:cNvSpPr>
+          <p:nvPr>
+            <p:ph type="title"/>
+          </p:nvPr>
+        </p:nvSpPr>
+        <p:spPr/>
+        <p:txBody>
+          <a:bodyPr/>
+          <a:lstStyle/>
+          <a:p>
+            <a:r>
+              <a:rPr lang="en-US" dirty="0"/>
+              <a:t>What is an API?</a:t>
+            </a:r>
+          </a:p>
+        </p:txBody>
+      </p:sp>
+      <p:sp>
+        <p:nvSpPr>
+          <p:cNvPr id="3" name="Content Placeholder 2">
+            <a:extLst>
+              <a:ext uri="{FF2B5EF4-FFF2-40B4-BE49-F238E27FC236}">
+                <a16:creationId xmlns:a16="http://schemas.microsoft.com/office/drawing/2014/main" id="{85EDD20C-3D76-44D3-90A0-6C01C2C27DD6}"/>
+              </a:ext>
+            </a:extLst>
+          </p:cNvPr>
+          <p:cNvSpPr>
+            <a:spLocks noGrp="1"/>
+          </p:cNvSpPr>
+          <p:nvPr>
+            <p:ph idx="1"/>
+          </p:nvPr>
+        </p:nvSpPr>
+        <p:spPr/>
+        <p:txBody>
+          <a:bodyPr/>
+          <a:lstStyle/>
+          <a:p>
+            <a:r>
+              <a:rPr lang="en-US" b="1" dirty="0"/>
+              <a:t>API (application programming interface): </a:t>
+            </a:r>
+            <a:r>
+              <a:rPr lang="en-US" dirty="0"/>
+              <a:t>Functionality that is bundled together for developers to use</a:t>
+            </a:r>
+          </a:p>
+          <a:p>
+            <a:pPr lvl="1"/>
+            <a:r>
+              <a:rPr lang="en-US" dirty="0"/>
+              <a:t>useful software that helps with development</a:t>
+            </a:r>
+          </a:p>
+          <a:p>
+            <a:pPr lvl="1"/>
+            <a:r>
+              <a:rPr lang="en-US" dirty="0"/>
+              <a:t>An interface that allows the developer to interact with a a system or program</a:t>
+            </a:r>
+          </a:p>
+          <a:p>
+            <a:r>
+              <a:rPr lang="en-US" dirty="0"/>
+              <a:t>The web browser has lots of useful </a:t>
+            </a:r>
+            <a:r>
+              <a:rPr lang="en-US" b="1" dirty="0"/>
+              <a:t>API </a:t>
+            </a:r>
+            <a:r>
+              <a:rPr lang="en-US" dirty="0"/>
+              <a:t>that developers can take advantage of, like the DOM</a:t>
+            </a:r>
+            <a:endParaRPr lang="en-US" b="1" dirty="0"/>
+          </a:p>
+          <a:p>
+            <a:pPr lvl="1"/>
+            <a:endParaRPr lang="en-US" dirty="0"/>
+          </a:p>
+          <a:p>
+            <a:pPr lvl="1"/>
+            <a:endParaRPr lang="en-US" dirty="0"/>
+          </a:p>
+          <a:p>
+            <a:pPr lvl="2"/>
+            <a:endParaRPr lang="en-US" dirty="0"/>
+          </a:p>
+        </p:txBody>
+      </p:sp>
+      <p:sp>
+        <p:nvSpPr>
+          <p:cNvPr id="4" name="Slide Number Placeholder 3">
+            <a:extLst>
+              <a:ext uri="{FF2B5EF4-FFF2-40B4-BE49-F238E27FC236}">
+                <a16:creationId xmlns:a16="http://schemas.microsoft.com/office/drawing/2014/main" id="{EE8BEEED-4EDB-4E15-8881-3854BCB8EE51}"/>
+              </a:ext>
+            </a:extLst>
+          </p:cNvPr>
+          <p:cNvSpPr>
+            <a:spLocks noGrp="1"/>
+          </p:cNvSpPr>
+          <p:nvPr>
+            <p:ph type="sldNum" sz="quarter" idx="12"/>
+          </p:nvPr>
+        </p:nvSpPr>
+        <p:spPr/>
+        <p:txBody>
+          <a:bodyPr/>
+          <a:lstStyle/>
+          <a:p>
+            <a:fld id="{F6728BC2-ACA3-447C-A909-F3F49211C066}" type="slidenum">
+              <a:rPr lang="en-US" smtClean="0"/>
+              <a:pPr/>
+              <a:t>12</a:t>
+            </a:fld>
+            <a:endParaRPr lang="en-US" dirty="0"/>
+          </a:p>
+        </p:txBody>
+      </p:sp>
+    </p:spTree>
+    <p:extLst>
+      <p:ext uri="{BB962C8B-B14F-4D97-AF65-F5344CB8AC3E}">
+        <p14:creationId xmlns:p14="http://schemas.microsoft.com/office/powerpoint/2010/main" val="1411991682"/>
+      </p:ext>
+    </p:extLst>
+  </p:cSld>
+  <p:clrMapOvr>
+    <a:masterClrMapping/>
+  </p:clrMapOvr>
+</p:sld>
+</file>
+
+<file path=ppt/slides/slide14.xml><?xml version="1.0" encoding="utf-8"?>
+<p:sld xmlns:a="http://schemas.openxmlformats.org/drawingml/2006/main" xmlns:r="http://schemas.openxmlformats.org/officeDocument/2006/relationships" xmlns:p="http://schemas.openxmlformats.org/presentationml/2006/main">
+  <p:cSld>
+    <p:spTree>
+      <p:nvGrpSpPr>
+        <p:cNvPr id="1" name=""/>
+        <p:cNvGrpSpPr/>
+        <p:nvPr/>
+      </p:nvGrpSpPr>
+      <p:grpSpPr>
+        <a:xfrm>
+          <a:off x="0" y="0"/>
+          <a:ext cx="0" cy="0"/>
+          <a:chOff x="0" y="0"/>
+          <a:chExt cx="0" cy="0"/>
+        </a:xfrm>
+      </p:grpSpPr>
+      <p:sp>
+        <p:nvSpPr>
           <p:cNvPr id="42" name="Rectangle: Rounded Corners 41">
             <a:extLst>
               <a:ext uri="{FF2B5EF4-FFF2-40B4-BE49-F238E27FC236}">
@@ -44360,7 +44522,7 @@
             <a:fld id="{F6728BC2-ACA3-447C-A909-F3F49211C066}" type="slidenum">
               <a:rPr lang="en-US" smtClean="0"/>
               <a:pPr/>
-              <a:t>12</a:t>
+              <a:t>13</a:t>
             </a:fld>
             <a:endParaRPr lang="en-US" dirty="0"/>
           </a:p>
@@ -44574,7 +44736,7 @@
           <p:nvPr/>
         </p:nvPicPr>
         <p:blipFill>
-          <a:blip r:embed="rId3">
+          <a:blip r:embed="rId3" cstate="print">
             <a:extLst>
               <a:ext uri="{28A0092B-C50C-407E-A947-70E740481C1C}">
                 <a14:useLocalDpi xmlns:a14="http://schemas.microsoft.com/office/drawing/2010/main" val="0"/>
@@ -44610,7 +44772,7 @@
           <p:nvPr/>
         </p:nvPicPr>
         <p:blipFill>
-          <a:blip r:embed="rId4">
+          <a:blip r:embed="rId4" cstate="print">
             <a:extLst>
               <a:ext uri="{28A0092B-C50C-407E-A947-70E740481C1C}">
                 <a14:useLocalDpi xmlns:a14="http://schemas.microsoft.com/office/drawing/2010/main" val="0"/>
@@ -44682,7 +44844,7 @@
           <p:nvPr/>
         </p:nvPicPr>
         <p:blipFill>
-          <a:blip r:embed="rId6">
+          <a:blip r:embed="rId6" cstate="print">
             <a:extLst>
               <a:ext uri="{28A0092B-C50C-407E-A947-70E740481C1C}">
                 <a14:useLocalDpi xmlns:a14="http://schemas.microsoft.com/office/drawing/2010/main" val="0"/>
@@ -44779,7 +44941,7 @@
             <p:nvPr/>
           </p:nvPicPr>
           <p:blipFill>
-            <a:blip r:embed="rId7">
+            <a:blip r:embed="rId7" cstate="print">
               <a:extLst>
                 <a:ext uri="{28A0092B-C50C-407E-A947-70E740481C1C}">
                   <a14:useLocalDpi xmlns:a14="http://schemas.microsoft.com/office/drawing/2010/main" val="0"/>
@@ -44877,7 +45039,7 @@
             <p:nvPr/>
           </p:nvPicPr>
           <p:blipFill>
-            <a:blip r:embed="rId7">
+            <a:blip r:embed="rId8" cstate="print">
               <a:extLst>
                 <a:ext uri="{28A0092B-C50C-407E-A947-70E740481C1C}">
                   <a14:useLocalDpi xmlns:a14="http://schemas.microsoft.com/office/drawing/2010/main" val="0"/>
@@ -44912,7 +45074,7 @@
 </p:sld>
 </file>
 
-<file path=ppt/slides/slide14.xml><?xml version="1.0" encoding="utf-8"?>
+<file path=ppt/slides/slide15.xml><?xml version="1.0" encoding="utf-8"?>
 <p:sld xmlns:a="http://schemas.openxmlformats.org/drawingml/2006/main" xmlns:r="http://schemas.openxmlformats.org/officeDocument/2006/relationships" xmlns:p="http://schemas.openxmlformats.org/presentationml/2006/main">
   <p:cSld>
     <p:spTree>
@@ -45097,7 +45259,7 @@
             <a:fld id="{F6728BC2-ACA3-447C-A909-F3F49211C066}" type="slidenum">
               <a:rPr lang="en-US" smtClean="0"/>
               <a:pPr/>
-              <a:t>13</a:t>
+              <a:t>14</a:t>
             </a:fld>
             <a:endParaRPr lang="en-US" dirty="0"/>
           </a:p>
@@ -45116,7 +45278,7 @@
 </p:sld>
 </file>
 
-<file path=ppt/slides/slide15.xml><?xml version="1.0" encoding="utf-8"?>
+<file path=ppt/slides/slide16.xml><?xml version="1.0" encoding="utf-8"?>
 <p:sld xmlns:a="http://schemas.openxmlformats.org/drawingml/2006/main" xmlns:r="http://schemas.openxmlformats.org/officeDocument/2006/relationships" xmlns:p="http://schemas.openxmlformats.org/presentationml/2006/main">
   <p:cSld>
     <p:spTree>
@@ -45157,7 +45319,7 @@
             <a:fld id="{F6728BC2-ACA3-447C-A909-F3F49211C066}" type="slidenum">
               <a:rPr lang="en-US" smtClean="0"/>
               <a:pPr/>
-              <a:t>14</a:t>
+              <a:t>15</a:t>
             </a:fld>
             <a:endParaRPr lang="en-US" dirty="0"/>
           </a:p>
@@ -45212,7 +45374,7 @@
 </p:sld>
 </file>
 
-<file path=ppt/slides/slide16.xml><?xml version="1.0" encoding="utf-8"?>
+<file path=ppt/slides/slide17.xml><?xml version="1.0" encoding="utf-8"?>
 <p:sld xmlns:a="http://schemas.openxmlformats.org/drawingml/2006/main" xmlns:r="http://schemas.openxmlformats.org/officeDocument/2006/relationships" xmlns:p="http://schemas.openxmlformats.org/presentationml/2006/main">
   <p:cSld>
     <p:spTree>
@@ -45337,7 +45499,7 @@
             <a:fld id="{F6728BC2-ACA3-447C-A909-F3F49211C066}" type="slidenum">
               <a:rPr lang="en-US" smtClean="0"/>
               <a:pPr/>
-              <a:t>15</a:t>
+              <a:t>16</a:t>
             </a:fld>
             <a:endParaRPr lang="en-US" dirty="0"/>
           </a:p>
@@ -45356,7 +45518,7 @@
 </p:sld>
 </file>
 
-<file path=ppt/slides/slide17.xml><?xml version="1.0" encoding="utf-8"?>
+<file path=ppt/slides/slide18.xml><?xml version="1.0" encoding="utf-8"?>
 <p:sld xmlns:a="http://schemas.openxmlformats.org/drawingml/2006/main" xmlns:r="http://schemas.openxmlformats.org/officeDocument/2006/relationships" xmlns:p="http://schemas.openxmlformats.org/presentationml/2006/main">
   <p:cSld>
     <p:spTree>
@@ -45511,7 +45673,7 @@
             <a:fld id="{F6728BC2-ACA3-447C-A909-F3F49211C066}" type="slidenum">
               <a:rPr lang="en-US" smtClean="0"/>
               <a:pPr/>
-              <a:t>16</a:t>
+              <a:t>17</a:t>
             </a:fld>
             <a:endParaRPr lang="en-US" dirty="0"/>
           </a:p>
@@ -45530,7 +45692,7 @@
 </p:sld>
 </file>
 
-<file path=ppt/slides/slide18.xml><?xml version="1.0" encoding="utf-8"?>
+<file path=ppt/slides/slide19.xml><?xml version="1.0" encoding="utf-8"?>
 <p:sld xmlns:a="http://schemas.openxmlformats.org/drawingml/2006/main" xmlns:r="http://schemas.openxmlformats.org/officeDocument/2006/relationships" xmlns:p="http://schemas.openxmlformats.org/presentationml/2006/main">
   <p:cSld>
     <p:spTree>
@@ -45700,7 +45862,7 @@
             <a:fld id="{F6728BC2-ACA3-447C-A909-F3F49211C066}" type="slidenum">
               <a:rPr lang="en-US" smtClean="0"/>
               <a:pPr/>
-              <a:t>17</a:t>
+              <a:t>18</a:t>
             </a:fld>
             <a:endParaRPr lang="en-US" dirty="0"/>
           </a:p>
@@ -45719,7 +45881,162 @@
 </p:sld>
 </file>
 
-<file path=ppt/slides/slide19.xml><?xml version="1.0" encoding="utf-8"?>
+<file path=ppt/slides/slide2.xml><?xml version="1.0" encoding="utf-8"?>
+<p:sld xmlns:a="http://schemas.openxmlformats.org/drawingml/2006/main" xmlns:r="http://schemas.openxmlformats.org/officeDocument/2006/relationships" xmlns:p="http://schemas.openxmlformats.org/presentationml/2006/main">
+  <p:cSld>
+    <p:spTree>
+      <p:nvGrpSpPr>
+        <p:cNvPr id="1" name=""/>
+        <p:cNvGrpSpPr/>
+        <p:nvPr/>
+      </p:nvGrpSpPr>
+      <p:grpSpPr>
+        <a:xfrm>
+          <a:off x="0" y="0"/>
+          <a:ext cx="0" cy="0"/>
+          <a:chOff x="0" y="0"/>
+          <a:chExt cx="0" cy="0"/>
+        </a:xfrm>
+      </p:grpSpPr>
+      <p:sp>
+        <p:nvSpPr>
+          <p:cNvPr id="4" name="Slide Number Placeholder 3">
+            <a:extLst>
+              <a:ext uri="{FF2B5EF4-FFF2-40B4-BE49-F238E27FC236}">
+                <a16:creationId xmlns:a16="http://schemas.microsoft.com/office/drawing/2014/main" id="{3E30844B-022F-4A6C-98D3-B1ADB4EB4720}"/>
+              </a:ext>
+            </a:extLst>
+          </p:cNvPr>
+          <p:cNvSpPr>
+            <a:spLocks noGrp="1"/>
+          </p:cNvSpPr>
+          <p:nvPr>
+            <p:ph type="sldNum" sz="quarter" idx="12"/>
+          </p:nvPr>
+        </p:nvSpPr>
+        <p:spPr/>
+        <p:txBody>
+          <a:bodyPr/>
+          <a:lstStyle/>
+          <a:p>
+            <a:fld id="{F6728BC2-ACA3-447C-A909-F3F49211C066}" type="slidenum">
+              <a:rPr lang="en-US" smtClean="0"/>
+              <a:pPr/>
+              <a:t>1</a:t>
+            </a:fld>
+            <a:endParaRPr lang="en-US" dirty="0"/>
+          </a:p>
+        </p:txBody>
+      </p:sp>
+      <p:sp>
+        <p:nvSpPr>
+          <p:cNvPr id="2" name="Title 1">
+            <a:extLst>
+              <a:ext uri="{FF2B5EF4-FFF2-40B4-BE49-F238E27FC236}">
+                <a16:creationId xmlns:a16="http://schemas.microsoft.com/office/drawing/2014/main" id="{66F89E73-F57F-4A64-A80A-ABFA871628BB}"/>
+              </a:ext>
+            </a:extLst>
+          </p:cNvPr>
+          <p:cNvSpPr>
+            <a:spLocks noGrp="1"/>
+          </p:cNvSpPr>
+          <p:nvPr>
+            <p:ph type="title"/>
+          </p:nvPr>
+        </p:nvSpPr>
+        <p:spPr/>
+        <p:txBody>
+          <a:bodyPr/>
+          <a:lstStyle/>
+          <a:p>
+            <a:r>
+              <a:rPr lang="en-US" dirty="0"/>
+              <a:t>Key Topics</a:t>
+            </a:r>
+          </a:p>
+        </p:txBody>
+      </p:sp>
+      <p:sp>
+        <p:nvSpPr>
+          <p:cNvPr id="3" name="Content Placeholder 2">
+            <a:extLst>
+              <a:ext uri="{FF2B5EF4-FFF2-40B4-BE49-F238E27FC236}">
+                <a16:creationId xmlns:a16="http://schemas.microsoft.com/office/drawing/2014/main" id="{B1111439-1650-4608-A6FB-4D8060B860C4}"/>
+              </a:ext>
+            </a:extLst>
+          </p:cNvPr>
+          <p:cNvSpPr>
+            <a:spLocks noGrp="1"/>
+          </p:cNvSpPr>
+          <p:nvPr>
+            <p:ph idx="1"/>
+          </p:nvPr>
+        </p:nvSpPr>
+        <p:spPr/>
+        <p:txBody>
+          <a:bodyPr>
+            <a:normAutofit/>
+          </a:bodyPr>
+          <a:lstStyle/>
+          <a:p>
+            <a:pPr marL="514350" indent="-514350">
+              <a:buFont typeface="+mj-lt"/>
+              <a:buAutoNum type="arabicPeriod"/>
+            </a:pPr>
+            <a:r>
+              <a:rPr lang="en-US" sz="4000" dirty="0"/>
+              <a:t>Programming</a:t>
+            </a:r>
+            <a:endParaRPr lang="en-US" sz="4000" b="1" dirty="0"/>
+          </a:p>
+          <a:p>
+            <a:pPr marL="514350" indent="-514350">
+              <a:buFont typeface="+mj-lt"/>
+              <a:buAutoNum type="arabicPeriod"/>
+            </a:pPr>
+            <a:r>
+              <a:rPr lang="en-US" sz="4000" dirty="0"/>
+              <a:t>Binary</a:t>
+            </a:r>
+            <a:endParaRPr lang="en-US" sz="4000" b="1" dirty="0"/>
+          </a:p>
+          <a:p>
+            <a:pPr marL="514350" indent="-514350">
+              <a:buFont typeface="+mj-lt"/>
+              <a:buAutoNum type="arabicPeriod"/>
+            </a:pPr>
+            <a:r>
+              <a:rPr lang="en-US" sz="4000" dirty="0"/>
+              <a:t>Applications</a:t>
+            </a:r>
+          </a:p>
+          <a:p>
+            <a:pPr marL="514350" indent="-514350">
+              <a:buFont typeface="+mj-lt"/>
+              <a:buAutoNum type="arabicPeriod"/>
+            </a:pPr>
+            <a:r>
+              <a:rPr lang="en-US" sz="4000" dirty="0"/>
+              <a:t>HTML introduction</a:t>
+            </a:r>
+            <a:endParaRPr lang="en-US" sz="4000" b="1" dirty="0"/>
+          </a:p>
+        </p:txBody>
+      </p:sp>
+    </p:spTree>
+    <p:extLst>
+      <p:ext uri="{BB962C8B-B14F-4D97-AF65-F5344CB8AC3E}">
+        <p14:creationId xmlns:p14="http://schemas.microsoft.com/office/powerpoint/2010/main" val="2819891230"/>
+      </p:ext>
+    </p:extLst>
+  </p:cSld>
+  <p:clrMapOvr>
+    <a:masterClrMapping/>
+  </p:clrMapOvr>
+</p:sld>
+</file>
+
+<file path=ppt/slides/slide20.xml><?xml version="1.0" encoding="utf-8"?>
 <p:sld xmlns:a="http://schemas.openxmlformats.org/drawingml/2006/main" xmlns:r="http://schemas.openxmlformats.org/officeDocument/2006/relationships" xmlns:p="http://schemas.openxmlformats.org/presentationml/2006/main">
   <p:cSld>
     <p:spTree>
@@ -45811,7 +46128,7 @@
             <a:fld id="{F6728BC2-ACA3-447C-A909-F3F49211C066}" type="slidenum">
               <a:rPr lang="en-US" smtClean="0"/>
               <a:pPr/>
-              <a:t>18</a:t>
+              <a:t>19</a:t>
             </a:fld>
             <a:endParaRPr lang="en-US" dirty="0"/>
           </a:p>
@@ -46050,162 +46367,7 @@
 </p:sld>
 </file>
 
-<file path=ppt/slides/slide2.xml><?xml version="1.0" encoding="utf-8"?>
-<p:sld xmlns:a="http://schemas.openxmlformats.org/drawingml/2006/main" xmlns:r="http://schemas.openxmlformats.org/officeDocument/2006/relationships" xmlns:p="http://schemas.openxmlformats.org/presentationml/2006/main">
-  <p:cSld>
-    <p:spTree>
-      <p:nvGrpSpPr>
-        <p:cNvPr id="1" name=""/>
-        <p:cNvGrpSpPr/>
-        <p:nvPr/>
-      </p:nvGrpSpPr>
-      <p:grpSpPr>
-        <a:xfrm>
-          <a:off x="0" y="0"/>
-          <a:ext cx="0" cy="0"/>
-          <a:chOff x="0" y="0"/>
-          <a:chExt cx="0" cy="0"/>
-        </a:xfrm>
-      </p:grpSpPr>
-      <p:sp>
-        <p:nvSpPr>
-          <p:cNvPr id="4" name="Slide Number Placeholder 3">
-            <a:extLst>
-              <a:ext uri="{FF2B5EF4-FFF2-40B4-BE49-F238E27FC236}">
-                <a16:creationId xmlns:a16="http://schemas.microsoft.com/office/drawing/2014/main" id="{3E30844B-022F-4A6C-98D3-B1ADB4EB4720}"/>
-              </a:ext>
-            </a:extLst>
-          </p:cNvPr>
-          <p:cNvSpPr>
-            <a:spLocks noGrp="1"/>
-          </p:cNvSpPr>
-          <p:nvPr>
-            <p:ph type="sldNum" sz="quarter" idx="12"/>
-          </p:nvPr>
-        </p:nvSpPr>
-        <p:spPr/>
-        <p:txBody>
-          <a:bodyPr/>
-          <a:lstStyle/>
-          <a:p>
-            <a:fld id="{F6728BC2-ACA3-447C-A909-F3F49211C066}" type="slidenum">
-              <a:rPr lang="en-US" smtClean="0"/>
-              <a:pPr/>
-              <a:t>1</a:t>
-            </a:fld>
-            <a:endParaRPr lang="en-US" dirty="0"/>
-          </a:p>
-        </p:txBody>
-      </p:sp>
-      <p:sp>
-        <p:nvSpPr>
-          <p:cNvPr id="2" name="Title 1">
-            <a:extLst>
-              <a:ext uri="{FF2B5EF4-FFF2-40B4-BE49-F238E27FC236}">
-                <a16:creationId xmlns:a16="http://schemas.microsoft.com/office/drawing/2014/main" id="{66F89E73-F57F-4A64-A80A-ABFA871628BB}"/>
-              </a:ext>
-            </a:extLst>
-          </p:cNvPr>
-          <p:cNvSpPr>
-            <a:spLocks noGrp="1"/>
-          </p:cNvSpPr>
-          <p:nvPr>
-            <p:ph type="title"/>
-          </p:nvPr>
-        </p:nvSpPr>
-        <p:spPr/>
-        <p:txBody>
-          <a:bodyPr/>
-          <a:lstStyle/>
-          <a:p>
-            <a:r>
-              <a:rPr lang="en-US" dirty="0"/>
-              <a:t>Key Topics</a:t>
-            </a:r>
-          </a:p>
-        </p:txBody>
-      </p:sp>
-      <p:sp>
-        <p:nvSpPr>
-          <p:cNvPr id="3" name="Content Placeholder 2">
-            <a:extLst>
-              <a:ext uri="{FF2B5EF4-FFF2-40B4-BE49-F238E27FC236}">
-                <a16:creationId xmlns:a16="http://schemas.microsoft.com/office/drawing/2014/main" id="{B1111439-1650-4608-A6FB-4D8060B860C4}"/>
-              </a:ext>
-            </a:extLst>
-          </p:cNvPr>
-          <p:cNvSpPr>
-            <a:spLocks noGrp="1"/>
-          </p:cNvSpPr>
-          <p:nvPr>
-            <p:ph idx="1"/>
-          </p:nvPr>
-        </p:nvSpPr>
-        <p:spPr/>
-        <p:txBody>
-          <a:bodyPr>
-            <a:normAutofit/>
-          </a:bodyPr>
-          <a:lstStyle/>
-          <a:p>
-            <a:pPr marL="514350" indent="-514350">
-              <a:buFont typeface="+mj-lt"/>
-              <a:buAutoNum type="arabicPeriod"/>
-            </a:pPr>
-            <a:r>
-              <a:rPr lang="en-US" sz="4000" dirty="0"/>
-              <a:t>Programming</a:t>
-            </a:r>
-            <a:endParaRPr lang="en-US" sz="4000" b="1" dirty="0"/>
-          </a:p>
-          <a:p>
-            <a:pPr marL="514350" indent="-514350">
-              <a:buFont typeface="+mj-lt"/>
-              <a:buAutoNum type="arabicPeriod"/>
-            </a:pPr>
-            <a:r>
-              <a:rPr lang="en-US" sz="4000" dirty="0"/>
-              <a:t>Binary</a:t>
-            </a:r>
-            <a:endParaRPr lang="en-US" sz="4000" b="1" dirty="0"/>
-          </a:p>
-          <a:p>
-            <a:pPr marL="514350" indent="-514350">
-              <a:buFont typeface="+mj-lt"/>
-              <a:buAutoNum type="arabicPeriod"/>
-            </a:pPr>
-            <a:r>
-              <a:rPr lang="en-US" sz="4000" dirty="0"/>
-              <a:t>Applications</a:t>
-            </a:r>
-          </a:p>
-          <a:p>
-            <a:pPr marL="514350" indent="-514350">
-              <a:buFont typeface="+mj-lt"/>
-              <a:buAutoNum type="arabicPeriod"/>
-            </a:pPr>
-            <a:r>
-              <a:rPr lang="en-US" sz="4000" dirty="0"/>
-              <a:t>HTML introduction</a:t>
-            </a:r>
-            <a:endParaRPr lang="en-US" sz="4000" b="1" dirty="0"/>
-          </a:p>
-        </p:txBody>
-      </p:sp>
-    </p:spTree>
-    <p:extLst>
-      <p:ext uri="{BB962C8B-B14F-4D97-AF65-F5344CB8AC3E}">
-        <p14:creationId xmlns:p14="http://schemas.microsoft.com/office/powerpoint/2010/main" val="2819891230"/>
-      </p:ext>
-    </p:extLst>
-  </p:cSld>
-  <p:clrMapOvr>
-    <a:masterClrMapping/>
-  </p:clrMapOvr>
-</p:sld>
-</file>
-
-<file path=ppt/slides/slide20.xml><?xml version="1.0" encoding="utf-8"?>
+<file path=ppt/slides/slide21.xml><?xml version="1.0" encoding="utf-8"?>
 <p:sld xmlns:a="http://schemas.openxmlformats.org/drawingml/2006/main" xmlns:r="http://schemas.openxmlformats.org/officeDocument/2006/relationships" xmlns:p="http://schemas.openxmlformats.org/presentationml/2006/main">
   <p:cSld>
     <p:spTree>
@@ -46386,7 +46548,7 @@
             <a:fld id="{F6728BC2-ACA3-447C-A909-F3F49211C066}" type="slidenum">
               <a:rPr lang="en-US" smtClean="0"/>
               <a:pPr/>
-              <a:t>19</a:t>
+              <a:t>20</a:t>
             </a:fld>
             <a:endParaRPr lang="en-US" dirty="0"/>
           </a:p>
@@ -46484,7 +46646,7 @@
 </p:sld>
 </file>
 
-<file path=ppt/slides/slide21.xml><?xml version="1.0" encoding="utf-8"?>
+<file path=ppt/slides/slide22.xml><?xml version="1.0" encoding="utf-8"?>
 <p:sld xmlns:a="http://schemas.openxmlformats.org/drawingml/2006/main" xmlns:r="http://schemas.openxmlformats.org/officeDocument/2006/relationships" xmlns:p="http://schemas.openxmlformats.org/presentationml/2006/main">
   <p:cSld>
     <p:spTree>
@@ -46643,7 +46805,7 @@
             <a:fld id="{F6728BC2-ACA3-447C-A909-F3F49211C066}" type="slidenum">
               <a:rPr lang="en-US" smtClean="0"/>
               <a:pPr/>
-              <a:t>20</a:t>
+              <a:t>21</a:t>
             </a:fld>
             <a:endParaRPr lang="en-US" dirty="0"/>
           </a:p>
@@ -46662,7 +46824,7 @@
 </p:sld>
 </file>
 
-<file path=ppt/slides/slide22.xml><?xml version="1.0" encoding="utf-8"?>
+<file path=ppt/slides/slide23.xml><?xml version="1.0" encoding="utf-8"?>
 <p:sld xmlns:a="http://schemas.openxmlformats.org/drawingml/2006/main" xmlns:r="http://schemas.openxmlformats.org/officeDocument/2006/relationships" xmlns:p="http://schemas.openxmlformats.org/presentationml/2006/main">
   <p:cSld>
     <p:spTree>
@@ -46852,7 +47014,7 @@
             <a:fld id="{F6728BC2-ACA3-447C-A909-F3F49211C066}" type="slidenum">
               <a:rPr lang="en-US" smtClean="0"/>
               <a:pPr/>
-              <a:t>21</a:t>
+              <a:t>22</a:t>
             </a:fld>
             <a:endParaRPr lang="en-US" dirty="0"/>
           </a:p>
@@ -46871,7 +47033,7 @@
 </p:sld>
 </file>
 
-<file path=ppt/slides/slide23.xml><?xml version="1.0" encoding="utf-8"?>
+<file path=ppt/slides/slide24.xml><?xml version="1.0" encoding="utf-8"?>
 <p:sld xmlns:a="http://schemas.openxmlformats.org/drawingml/2006/main" xmlns:r="http://schemas.openxmlformats.org/officeDocument/2006/relationships" xmlns:p="http://schemas.openxmlformats.org/presentationml/2006/main">
   <p:cSld>
     <p:spTree>
@@ -46906,7 +47068,7 @@
             <a:fld id="{F6728BC2-ACA3-447C-A909-F3F49211C066}" type="slidenum">
               <a:rPr lang="en-US" smtClean="0"/>
               <a:pPr/>
-              <a:t>22</a:t>
+              <a:t>23</a:t>
             </a:fld>
             <a:endParaRPr lang="en-US" dirty="0"/>
           </a:p>
@@ -47038,7 +47200,7 @@
 </p:sld>
 </file>
 
-<file path=ppt/slides/slide24.xml><?xml version="1.0" encoding="utf-8"?>
+<file path=ppt/slides/slide25.xml><?xml version="1.0" encoding="utf-8"?>
 <p:sld xmlns:a="http://schemas.openxmlformats.org/drawingml/2006/main" xmlns:r="http://schemas.openxmlformats.org/officeDocument/2006/relationships" xmlns:p="http://schemas.openxmlformats.org/presentationml/2006/main">
   <p:cSld>
     <p:spTree>
@@ -47079,7 +47241,7 @@
             <a:fld id="{F6728BC2-ACA3-447C-A909-F3F49211C066}" type="slidenum">
               <a:rPr lang="en-US" smtClean="0"/>
               <a:pPr/>
-              <a:t>23</a:t>
+              <a:t>24</a:t>
             </a:fld>
             <a:endParaRPr lang="en-US" dirty="0"/>
           </a:p>
@@ -47220,7 +47382,7 @@
 </p:sld>
 </file>
 
-<file path=ppt/slides/slide25.xml><?xml version="1.0" encoding="utf-8"?>
+<file path=ppt/slides/slide26.xml><?xml version="1.0" encoding="utf-8"?>
 <p:sld xmlns:a="http://schemas.openxmlformats.org/drawingml/2006/main" xmlns:r="http://schemas.openxmlformats.org/officeDocument/2006/relationships" xmlns:p="http://schemas.openxmlformats.org/presentationml/2006/main">
   <p:cSld>
     <p:spTree>
@@ -47286,7 +47448,7 @@
             <a:fld id="{F6728BC2-ACA3-447C-A909-F3F49211C066}" type="slidenum">
               <a:rPr lang="en-US" smtClean="0"/>
               <a:pPr/>
-              <a:t>24</a:t>
+              <a:t>25</a:t>
             </a:fld>
             <a:endParaRPr lang="en-US" dirty="0"/>
           </a:p>
@@ -48214,7 +48376,7 @@
             <p:nvPr/>
           </p:nvPicPr>
           <p:blipFill>
-            <a:blip r:embed="rId3">
+            <a:blip r:embed="rId3" cstate="print">
               <a:extLst>
                 <a:ext uri="{28A0092B-C50C-407E-A947-70E740481C1C}">
                   <a14:useLocalDpi xmlns:a14="http://schemas.microsoft.com/office/drawing/2010/main" val="0"/>
@@ -48413,7 +48575,7 @@
             <p:nvPr/>
           </p:nvPicPr>
           <p:blipFill>
-            <a:blip r:embed="rId4">
+            <a:blip r:embed="rId4" cstate="print">
               <a:extLst>
                 <a:ext uri="{28A0092B-C50C-407E-A947-70E740481C1C}">
                   <a14:useLocalDpi xmlns:a14="http://schemas.microsoft.com/office/drawing/2010/main" val="0"/>
@@ -48602,7 +48764,7 @@
           <p:nvPr/>
         </p:nvPicPr>
         <p:blipFill>
-          <a:blip r:embed="rId5">
+          <a:blip r:embed="rId5" cstate="print">
             <a:extLst>
               <a:ext uri="{28A0092B-C50C-407E-A947-70E740481C1C}">
                 <a14:useLocalDpi xmlns:a14="http://schemas.microsoft.com/office/drawing/2010/main" val="0"/>
@@ -51772,6 +51934,23 @@
 </file>
 
 <file path=customXml/item1.xml><?xml version="1.0" encoding="utf-8"?>
+<p:properties xmlns:p="http://schemas.microsoft.com/office/2006/metadata/properties" xmlns:xsi="http://www.w3.org/2001/XMLSchema-instance" xmlns:pc="http://schemas.microsoft.com/office/infopath/2007/PartnerControls">
+  <documentManagement>
+    <Details xmlns="16399201-8c70-4094-bedf-0e0052933be2" xsi:nil="true"/>
+  </documentManagement>
+</p:properties>
+</file>
+
+<file path=customXml/item2.xml><?xml version="1.0" encoding="utf-8"?>
+<?mso-contentType ?>
+<FormTemplates xmlns="http://schemas.microsoft.com/sharepoint/v3/contenttype/forms">
+  <Display>DocumentLibraryForm</Display>
+  <Edit>DocumentLibraryForm</Edit>
+  <New>DocumentLibraryForm</New>
+</FormTemplates>
+</file>
+
+<file path=customXml/item3.xml><?xml version="1.0" encoding="utf-8"?>
 <ct:contentTypeSchema xmlns:ct="http://schemas.microsoft.com/office/2006/metadata/contentType" xmlns:ma="http://schemas.microsoft.com/office/2006/metadata/properties/metaAttributes" ct:_="" ma:_="" ma:contentTypeName="Document" ma:contentTypeID="0x0101008BD2F010722D7D4D902378845F41F1B2" ma:contentTypeVersion="13" ma:contentTypeDescription="Create a new document." ma:contentTypeScope="" ma:versionID="b68d56871977609000cd171c9412956f">
   <xsd:schema xmlns:xsd="http://www.w3.org/2001/XMLSchema" xmlns:xs="http://www.w3.org/2001/XMLSchema" xmlns:p="http://schemas.microsoft.com/office/2006/metadata/properties" xmlns:ns2="16399201-8c70-4094-bedf-0e0052933be2" xmlns:ns3="c1d1d668-1a17-41cc-8e51-02c957e8f86c" targetNamespace="http://schemas.microsoft.com/office/2006/metadata/properties" ma:root="true" ma:fieldsID="8d4e77ac156dfa649f0a05adbe1f888e" ns2:_="" ns3:_="">
     <xsd:import namespace="16399201-8c70-4094-bedf-0e0052933be2"/>
@@ -51996,31 +52175,39 @@
 </ct:contentTypeSchema>
 </file>
 
-<file path=customXml/item2.xml><?xml version="1.0" encoding="utf-8"?>
-<?mso-contentType ?>
-<FormTemplates xmlns="http://schemas.microsoft.com/sharepoint/v3/contenttype/forms">
-  <Display>DocumentLibraryForm</Display>
-  <Edit>DocumentLibraryForm</Edit>
-  <New>DocumentLibraryForm</New>
-</FormTemplates>
-</file>
-
-<file path=customXml/item3.xml><?xml version="1.0" encoding="utf-8"?>
-<p:properties xmlns:p="http://schemas.microsoft.com/office/2006/metadata/properties" xmlns:xsi="http://www.w3.org/2001/XMLSchema-instance" xmlns:pc="http://schemas.microsoft.com/office/infopath/2007/PartnerControls">
-  <documentManagement>
-    <Details xmlns="16399201-8c70-4094-bedf-0e0052933be2" xsi:nil="true"/>
-  </documentManagement>
-</p:properties>
-</file>
-
 <file path=customXml/itemProps1.xml><?xml version="1.0" encoding="utf-8"?>
-<ds:datastoreItem xmlns:ds="http://schemas.openxmlformats.org/officeDocument/2006/customXml" ds:itemID="{67B86F3B-DBE1-4ED2-A710-730463501B12}"/>
+<ds:datastoreItem xmlns:ds="http://schemas.openxmlformats.org/officeDocument/2006/customXml" ds:itemID="{1AD337C6-6362-43E5-BAFB-D65FFAB809A2}">
+  <ds:schemaRefs>
+    <ds:schemaRef ds:uri="http://schemas.microsoft.com/office/2006/metadata/properties"/>
+    <ds:schemaRef ds:uri="http://schemas.microsoft.com/office/infopath/2007/PartnerControls"/>
+    <ds:schemaRef ds:uri="16399201-8c70-4094-bedf-0e0052933be2"/>
+  </ds:schemaRefs>
+</ds:datastoreItem>
 </file>
 
 <file path=customXml/itemProps2.xml><?xml version="1.0" encoding="utf-8"?>
-<ds:datastoreItem xmlns:ds="http://schemas.openxmlformats.org/officeDocument/2006/customXml" ds:itemID="{4C54AD8D-A0BC-43D4-9CCD-B58FBCBF8AFF}"/>
+<ds:datastoreItem xmlns:ds="http://schemas.openxmlformats.org/officeDocument/2006/customXml" ds:itemID="{4C54AD8D-A0BC-43D4-9CCD-B58FBCBF8AFF}">
+  <ds:schemaRefs>
+    <ds:schemaRef ds:uri="http://schemas.microsoft.com/sharepoint/v3/contenttype/forms"/>
+  </ds:schemaRefs>
+</ds:datastoreItem>
 </file>
 
 <file path=customXml/itemProps3.xml><?xml version="1.0" encoding="utf-8"?>
-<ds:datastoreItem xmlns:ds="http://schemas.openxmlformats.org/officeDocument/2006/customXml" ds:itemID="{1AD337C6-6362-43E5-BAFB-D65FFAB809A2}"/>
+<ds:datastoreItem xmlns:ds="http://schemas.openxmlformats.org/officeDocument/2006/customXml" ds:itemID="{67B86F3B-DBE1-4ED2-A710-730463501B12}">
+  <ds:schemaRefs>
+    <ds:schemaRef ds:uri="http://schemas.microsoft.com/office/2006/metadata/contentType"/>
+    <ds:schemaRef ds:uri="http://schemas.microsoft.com/office/2006/metadata/properties/metaAttributes"/>
+    <ds:schemaRef ds:uri="http://www.w3.org/2001/XMLSchema"/>
+    <ds:schemaRef ds:uri="http://schemas.microsoft.com/office/2006/metadata/properties"/>
+    <ds:schemaRef ds:uri="16399201-8c70-4094-bedf-0e0052933be2"/>
+    <ds:schemaRef ds:uri="c1d1d668-1a17-41cc-8e51-02c957e8f86c"/>
+    <ds:schemaRef ds:uri="http://schemas.microsoft.com/office/2006/documentManagement/types"/>
+    <ds:schemaRef ds:uri="http://schemas.microsoft.com/office/infopath/2007/PartnerControls"/>
+    <ds:schemaRef ds:uri="http://schemas.openxmlformats.org/package/2006/metadata/core-properties"/>
+    <ds:schemaRef ds:uri="http://purl.org/dc/elements/1.1/"/>
+    <ds:schemaRef ds:uri="http://purl.org/dc/terms/"/>
+    <ds:schemaRef ds:uri="http://schemas.microsoft.com/internal/obd"/>
+  </ds:schemaRefs>
+</ds:datastoreItem>
 </file>
</xml_diff>